<commit_message>
Committing select channels/nodes for Mike; updated ppt file; some edits to coding raw data
</commit_message>
<xml_diff>
--- a/figures/zoi_figures.pptx
+++ b/figures/zoi_figures.pptx
@@ -11,8 +11,17 @@
     <p:sldId id="260" r:id="rId5"/>
     <p:sldId id="257" r:id="rId6"/>
     <p:sldId id="262" r:id="rId7"/>
-    <p:sldId id="263" r:id="rId8"/>
-    <p:sldId id="264" r:id="rId9"/>
+    <p:sldId id="264" r:id="rId8"/>
+    <p:sldId id="265" r:id="rId9"/>
+    <p:sldId id="266" r:id="rId10"/>
+    <p:sldId id="277" r:id="rId11"/>
+    <p:sldId id="276" r:id="rId12"/>
+    <p:sldId id="274" r:id="rId13"/>
+    <p:sldId id="267" r:id="rId14"/>
+    <p:sldId id="271" r:id="rId15"/>
+    <p:sldId id="273" r:id="rId16"/>
+    <p:sldId id="268" r:id="rId17"/>
+    <p:sldId id="263" r:id="rId18"/>
   </p:sldIdLst>
   <p:sldSz cx="12192000" cy="6858000"/>
   <p:notesSz cx="6858000" cy="9144000"/>
@@ -111,32 +120,773 @@
       </a:defRPr>
     </a:lvl9pPr>
   </p:defaultTextStyle>
+  <p:extLst>
+    <p:ext uri="{EFAFB233-063F-42B5-8137-9DF3F51BA10A}">
+      <p15:sldGuideLst xmlns:p15="http://schemas.microsoft.com/office/powerpoint/2012/main"/>
+    </p:ext>
+  </p:extLst>
 </p:presentation>
+</file>
+
+<file path=ppt/revisionInfo.xml><?xml version="1.0" encoding="utf-8"?>
+<p1510:revInfo xmlns:a="http://schemas.openxmlformats.org/drawingml/2006/main" xmlns:r="http://schemas.openxmlformats.org/officeDocument/2006/relationships" xmlns:p1510="http://schemas.microsoft.com/office/powerpoint/2015/10/main">
+  <p1510:revLst>
+    <p1510:client id="{FF688F30-8267-4759-92EF-AC87E68B1938}" v="51" dt="2023-07-18T22:03:30.446"/>
+  </p1510:revLst>
+</p1510:revInfo>
 </file>
 
 <file path=ppt/changesInfos/changesInfo1.xml><?xml version="1.0" encoding="utf-8"?>
 <pc:chgInfo xmlns:a="http://schemas.openxmlformats.org/drawingml/2006/main" xmlns:r="http://schemas.openxmlformats.org/officeDocument/2006/relationships" xmlns:ac="http://schemas.microsoft.com/office/drawing/2013/main/command" xmlns:pc="http://schemas.microsoft.com/office/powerpoint/2013/main/command">
   <pc:docChgLst>
     <pc:chgData name="Pien, Catarina L" userId="055f424c-5a88-4e6e-9e88-d4462ff2eeee" providerId="ADAL" clId="{FF688F30-8267-4759-92EF-AC87E68B1938}"/>
-    <pc:docChg chg="addSld modSld">
-      <pc:chgData name="Pien, Catarina L" userId="055f424c-5a88-4e6e-9e88-d4462ff2eeee" providerId="ADAL" clId="{FF688F30-8267-4759-92EF-AC87E68B1938}" dt="2023-07-17T23:07:21.271" v="13" actId="20577"/>
+    <pc:docChg chg="undo custSel addSld delSld modSld sldOrd">
+      <pc:chgData name="Pien, Catarina L" userId="055f424c-5a88-4e6e-9e88-d4462ff2eeee" providerId="ADAL" clId="{FF688F30-8267-4759-92EF-AC87E68B1938}" dt="2023-07-18T22:03:33.497" v="378" actId="1076"/>
       <pc:docMkLst>
         <pc:docMk/>
       </pc:docMkLst>
-      <pc:sldChg chg="modSp new mod">
-        <pc:chgData name="Pien, Catarina L" userId="055f424c-5a88-4e6e-9e88-d4462ff2eeee" providerId="ADAL" clId="{FF688F30-8267-4759-92EF-AC87E68B1938}" dt="2023-07-17T23:07:21.271" v="13" actId="20577"/>
+      <pc:sldChg chg="ord">
+        <pc:chgData name="Pien, Catarina L" userId="055f424c-5a88-4e6e-9e88-d4462ff2eeee" providerId="ADAL" clId="{FF688F30-8267-4759-92EF-AC87E68B1938}" dt="2023-07-18T20:55:00.311" v="15"/>
+        <pc:sldMkLst>
+          <pc:docMk/>
+          <pc:sldMk cId="3624297614" sldId="263"/>
+        </pc:sldMkLst>
+      </pc:sldChg>
+      <pc:sldChg chg="addSp delSp modSp new mod">
+        <pc:chgData name="Pien, Catarina L" userId="055f424c-5a88-4e6e-9e88-d4462ff2eeee" providerId="ADAL" clId="{FF688F30-8267-4759-92EF-AC87E68B1938}" dt="2023-07-18T21:05:30.192" v="71" actId="1076"/>
         <pc:sldMkLst>
           <pc:docMk/>
           <pc:sldMk cId="2806809707" sldId="264"/>
         </pc:sldMkLst>
         <pc:spChg chg="mod">
-          <ac:chgData name="Pien, Catarina L" userId="055f424c-5a88-4e6e-9e88-d4462ff2eeee" providerId="ADAL" clId="{FF688F30-8267-4759-92EF-AC87E68B1938}" dt="2023-07-17T23:07:21.271" v="13" actId="20577"/>
+          <ac:chgData name="Pien, Catarina L" userId="055f424c-5a88-4e6e-9e88-d4462ff2eeee" providerId="ADAL" clId="{FF688F30-8267-4759-92EF-AC87E68B1938}" dt="2023-07-18T20:55:14.300" v="36" actId="404"/>
           <ac:spMkLst>
             <pc:docMk/>
             <pc:sldMk cId="2806809707" sldId="264"/>
             <ac:spMk id="2" creationId="{45411D96-91BE-C68C-8793-151ECA24D968}"/>
           </ac:spMkLst>
         </pc:spChg>
+        <pc:spChg chg="del mod">
+          <ac:chgData name="Pien, Catarina L" userId="055f424c-5a88-4e6e-9e88-d4462ff2eeee" providerId="ADAL" clId="{FF688F30-8267-4759-92EF-AC87E68B1938}" dt="2023-07-18T21:04:29.162" v="40" actId="478"/>
+          <ac:spMkLst>
+            <pc:docMk/>
+            <pc:sldMk cId="2806809707" sldId="264"/>
+            <ac:spMk id="3" creationId="{24382230-B47C-53F5-6DFA-D4C323DA577D}"/>
+          </ac:spMkLst>
+        </pc:spChg>
+        <pc:spChg chg="add mod">
+          <ac:chgData name="Pien, Catarina L" userId="055f424c-5a88-4e6e-9e88-d4462ff2eeee" providerId="ADAL" clId="{FF688F30-8267-4759-92EF-AC87E68B1938}" dt="2023-07-18T21:05:30.192" v="71" actId="1076"/>
+          <ac:spMkLst>
+            <pc:docMk/>
+            <pc:sldMk cId="2806809707" sldId="264"/>
+            <ac:spMk id="5" creationId="{704D93DB-C32D-2522-2AEA-2CC80CE2FAF6}"/>
+          </ac:spMkLst>
+        </pc:spChg>
+        <pc:picChg chg="add mod">
+          <ac:chgData name="Pien, Catarina L" userId="055f424c-5a88-4e6e-9e88-d4462ff2eeee" providerId="ADAL" clId="{FF688F30-8267-4759-92EF-AC87E68B1938}" dt="2023-07-18T21:05:27.734" v="70" actId="1076"/>
+          <ac:picMkLst>
+            <pc:docMk/>
+            <pc:sldMk cId="2806809707" sldId="264"/>
+            <ac:picMk id="4" creationId="{16E9FA9E-BCCA-2E4B-86B7-CB0C68C54A3D}"/>
+          </ac:picMkLst>
+        </pc:picChg>
+      </pc:sldChg>
+      <pc:sldChg chg="addSp delSp modSp new del mod">
+        <pc:chgData name="Pien, Catarina L" userId="055f424c-5a88-4e6e-9e88-d4462ff2eeee" providerId="ADAL" clId="{FF688F30-8267-4759-92EF-AC87E68B1938}" dt="2023-07-18T21:59:57.819" v="328" actId="2696"/>
+        <pc:sldMkLst>
+          <pc:docMk/>
+          <pc:sldMk cId="1495429800" sldId="265"/>
+        </pc:sldMkLst>
+        <pc:spChg chg="mod">
+          <ac:chgData name="Pien, Catarina L" userId="055f424c-5a88-4e6e-9e88-d4462ff2eeee" providerId="ADAL" clId="{FF688F30-8267-4759-92EF-AC87E68B1938}" dt="2023-07-18T21:49:43.919" v="220" actId="1076"/>
+          <ac:spMkLst>
+            <pc:docMk/>
+            <pc:sldMk cId="1495429800" sldId="265"/>
+            <ac:spMk id="2" creationId="{35D1CFB4-6B3B-A24D-496D-61F77A311C0D}"/>
+          </ac:spMkLst>
+        </pc:spChg>
+        <pc:spChg chg="del">
+          <ac:chgData name="Pien, Catarina L" userId="055f424c-5a88-4e6e-9e88-d4462ff2eeee" providerId="ADAL" clId="{FF688F30-8267-4759-92EF-AC87E68B1938}" dt="2023-07-18T21:48:21.258" v="195" actId="478"/>
+          <ac:spMkLst>
+            <pc:docMk/>
+            <pc:sldMk cId="1495429800" sldId="265"/>
+            <ac:spMk id="3" creationId="{51C2B4C8-2349-BAC1-26D0-CEE730A5DF65}"/>
+          </ac:spMkLst>
+        </pc:spChg>
+        <pc:spChg chg="add mod">
+          <ac:chgData name="Pien, Catarina L" userId="055f424c-5a88-4e6e-9e88-d4462ff2eeee" providerId="ADAL" clId="{FF688F30-8267-4759-92EF-AC87E68B1938}" dt="2023-07-18T21:48:41.777" v="200" actId="1076"/>
+          <ac:spMkLst>
+            <pc:docMk/>
+            <pc:sldMk cId="1495429800" sldId="265"/>
+            <ac:spMk id="6" creationId="{C9C84A0F-F923-796A-A8DB-13B8E889B417}"/>
+          </ac:spMkLst>
+        </pc:spChg>
+        <pc:spChg chg="add mod">
+          <ac:chgData name="Pien, Catarina L" userId="055f424c-5a88-4e6e-9e88-d4462ff2eeee" providerId="ADAL" clId="{FF688F30-8267-4759-92EF-AC87E68B1938}" dt="2023-07-18T21:48:13.552" v="191" actId="1076"/>
+          <ac:spMkLst>
+            <pc:docMk/>
+            <pc:sldMk cId="1495429800" sldId="265"/>
+            <ac:spMk id="7" creationId="{3927DC66-0A9C-6E1F-1351-DD2D9218BB17}"/>
+          </ac:spMkLst>
+        </pc:spChg>
+        <pc:spChg chg="add mod">
+          <ac:chgData name="Pien, Catarina L" userId="055f424c-5a88-4e6e-9e88-d4462ff2eeee" providerId="ADAL" clId="{FF688F30-8267-4759-92EF-AC87E68B1938}" dt="2023-07-18T21:49:38.765" v="219"/>
+          <ac:spMkLst>
+            <pc:docMk/>
+            <pc:sldMk cId="1495429800" sldId="265"/>
+            <ac:spMk id="9" creationId="{1E0FDA2C-57EE-59D9-43F2-099A0FC9DA60}"/>
+          </ac:spMkLst>
+        </pc:spChg>
+        <pc:picChg chg="add mod">
+          <ac:chgData name="Pien, Catarina L" userId="055f424c-5a88-4e6e-9e88-d4462ff2eeee" providerId="ADAL" clId="{FF688F30-8267-4759-92EF-AC87E68B1938}" dt="2023-07-18T21:48:38.213" v="199" actId="1076"/>
+          <ac:picMkLst>
+            <pc:docMk/>
+            <pc:sldMk cId="1495429800" sldId="265"/>
+            <ac:picMk id="4" creationId="{7CEB76A2-637B-B8E2-6CB8-99E047948FF7}"/>
+          </ac:picMkLst>
+        </pc:picChg>
+        <pc:picChg chg="add mod">
+          <ac:chgData name="Pien, Catarina L" userId="055f424c-5a88-4e6e-9e88-d4462ff2eeee" providerId="ADAL" clId="{FF688F30-8267-4759-92EF-AC87E68B1938}" dt="2023-07-18T21:48:18.045" v="194" actId="1076"/>
+          <ac:picMkLst>
+            <pc:docMk/>
+            <pc:sldMk cId="1495429800" sldId="265"/>
+            <ac:picMk id="5" creationId="{061314B8-554A-D3E1-F9F4-998F5ABF6F2C}"/>
+          </ac:picMkLst>
+        </pc:picChg>
+        <pc:picChg chg="add mod">
+          <ac:chgData name="Pien, Catarina L" userId="055f424c-5a88-4e6e-9e88-d4462ff2eeee" providerId="ADAL" clId="{FF688F30-8267-4759-92EF-AC87E68B1938}" dt="2023-07-18T21:48:15.982" v="193" actId="1076"/>
+          <ac:picMkLst>
+            <pc:docMk/>
+            <pc:sldMk cId="1495429800" sldId="265"/>
+            <ac:picMk id="8" creationId="{FE664C89-D589-0347-2217-469E9E18B2F9}"/>
+          </ac:picMkLst>
+        </pc:picChg>
+      </pc:sldChg>
+      <pc:sldChg chg="add">
+        <pc:chgData name="Pien, Catarina L" userId="055f424c-5a88-4e6e-9e88-d4462ff2eeee" providerId="ADAL" clId="{FF688F30-8267-4759-92EF-AC87E68B1938}" dt="2023-07-18T21:59:59.926" v="329"/>
+        <pc:sldMkLst>
+          <pc:docMk/>
+          <pc:sldMk cId="4046760473" sldId="265"/>
+        </pc:sldMkLst>
+      </pc:sldChg>
+      <pc:sldChg chg="addSp delSp modSp new del mod">
+        <pc:chgData name="Pien, Catarina L" userId="055f424c-5a88-4e6e-9e88-d4462ff2eeee" providerId="ADAL" clId="{FF688F30-8267-4759-92EF-AC87E68B1938}" dt="2023-07-18T21:59:57.819" v="328" actId="2696"/>
+        <pc:sldMkLst>
+          <pc:docMk/>
+          <pc:sldMk cId="1878069136" sldId="266"/>
+        </pc:sldMkLst>
+        <pc:spChg chg="del">
+          <ac:chgData name="Pien, Catarina L" userId="055f424c-5a88-4e6e-9e88-d4462ff2eeee" providerId="ADAL" clId="{FF688F30-8267-4759-92EF-AC87E68B1938}" dt="2023-07-18T21:45:51.507" v="142" actId="478"/>
+          <ac:spMkLst>
+            <pc:docMk/>
+            <pc:sldMk cId="1878069136" sldId="266"/>
+            <ac:spMk id="2" creationId="{56A30587-89FC-B8E2-32EF-04704740D96B}"/>
+          </ac:spMkLst>
+        </pc:spChg>
+        <pc:spChg chg="del">
+          <ac:chgData name="Pien, Catarina L" userId="055f424c-5a88-4e6e-9e88-d4462ff2eeee" providerId="ADAL" clId="{FF688F30-8267-4759-92EF-AC87E68B1938}" dt="2023-07-18T21:49:24.867" v="210" actId="478"/>
+          <ac:spMkLst>
+            <pc:docMk/>
+            <pc:sldMk cId="1878069136" sldId="266"/>
+            <ac:spMk id="3" creationId="{6D3B8A27-03CC-27D3-9AF6-68A4C2B8BE51}"/>
+          </ac:spMkLst>
+        </pc:spChg>
+        <pc:spChg chg="add mod">
+          <ac:chgData name="Pien, Catarina L" userId="055f424c-5a88-4e6e-9e88-d4462ff2eeee" providerId="ADAL" clId="{FF688F30-8267-4759-92EF-AC87E68B1938}" dt="2023-07-18T21:48:58.729" v="201" actId="1076"/>
+          <ac:spMkLst>
+            <pc:docMk/>
+            <pc:sldMk cId="1878069136" sldId="266"/>
+            <ac:spMk id="9" creationId="{BF682709-69E1-D64C-E2E6-246C83C997B7}"/>
+          </ac:spMkLst>
+        </pc:spChg>
+        <pc:spChg chg="add mod">
+          <ac:chgData name="Pien, Catarina L" userId="055f424c-5a88-4e6e-9e88-d4462ff2eeee" providerId="ADAL" clId="{FF688F30-8267-4759-92EF-AC87E68B1938}" dt="2023-07-18T21:49:19.022" v="209" actId="1076"/>
+          <ac:spMkLst>
+            <pc:docMk/>
+            <pc:sldMk cId="1878069136" sldId="266"/>
+            <ac:spMk id="10" creationId="{54CB47FB-F5F9-ED08-821B-7AF4C48AAFCE}"/>
+          </ac:spMkLst>
+        </pc:spChg>
+        <pc:spChg chg="add del mod">
+          <ac:chgData name="Pien, Catarina L" userId="055f424c-5a88-4e6e-9e88-d4462ff2eeee" providerId="ADAL" clId="{FF688F30-8267-4759-92EF-AC87E68B1938}" dt="2023-07-18T21:47:03.905" v="160" actId="478"/>
+          <ac:spMkLst>
+            <pc:docMk/>
+            <pc:sldMk cId="1878069136" sldId="266"/>
+            <ac:spMk id="11" creationId="{784827A0-76F5-0DDE-F1D4-B973964A02EC}"/>
+          </ac:spMkLst>
+        </pc:spChg>
+        <pc:spChg chg="add mod">
+          <ac:chgData name="Pien, Catarina L" userId="055f424c-5a88-4e6e-9e88-d4462ff2eeee" providerId="ADAL" clId="{FF688F30-8267-4759-92EF-AC87E68B1938}" dt="2023-07-18T21:49:15.923" v="208" actId="1076"/>
+          <ac:spMkLst>
+            <pc:docMk/>
+            <pc:sldMk cId="1878069136" sldId="266"/>
+            <ac:spMk id="12" creationId="{0FD1B733-A17B-8287-7182-407C3DA1E09B}"/>
+          </ac:spMkLst>
+        </pc:spChg>
+        <pc:spChg chg="add mod">
+          <ac:chgData name="Pien, Catarina L" userId="055f424c-5a88-4e6e-9e88-d4462ff2eeee" providerId="ADAL" clId="{FF688F30-8267-4759-92EF-AC87E68B1938}" dt="2023-07-18T21:49:32.265" v="218" actId="20577"/>
+          <ac:spMkLst>
+            <pc:docMk/>
+            <pc:sldMk cId="1878069136" sldId="266"/>
+            <ac:spMk id="13" creationId="{1146637D-6BFC-E596-E843-88D63AD45F92}"/>
+          </ac:spMkLst>
+        </pc:spChg>
+        <pc:picChg chg="add del mod">
+          <ac:chgData name="Pien, Catarina L" userId="055f424c-5a88-4e6e-9e88-d4462ff2eeee" providerId="ADAL" clId="{FF688F30-8267-4759-92EF-AC87E68B1938}" dt="2023-07-18T21:44:41.851" v="124" actId="478"/>
+          <ac:picMkLst>
+            <pc:docMk/>
+            <pc:sldMk cId="1878069136" sldId="266"/>
+            <ac:picMk id="4" creationId="{8322743E-8CBA-2F9F-EC9E-B39C7C353B5A}"/>
+          </ac:picMkLst>
+        </pc:picChg>
+        <pc:picChg chg="add mod">
+          <ac:chgData name="Pien, Catarina L" userId="055f424c-5a88-4e6e-9e88-d4462ff2eeee" providerId="ADAL" clId="{FF688F30-8267-4759-92EF-AC87E68B1938}" dt="2023-07-18T21:49:11.362" v="206" actId="14100"/>
+          <ac:picMkLst>
+            <pc:docMk/>
+            <pc:sldMk cId="1878069136" sldId="266"/>
+            <ac:picMk id="5" creationId="{6E348895-CF5B-754A-BC48-DF30DA0297B7}"/>
+          </ac:picMkLst>
+        </pc:picChg>
+        <pc:picChg chg="add mod">
+          <ac:chgData name="Pien, Catarina L" userId="055f424c-5a88-4e6e-9e88-d4462ff2eeee" providerId="ADAL" clId="{FF688F30-8267-4759-92EF-AC87E68B1938}" dt="2023-07-18T21:49:08.373" v="205" actId="1076"/>
+          <ac:picMkLst>
+            <pc:docMk/>
+            <pc:sldMk cId="1878069136" sldId="266"/>
+            <ac:picMk id="6" creationId="{9D662AD9-C4D9-405B-8FAE-536464F9B108}"/>
+          </ac:picMkLst>
+        </pc:picChg>
+        <pc:picChg chg="add del mod">
+          <ac:chgData name="Pien, Catarina L" userId="055f424c-5a88-4e6e-9e88-d4462ff2eeee" providerId="ADAL" clId="{FF688F30-8267-4759-92EF-AC87E68B1938}" dt="2023-07-18T21:45:28.001" v="138" actId="478"/>
+          <ac:picMkLst>
+            <pc:docMk/>
+            <pc:sldMk cId="1878069136" sldId="266"/>
+            <ac:picMk id="7" creationId="{1C88FDE2-1D73-DA09-024A-CD88F2846962}"/>
+          </ac:picMkLst>
+        </pc:picChg>
+        <pc:picChg chg="add mod">
+          <ac:chgData name="Pien, Catarina L" userId="055f424c-5a88-4e6e-9e88-d4462ff2eeee" providerId="ADAL" clId="{FF688F30-8267-4759-92EF-AC87E68B1938}" dt="2023-07-18T21:49:03.192" v="203" actId="1076"/>
+          <ac:picMkLst>
+            <pc:docMk/>
+            <pc:sldMk cId="1878069136" sldId="266"/>
+            <ac:picMk id="8" creationId="{A7DC26E4-B2EC-8690-3B7F-13F54B9E9556}"/>
+          </ac:picMkLst>
+        </pc:picChg>
+      </pc:sldChg>
+      <pc:sldChg chg="add">
+        <pc:chgData name="Pien, Catarina L" userId="055f424c-5a88-4e6e-9e88-d4462ff2eeee" providerId="ADAL" clId="{FF688F30-8267-4759-92EF-AC87E68B1938}" dt="2023-07-18T21:59:59.926" v="329"/>
+        <pc:sldMkLst>
+          <pc:docMk/>
+          <pc:sldMk cId="1921078000" sldId="266"/>
+        </pc:sldMkLst>
+      </pc:sldChg>
+      <pc:sldChg chg="addSp delSp modSp add mod">
+        <pc:chgData name="Pien, Catarina L" userId="055f424c-5a88-4e6e-9e88-d4462ff2eeee" providerId="ADAL" clId="{FF688F30-8267-4759-92EF-AC87E68B1938}" dt="2023-07-18T21:55:10.448" v="279" actId="1037"/>
+        <pc:sldMkLst>
+          <pc:docMk/>
+          <pc:sldMk cId="2389441221" sldId="267"/>
+        </pc:sldMkLst>
+        <pc:spChg chg="mod">
+          <ac:chgData name="Pien, Catarina L" userId="055f424c-5a88-4e6e-9e88-d4462ff2eeee" providerId="ADAL" clId="{FF688F30-8267-4759-92EF-AC87E68B1938}" dt="2023-07-18T21:50:03.297" v="224" actId="20577"/>
+          <ac:spMkLst>
+            <pc:docMk/>
+            <pc:sldMk cId="2389441221" sldId="267"/>
+            <ac:spMk id="2" creationId="{35D1CFB4-6B3B-A24D-496D-61F77A311C0D}"/>
+          </ac:spMkLst>
+        </pc:spChg>
+        <pc:spChg chg="mod">
+          <ac:chgData name="Pien, Catarina L" userId="055f424c-5a88-4e6e-9e88-d4462ff2eeee" providerId="ADAL" clId="{FF688F30-8267-4759-92EF-AC87E68B1938}" dt="2023-07-18T21:54:28.099" v="259" actId="20577"/>
+          <ac:spMkLst>
+            <pc:docMk/>
+            <pc:sldMk cId="2389441221" sldId="267"/>
+            <ac:spMk id="6" creationId="{C9C84A0F-F923-796A-A8DB-13B8E889B417}"/>
+          </ac:spMkLst>
+        </pc:spChg>
+        <pc:spChg chg="mod ord">
+          <ac:chgData name="Pien, Catarina L" userId="055f424c-5a88-4e6e-9e88-d4462ff2eeee" providerId="ADAL" clId="{FF688F30-8267-4759-92EF-AC87E68B1938}" dt="2023-07-18T21:55:07.542" v="273" actId="1076"/>
+          <ac:spMkLst>
+            <pc:docMk/>
+            <pc:sldMk cId="2389441221" sldId="267"/>
+            <ac:spMk id="7" creationId="{3927DC66-0A9C-6E1F-1351-DD2D9218BB17}"/>
+          </ac:spMkLst>
+        </pc:spChg>
+        <pc:picChg chg="add mod">
+          <ac:chgData name="Pien, Catarina L" userId="055f424c-5a88-4e6e-9e88-d4462ff2eeee" providerId="ADAL" clId="{FF688F30-8267-4759-92EF-AC87E68B1938}" dt="2023-07-18T21:54:40.355" v="263" actId="14100"/>
+          <ac:picMkLst>
+            <pc:docMk/>
+            <pc:sldMk cId="2389441221" sldId="267"/>
+            <ac:picMk id="3" creationId="{B0378381-121A-58FC-6540-A6B534FFCE03}"/>
+          </ac:picMkLst>
+        </pc:picChg>
+        <pc:picChg chg="del">
+          <ac:chgData name="Pien, Catarina L" userId="055f424c-5a88-4e6e-9e88-d4462ff2eeee" providerId="ADAL" clId="{FF688F30-8267-4759-92EF-AC87E68B1938}" dt="2023-07-18T21:54:34.169" v="260" actId="478"/>
+          <ac:picMkLst>
+            <pc:docMk/>
+            <pc:sldMk cId="2389441221" sldId="267"/>
+            <ac:picMk id="4" creationId="{7CEB76A2-637B-B8E2-6CB8-99E047948FF7}"/>
+          </ac:picMkLst>
+        </pc:picChg>
+        <pc:picChg chg="del mod">
+          <ac:chgData name="Pien, Catarina L" userId="055f424c-5a88-4e6e-9e88-d4462ff2eeee" providerId="ADAL" clId="{FF688F30-8267-4759-92EF-AC87E68B1938}" dt="2023-07-18T21:54:52.887" v="268" actId="478"/>
+          <ac:picMkLst>
+            <pc:docMk/>
+            <pc:sldMk cId="2389441221" sldId="267"/>
+            <ac:picMk id="5" creationId="{061314B8-554A-D3E1-F9F4-998F5ABF6F2C}"/>
+          </ac:picMkLst>
+        </pc:picChg>
+        <pc:picChg chg="del mod">
+          <ac:chgData name="Pien, Catarina L" userId="055f424c-5a88-4e6e-9e88-d4462ff2eeee" providerId="ADAL" clId="{FF688F30-8267-4759-92EF-AC87E68B1938}" dt="2023-07-18T21:54:42.920" v="264" actId="478"/>
+          <ac:picMkLst>
+            <pc:docMk/>
+            <pc:sldMk cId="2389441221" sldId="267"/>
+            <ac:picMk id="8" creationId="{FE664C89-D589-0347-2217-469E9E18B2F9}"/>
+          </ac:picMkLst>
+        </pc:picChg>
+        <pc:picChg chg="add mod">
+          <ac:chgData name="Pien, Catarina L" userId="055f424c-5a88-4e6e-9e88-d4462ff2eeee" providerId="ADAL" clId="{FF688F30-8267-4759-92EF-AC87E68B1938}" dt="2023-07-18T21:54:51.802" v="267" actId="14100"/>
+          <ac:picMkLst>
+            <pc:docMk/>
+            <pc:sldMk cId="2389441221" sldId="267"/>
+            <ac:picMk id="10" creationId="{78F7F509-4CBC-08A3-8EE2-8B07D9BF60D6}"/>
+          </ac:picMkLst>
+        </pc:picChg>
+        <pc:picChg chg="add mod">
+          <ac:chgData name="Pien, Catarina L" userId="055f424c-5a88-4e6e-9e88-d4462ff2eeee" providerId="ADAL" clId="{FF688F30-8267-4759-92EF-AC87E68B1938}" dt="2023-07-18T21:55:10.448" v="279" actId="1037"/>
+          <ac:picMkLst>
+            <pc:docMk/>
+            <pc:sldMk cId="2389441221" sldId="267"/>
+            <ac:picMk id="11" creationId="{F236008F-DB1A-672C-3C19-B64A7C5BB81F}"/>
+          </ac:picMkLst>
+        </pc:picChg>
+      </pc:sldChg>
+      <pc:sldChg chg="addSp delSp modSp add mod">
+        <pc:chgData name="Pien, Catarina L" userId="055f424c-5a88-4e6e-9e88-d4462ff2eeee" providerId="ADAL" clId="{FF688F30-8267-4759-92EF-AC87E68B1938}" dt="2023-07-18T21:51:26.330" v="248" actId="478"/>
+        <pc:sldMkLst>
+          <pc:docMk/>
+          <pc:sldMk cId="2044165108" sldId="268"/>
+        </pc:sldMkLst>
+        <pc:spChg chg="mod">
+          <ac:chgData name="Pien, Catarina L" userId="055f424c-5a88-4e6e-9e88-d4462ff2eeee" providerId="ADAL" clId="{FF688F30-8267-4759-92EF-AC87E68B1938}" dt="2023-07-18T21:51:15.698" v="246" actId="20577"/>
+          <ac:spMkLst>
+            <pc:docMk/>
+            <pc:sldMk cId="2044165108" sldId="268"/>
+            <ac:spMk id="6" creationId="{C9C84A0F-F923-796A-A8DB-13B8E889B417}"/>
+          </ac:spMkLst>
+        </pc:spChg>
+        <pc:picChg chg="add del mod">
+          <ac:chgData name="Pien, Catarina L" userId="055f424c-5a88-4e6e-9e88-d4462ff2eeee" providerId="ADAL" clId="{FF688F30-8267-4759-92EF-AC87E68B1938}" dt="2023-07-18T21:50:26.804" v="228" actId="478"/>
+          <ac:picMkLst>
+            <pc:docMk/>
+            <pc:sldMk cId="2044165108" sldId="268"/>
+            <ac:picMk id="3" creationId="{C1B2CA2A-A4E4-B0D5-1EF1-C4AC1393AA53}"/>
+          </ac:picMkLst>
+        </pc:picChg>
+        <pc:picChg chg="del">
+          <ac:chgData name="Pien, Catarina L" userId="055f424c-5a88-4e6e-9e88-d4462ff2eeee" providerId="ADAL" clId="{FF688F30-8267-4759-92EF-AC87E68B1938}" dt="2023-07-18T21:50:23.980" v="226" actId="478"/>
+          <ac:picMkLst>
+            <pc:docMk/>
+            <pc:sldMk cId="2044165108" sldId="268"/>
+            <ac:picMk id="4" creationId="{7CEB76A2-637B-B8E2-6CB8-99E047948FF7}"/>
+          </ac:picMkLst>
+        </pc:picChg>
+        <pc:picChg chg="del">
+          <ac:chgData name="Pien, Catarina L" userId="055f424c-5a88-4e6e-9e88-d4462ff2eeee" providerId="ADAL" clId="{FF688F30-8267-4759-92EF-AC87E68B1938}" dt="2023-07-18T21:50:45.569" v="236" actId="478"/>
+          <ac:picMkLst>
+            <pc:docMk/>
+            <pc:sldMk cId="2044165108" sldId="268"/>
+            <ac:picMk id="5" creationId="{061314B8-554A-D3E1-F9F4-998F5ABF6F2C}"/>
+          </ac:picMkLst>
+        </pc:picChg>
+        <pc:picChg chg="del">
+          <ac:chgData name="Pien, Catarina L" userId="055f424c-5a88-4e6e-9e88-d4462ff2eeee" providerId="ADAL" clId="{FF688F30-8267-4759-92EF-AC87E68B1938}" dt="2023-07-18T21:50:36.281" v="232" actId="478"/>
+          <ac:picMkLst>
+            <pc:docMk/>
+            <pc:sldMk cId="2044165108" sldId="268"/>
+            <ac:picMk id="8" creationId="{FE664C89-D589-0347-2217-469E9E18B2F9}"/>
+          </ac:picMkLst>
+        </pc:picChg>
+        <pc:picChg chg="add mod">
+          <ac:chgData name="Pien, Catarina L" userId="055f424c-5a88-4e6e-9e88-d4462ff2eeee" providerId="ADAL" clId="{FF688F30-8267-4759-92EF-AC87E68B1938}" dt="2023-07-18T21:50:34.951" v="231" actId="14100"/>
+          <ac:picMkLst>
+            <pc:docMk/>
+            <pc:sldMk cId="2044165108" sldId="268"/>
+            <ac:picMk id="10" creationId="{A763625D-09EC-71D4-EFF1-3357C390DACD}"/>
+          </ac:picMkLst>
+        </pc:picChg>
+        <pc:picChg chg="add mod">
+          <ac:chgData name="Pien, Catarina L" userId="055f424c-5a88-4e6e-9e88-d4462ff2eeee" providerId="ADAL" clId="{FF688F30-8267-4759-92EF-AC87E68B1938}" dt="2023-07-18T21:50:44.556" v="235" actId="14100"/>
+          <ac:picMkLst>
+            <pc:docMk/>
+            <pc:sldMk cId="2044165108" sldId="268"/>
+            <ac:picMk id="11" creationId="{B68CFEAF-A051-EC6E-9ECC-5D58D852EA00}"/>
+          </ac:picMkLst>
+        </pc:picChg>
+        <pc:picChg chg="add mod">
+          <ac:chgData name="Pien, Catarina L" userId="055f424c-5a88-4e6e-9e88-d4462ff2eeee" providerId="ADAL" clId="{FF688F30-8267-4759-92EF-AC87E68B1938}" dt="2023-07-18T21:50:56.590" v="239" actId="14100"/>
+          <ac:picMkLst>
+            <pc:docMk/>
+            <pc:sldMk cId="2044165108" sldId="268"/>
+            <ac:picMk id="12" creationId="{FF9FC845-BFCF-324C-F1E7-5C9AF9F6553F}"/>
+          </ac:picMkLst>
+        </pc:picChg>
+        <pc:picChg chg="add del mod">
+          <ac:chgData name="Pien, Catarina L" userId="055f424c-5a88-4e6e-9e88-d4462ff2eeee" providerId="ADAL" clId="{FF688F30-8267-4759-92EF-AC87E68B1938}" dt="2023-07-18T21:51:26.330" v="248" actId="478"/>
+          <ac:picMkLst>
+            <pc:docMk/>
+            <pc:sldMk cId="2044165108" sldId="268"/>
+            <ac:picMk id="13" creationId="{3D26C9CD-E88F-96D3-650E-46BB7F3E23E2}"/>
+          </ac:picMkLst>
+        </pc:picChg>
+      </pc:sldChg>
+      <pc:sldChg chg="new del">
+        <pc:chgData name="Pien, Catarina L" userId="055f424c-5a88-4e6e-9e88-d4462ff2eeee" providerId="ADAL" clId="{FF688F30-8267-4759-92EF-AC87E68B1938}" dt="2023-07-18T21:55:40.173" v="282" actId="47"/>
+        <pc:sldMkLst>
+          <pc:docMk/>
+          <pc:sldMk cId="2937222251" sldId="269"/>
+        </pc:sldMkLst>
+      </pc:sldChg>
+      <pc:sldChg chg="add del">
+        <pc:chgData name="Pien, Catarina L" userId="055f424c-5a88-4e6e-9e88-d4462ff2eeee" providerId="ADAL" clId="{FF688F30-8267-4759-92EF-AC87E68B1938}" dt="2023-07-18T21:59:42.935" v="325" actId="47"/>
+        <pc:sldMkLst>
+          <pc:docMk/>
+          <pc:sldMk cId="3287146431" sldId="270"/>
+        </pc:sldMkLst>
+      </pc:sldChg>
+      <pc:sldChg chg="addSp delSp modSp add mod ord">
+        <pc:chgData name="Pien, Catarina L" userId="055f424c-5a88-4e6e-9e88-d4462ff2eeee" providerId="ADAL" clId="{FF688F30-8267-4759-92EF-AC87E68B1938}" dt="2023-07-18T21:59:47.624" v="327"/>
+        <pc:sldMkLst>
+          <pc:docMk/>
+          <pc:sldMk cId="1571644646" sldId="271"/>
+        </pc:sldMkLst>
+        <pc:spChg chg="mod">
+          <ac:chgData name="Pien, Catarina L" userId="055f424c-5a88-4e6e-9e88-d4462ff2eeee" providerId="ADAL" clId="{FF688F30-8267-4759-92EF-AC87E68B1938}" dt="2023-07-18T21:56:36.713" v="301" actId="20577"/>
+          <ac:spMkLst>
+            <pc:docMk/>
+            <pc:sldMk cId="1571644646" sldId="271"/>
+            <ac:spMk id="6" creationId="{C9C84A0F-F923-796A-A8DB-13B8E889B417}"/>
+          </ac:spMkLst>
+        </pc:spChg>
+        <pc:picChg chg="add mod">
+          <ac:chgData name="Pien, Catarina L" userId="055f424c-5a88-4e6e-9e88-d4462ff2eeee" providerId="ADAL" clId="{FF688F30-8267-4759-92EF-AC87E68B1938}" dt="2023-07-18T21:55:56.399" v="287" actId="14100"/>
+          <ac:picMkLst>
+            <pc:docMk/>
+            <pc:sldMk cId="1571644646" sldId="271"/>
+            <ac:picMk id="3" creationId="{BC4E1979-6786-22A5-B49E-FB87AEB870E7}"/>
+          </ac:picMkLst>
+        </pc:picChg>
+        <pc:picChg chg="add mod">
+          <ac:chgData name="Pien, Catarina L" userId="055f424c-5a88-4e6e-9e88-d4462ff2eeee" providerId="ADAL" clId="{FF688F30-8267-4759-92EF-AC87E68B1938}" dt="2023-07-18T21:56:05.266" v="291" actId="14100"/>
+          <ac:picMkLst>
+            <pc:docMk/>
+            <pc:sldMk cId="1571644646" sldId="271"/>
+            <ac:picMk id="4" creationId="{F8BCD1EB-656E-FEC2-9747-50CB4F9643B0}"/>
+          </ac:picMkLst>
+        </pc:picChg>
+        <pc:picChg chg="add mod">
+          <ac:chgData name="Pien, Catarina L" userId="055f424c-5a88-4e6e-9e88-d4462ff2eeee" providerId="ADAL" clId="{FF688F30-8267-4759-92EF-AC87E68B1938}" dt="2023-07-18T21:56:15.519" v="295" actId="14100"/>
+          <ac:picMkLst>
+            <pc:docMk/>
+            <pc:sldMk cId="1571644646" sldId="271"/>
+            <ac:picMk id="5" creationId="{8C595270-114F-9E13-491C-B593A81C39A3}"/>
+          </ac:picMkLst>
+        </pc:picChg>
+        <pc:picChg chg="del">
+          <ac:chgData name="Pien, Catarina L" userId="055f424c-5a88-4e6e-9e88-d4462ff2eeee" providerId="ADAL" clId="{FF688F30-8267-4759-92EF-AC87E68B1938}" dt="2023-07-18T21:55:49.608" v="284" actId="478"/>
+          <ac:picMkLst>
+            <pc:docMk/>
+            <pc:sldMk cId="1571644646" sldId="271"/>
+            <ac:picMk id="10" creationId="{A763625D-09EC-71D4-EFF1-3357C390DACD}"/>
+          </ac:picMkLst>
+        </pc:picChg>
+        <pc:picChg chg="del">
+          <ac:chgData name="Pien, Catarina L" userId="055f424c-5a88-4e6e-9e88-d4462ff2eeee" providerId="ADAL" clId="{FF688F30-8267-4759-92EF-AC87E68B1938}" dt="2023-07-18T21:55:57.743" v="288" actId="478"/>
+          <ac:picMkLst>
+            <pc:docMk/>
+            <pc:sldMk cId="1571644646" sldId="271"/>
+            <ac:picMk id="11" creationId="{B68CFEAF-A051-EC6E-9ECC-5D58D852EA00}"/>
+          </ac:picMkLst>
+        </pc:picChg>
+        <pc:picChg chg="del">
+          <ac:chgData name="Pien, Catarina L" userId="055f424c-5a88-4e6e-9e88-d4462ff2eeee" providerId="ADAL" clId="{FF688F30-8267-4759-92EF-AC87E68B1938}" dt="2023-07-18T21:56:06.210" v="292" actId="478"/>
+          <ac:picMkLst>
+            <pc:docMk/>
+            <pc:sldMk cId="1571644646" sldId="271"/>
+            <ac:picMk id="12" creationId="{FF9FC845-BFCF-324C-F1E7-5C9AF9F6553F}"/>
+          </ac:picMkLst>
+        </pc:picChg>
+      </pc:sldChg>
+      <pc:sldChg chg="new del">
+        <pc:chgData name="Pien, Catarina L" userId="055f424c-5a88-4e6e-9e88-d4462ff2eeee" providerId="ADAL" clId="{FF688F30-8267-4759-92EF-AC87E68B1938}" dt="2023-07-18T21:58:22.589" v="304" actId="47"/>
+        <pc:sldMkLst>
+          <pc:docMk/>
+          <pc:sldMk cId="2278584410" sldId="272"/>
+        </pc:sldMkLst>
+      </pc:sldChg>
+      <pc:sldChg chg="addSp delSp modSp add mod ord">
+        <pc:chgData name="Pien, Catarina L" userId="055f424c-5a88-4e6e-9e88-d4462ff2eeee" providerId="ADAL" clId="{FF688F30-8267-4759-92EF-AC87E68B1938}" dt="2023-07-18T21:59:40.393" v="324"/>
+        <pc:sldMkLst>
+          <pc:docMk/>
+          <pc:sldMk cId="2008240708" sldId="273"/>
+        </pc:sldMkLst>
+        <pc:spChg chg="mod">
+          <ac:chgData name="Pien, Catarina L" userId="055f424c-5a88-4e6e-9e88-d4462ff2eeee" providerId="ADAL" clId="{FF688F30-8267-4759-92EF-AC87E68B1938}" dt="2023-07-18T21:59:26.442" v="322" actId="20577"/>
+          <ac:spMkLst>
+            <pc:docMk/>
+            <pc:sldMk cId="2008240708" sldId="273"/>
+            <ac:spMk id="6" creationId="{C9C84A0F-F923-796A-A8DB-13B8E889B417}"/>
+          </ac:spMkLst>
+        </pc:spChg>
+        <pc:picChg chg="add del mod">
+          <ac:chgData name="Pien, Catarina L" userId="055f424c-5a88-4e6e-9e88-d4462ff2eeee" providerId="ADAL" clId="{FF688F30-8267-4759-92EF-AC87E68B1938}" dt="2023-07-18T21:58:41.056" v="308" actId="478"/>
+          <ac:picMkLst>
+            <pc:docMk/>
+            <pc:sldMk cId="2008240708" sldId="273"/>
+            <ac:picMk id="3" creationId="{E5CD48AC-7880-2C4F-BD75-A4B8FC911531}"/>
+          </ac:picMkLst>
+        </pc:picChg>
+        <pc:picChg chg="add mod">
+          <ac:chgData name="Pien, Catarina L" userId="055f424c-5a88-4e6e-9e88-d4462ff2eeee" providerId="ADAL" clId="{FF688F30-8267-4759-92EF-AC87E68B1938}" dt="2023-07-18T21:58:44.116" v="310" actId="1076"/>
+          <ac:picMkLst>
+            <pc:docMk/>
+            <pc:sldMk cId="2008240708" sldId="273"/>
+            <ac:picMk id="4" creationId="{A3B2D16C-2748-1E3B-AC56-2B5FEFB17854}"/>
+          </ac:picMkLst>
+        </pc:picChg>
+        <pc:picChg chg="add mod">
+          <ac:chgData name="Pien, Catarina L" userId="055f424c-5a88-4e6e-9e88-d4462ff2eeee" providerId="ADAL" clId="{FF688F30-8267-4759-92EF-AC87E68B1938}" dt="2023-07-18T21:58:50.152" v="313" actId="1076"/>
+          <ac:picMkLst>
+            <pc:docMk/>
+            <pc:sldMk cId="2008240708" sldId="273"/>
+            <ac:picMk id="5" creationId="{514B79AF-B1B7-249F-C042-5B1386FB2692}"/>
+          </ac:picMkLst>
+        </pc:picChg>
+        <pc:picChg chg="add mod">
+          <ac:chgData name="Pien, Catarina L" userId="055f424c-5a88-4e6e-9e88-d4462ff2eeee" providerId="ADAL" clId="{FF688F30-8267-4759-92EF-AC87E68B1938}" dt="2023-07-18T21:58:57.327" v="316" actId="1076"/>
+          <ac:picMkLst>
+            <pc:docMk/>
+            <pc:sldMk cId="2008240708" sldId="273"/>
+            <ac:picMk id="8" creationId="{FCD8F6F2-EDB9-FB0E-EA85-B460117BCAED}"/>
+          </ac:picMkLst>
+        </pc:picChg>
+        <pc:picChg chg="del">
+          <ac:chgData name="Pien, Catarina L" userId="055f424c-5a88-4e6e-9e88-d4462ff2eeee" providerId="ADAL" clId="{FF688F30-8267-4759-92EF-AC87E68B1938}" dt="2023-07-18T21:58:26.311" v="305" actId="478"/>
+          <ac:picMkLst>
+            <pc:docMk/>
+            <pc:sldMk cId="2008240708" sldId="273"/>
+            <ac:picMk id="10" creationId="{A763625D-09EC-71D4-EFF1-3357C390DACD}"/>
+          </ac:picMkLst>
+        </pc:picChg>
+        <pc:picChg chg="del">
+          <ac:chgData name="Pien, Catarina L" userId="055f424c-5a88-4e6e-9e88-d4462ff2eeee" providerId="ADAL" clId="{FF688F30-8267-4759-92EF-AC87E68B1938}" dt="2023-07-18T21:58:45.095" v="311" actId="478"/>
+          <ac:picMkLst>
+            <pc:docMk/>
+            <pc:sldMk cId="2008240708" sldId="273"/>
+            <ac:picMk id="11" creationId="{B68CFEAF-A051-EC6E-9ECC-5D58D852EA00}"/>
+          </ac:picMkLst>
+        </pc:picChg>
+        <pc:picChg chg="del">
+          <ac:chgData name="Pien, Catarina L" userId="055f424c-5a88-4e6e-9e88-d4462ff2eeee" providerId="ADAL" clId="{FF688F30-8267-4759-92EF-AC87E68B1938}" dt="2023-07-18T21:58:51.103" v="314" actId="478"/>
+          <ac:picMkLst>
+            <pc:docMk/>
+            <pc:sldMk cId="2008240708" sldId="273"/>
+            <ac:picMk id="12" creationId="{FF9FC845-BFCF-324C-F1E7-5C9AF9F6553F}"/>
+          </ac:picMkLst>
+        </pc:picChg>
+      </pc:sldChg>
+      <pc:sldChg chg="addSp delSp modSp add mod">
+        <pc:chgData name="Pien, Catarina L" userId="055f424c-5a88-4e6e-9e88-d4462ff2eeee" providerId="ADAL" clId="{FF688F30-8267-4759-92EF-AC87E68B1938}" dt="2023-07-18T22:01:03.714" v="347" actId="1076"/>
+        <pc:sldMkLst>
+          <pc:docMk/>
+          <pc:sldMk cId="1583880285" sldId="274"/>
+        </pc:sldMkLst>
+        <pc:spChg chg="mod">
+          <ac:chgData name="Pien, Catarina L" userId="055f424c-5a88-4e6e-9e88-d4462ff2eeee" providerId="ADAL" clId="{FF688F30-8267-4759-92EF-AC87E68B1938}" dt="2023-07-18T22:00:36.352" v="338" actId="20577"/>
+          <ac:spMkLst>
+            <pc:docMk/>
+            <pc:sldMk cId="1583880285" sldId="274"/>
+            <ac:spMk id="6" creationId="{C9C84A0F-F923-796A-A8DB-13B8E889B417}"/>
+          </ac:spMkLst>
+        </pc:spChg>
+        <pc:picChg chg="del">
+          <ac:chgData name="Pien, Catarina L" userId="055f424c-5a88-4e6e-9e88-d4462ff2eeee" providerId="ADAL" clId="{FF688F30-8267-4759-92EF-AC87E68B1938}" dt="2023-07-18T22:00:47.888" v="339" actId="478"/>
+          <ac:picMkLst>
+            <pc:docMk/>
+            <pc:sldMk cId="1583880285" sldId="274"/>
+            <ac:picMk id="3" creationId="{B0378381-121A-58FC-6540-A6B534FFCE03}"/>
+          </ac:picMkLst>
+        </pc:picChg>
+        <pc:picChg chg="add mod">
+          <ac:chgData name="Pien, Catarina L" userId="055f424c-5a88-4e6e-9e88-d4462ff2eeee" providerId="ADAL" clId="{FF688F30-8267-4759-92EF-AC87E68B1938}" dt="2023-07-18T22:00:50.119" v="341" actId="1076"/>
+          <ac:picMkLst>
+            <pc:docMk/>
+            <pc:sldMk cId="1583880285" sldId="274"/>
+            <ac:picMk id="4" creationId="{C22D5395-0143-B90A-DD52-8396CECAC238}"/>
+          </ac:picMkLst>
+        </pc:picChg>
+        <pc:picChg chg="add mod">
+          <ac:chgData name="Pien, Catarina L" userId="055f424c-5a88-4e6e-9e88-d4462ff2eeee" providerId="ADAL" clId="{FF688F30-8267-4759-92EF-AC87E68B1938}" dt="2023-07-18T22:00:57.250" v="344" actId="1076"/>
+          <ac:picMkLst>
+            <pc:docMk/>
+            <pc:sldMk cId="1583880285" sldId="274"/>
+            <ac:picMk id="5" creationId="{98C923AA-A37A-6F94-48AD-0992A6026F97}"/>
+          </ac:picMkLst>
+        </pc:picChg>
+        <pc:picChg chg="add mod">
+          <ac:chgData name="Pien, Catarina L" userId="055f424c-5a88-4e6e-9e88-d4462ff2eeee" providerId="ADAL" clId="{FF688F30-8267-4759-92EF-AC87E68B1938}" dt="2023-07-18T22:01:03.714" v="347" actId="1076"/>
+          <ac:picMkLst>
+            <pc:docMk/>
+            <pc:sldMk cId="1583880285" sldId="274"/>
+            <ac:picMk id="8" creationId="{FD69CBF5-1CA3-B62C-6F61-84FCADDE2428}"/>
+          </ac:picMkLst>
+        </pc:picChg>
+        <pc:picChg chg="del">
+          <ac:chgData name="Pien, Catarina L" userId="055f424c-5a88-4e6e-9e88-d4462ff2eeee" providerId="ADAL" clId="{FF688F30-8267-4759-92EF-AC87E68B1938}" dt="2023-07-18T22:00:54.839" v="342" actId="478"/>
+          <ac:picMkLst>
+            <pc:docMk/>
+            <pc:sldMk cId="1583880285" sldId="274"/>
+            <ac:picMk id="10" creationId="{78F7F509-4CBC-08A3-8EE2-8B07D9BF60D6}"/>
+          </ac:picMkLst>
+        </pc:picChg>
+        <pc:picChg chg="del">
+          <ac:chgData name="Pien, Catarina L" userId="055f424c-5a88-4e6e-9e88-d4462ff2eeee" providerId="ADAL" clId="{FF688F30-8267-4759-92EF-AC87E68B1938}" dt="2023-07-18T22:00:58.334" v="345" actId="478"/>
+          <ac:picMkLst>
+            <pc:docMk/>
+            <pc:sldMk cId="1583880285" sldId="274"/>
+            <ac:picMk id="11" creationId="{F236008F-DB1A-672C-3C19-B64A7C5BB81F}"/>
+          </ac:picMkLst>
+        </pc:picChg>
+      </pc:sldChg>
+      <pc:sldChg chg="new del">
+        <pc:chgData name="Pien, Catarina L" userId="055f424c-5a88-4e6e-9e88-d4462ff2eeee" providerId="ADAL" clId="{FF688F30-8267-4759-92EF-AC87E68B1938}" dt="2023-07-18T22:01:50.950" v="350" actId="47"/>
+        <pc:sldMkLst>
+          <pc:docMk/>
+          <pc:sldMk cId="1744287655" sldId="275"/>
+        </pc:sldMkLst>
+      </pc:sldChg>
+      <pc:sldChg chg="addSp delSp modSp add mod">
+        <pc:chgData name="Pien, Catarina L" userId="055f424c-5a88-4e6e-9e88-d4462ff2eeee" providerId="ADAL" clId="{FF688F30-8267-4759-92EF-AC87E68B1938}" dt="2023-07-18T22:02:37.381" v="365" actId="1076"/>
+        <pc:sldMkLst>
+          <pc:docMk/>
+          <pc:sldMk cId="3601026263" sldId="276"/>
+        </pc:sldMkLst>
+        <pc:spChg chg="mod ord">
+          <ac:chgData name="Pien, Catarina L" userId="055f424c-5a88-4e6e-9e88-d4462ff2eeee" providerId="ADAL" clId="{FF688F30-8267-4759-92EF-AC87E68B1938}" dt="2023-07-18T22:02:01.993" v="356" actId="20577"/>
+          <ac:spMkLst>
+            <pc:docMk/>
+            <pc:sldMk cId="3601026263" sldId="276"/>
+            <ac:spMk id="10" creationId="{54CB47FB-F5F9-ED08-821B-7AF4C48AAFCE}"/>
+          </ac:spMkLst>
+        </pc:spChg>
+        <pc:picChg chg="add mod">
+          <ac:chgData name="Pien, Catarina L" userId="055f424c-5a88-4e6e-9e88-d4462ff2eeee" providerId="ADAL" clId="{FF688F30-8267-4759-92EF-AC87E68B1938}" dt="2023-07-18T22:02:26.233" v="359" actId="1076"/>
+          <ac:picMkLst>
+            <pc:docMk/>
+            <pc:sldMk cId="3601026263" sldId="276"/>
+            <ac:picMk id="2" creationId="{76E0356B-D97D-A063-0FDA-9B4D8C0B5D1B}"/>
+          </ac:picMkLst>
+        </pc:picChg>
+        <pc:picChg chg="add mod">
+          <ac:chgData name="Pien, Catarina L" userId="055f424c-5a88-4e6e-9e88-d4462ff2eeee" providerId="ADAL" clId="{FF688F30-8267-4759-92EF-AC87E68B1938}" dt="2023-07-18T22:02:32.152" v="362" actId="1076"/>
+          <ac:picMkLst>
+            <pc:docMk/>
+            <pc:sldMk cId="3601026263" sldId="276"/>
+            <ac:picMk id="3" creationId="{15C6D720-7468-60E2-B782-72A7ED970AEF}"/>
+          </ac:picMkLst>
+        </pc:picChg>
+        <pc:picChg chg="add mod">
+          <ac:chgData name="Pien, Catarina L" userId="055f424c-5a88-4e6e-9e88-d4462ff2eeee" providerId="ADAL" clId="{FF688F30-8267-4759-92EF-AC87E68B1938}" dt="2023-07-18T22:02:37.381" v="365" actId="1076"/>
+          <ac:picMkLst>
+            <pc:docMk/>
+            <pc:sldMk cId="3601026263" sldId="276"/>
+            <ac:picMk id="4" creationId="{03DCFD95-C68B-379A-A5F3-D938729CBB5B}"/>
+          </ac:picMkLst>
+        </pc:picChg>
+        <pc:picChg chg="del">
+          <ac:chgData name="Pien, Catarina L" userId="055f424c-5a88-4e6e-9e88-d4462ff2eeee" providerId="ADAL" clId="{FF688F30-8267-4759-92EF-AC87E68B1938}" dt="2023-07-18T22:02:23.391" v="357" actId="478"/>
+          <ac:picMkLst>
+            <pc:docMk/>
+            <pc:sldMk cId="3601026263" sldId="276"/>
+            <ac:picMk id="5" creationId="{6E348895-CF5B-754A-BC48-DF30DA0297B7}"/>
+          </ac:picMkLst>
+        </pc:picChg>
+        <pc:picChg chg="del">
+          <ac:chgData name="Pien, Catarina L" userId="055f424c-5a88-4e6e-9e88-d4462ff2eeee" providerId="ADAL" clId="{FF688F30-8267-4759-92EF-AC87E68B1938}" dt="2023-07-18T22:02:27.128" v="360" actId="478"/>
+          <ac:picMkLst>
+            <pc:docMk/>
+            <pc:sldMk cId="3601026263" sldId="276"/>
+            <ac:picMk id="6" creationId="{9D662AD9-C4D9-405B-8FAE-536464F9B108}"/>
+          </ac:picMkLst>
+        </pc:picChg>
+        <pc:picChg chg="del">
+          <ac:chgData name="Pien, Catarina L" userId="055f424c-5a88-4e6e-9e88-d4462ff2eeee" providerId="ADAL" clId="{FF688F30-8267-4759-92EF-AC87E68B1938}" dt="2023-07-18T22:02:33.007" v="363" actId="478"/>
+          <ac:picMkLst>
+            <pc:docMk/>
+            <pc:sldMk cId="3601026263" sldId="276"/>
+            <ac:picMk id="8" creationId="{A7DC26E4-B2EC-8690-3B7F-13F54B9E9556}"/>
+          </ac:picMkLst>
+        </pc:picChg>
+      </pc:sldChg>
+      <pc:sldChg chg="addSp delSp modSp add mod">
+        <pc:chgData name="Pien, Catarina L" userId="055f424c-5a88-4e6e-9e88-d4462ff2eeee" providerId="ADAL" clId="{FF688F30-8267-4759-92EF-AC87E68B1938}" dt="2023-07-18T22:03:33.497" v="378" actId="1076"/>
+        <pc:sldMkLst>
+          <pc:docMk/>
+          <pc:sldMk cId="18945092" sldId="277"/>
+        </pc:sldMkLst>
+        <pc:spChg chg="mod">
+          <ac:chgData name="Pien, Catarina L" userId="055f424c-5a88-4e6e-9e88-d4462ff2eeee" providerId="ADAL" clId="{FF688F30-8267-4759-92EF-AC87E68B1938}" dt="2023-07-18T22:03:11.472" v="369" actId="20577"/>
+          <ac:spMkLst>
+            <pc:docMk/>
+            <pc:sldMk cId="18945092" sldId="277"/>
+            <ac:spMk id="10" creationId="{54CB47FB-F5F9-ED08-821B-7AF4C48AAFCE}"/>
+          </ac:spMkLst>
+        </pc:spChg>
+        <pc:picChg chg="del">
+          <ac:chgData name="Pien, Catarina L" userId="055f424c-5a88-4e6e-9e88-d4462ff2eeee" providerId="ADAL" clId="{FF688F30-8267-4759-92EF-AC87E68B1938}" dt="2023-07-18T22:03:30.039" v="376" actId="478"/>
+          <ac:picMkLst>
+            <pc:docMk/>
+            <pc:sldMk cId="18945092" sldId="277"/>
+            <ac:picMk id="2" creationId="{76E0356B-D97D-A063-0FDA-9B4D8C0B5D1B}"/>
+          </ac:picMkLst>
+        </pc:picChg>
+        <pc:picChg chg="del">
+          <ac:chgData name="Pien, Catarina L" userId="055f424c-5a88-4e6e-9e88-d4462ff2eeee" providerId="ADAL" clId="{FF688F30-8267-4759-92EF-AC87E68B1938}" dt="2023-07-18T22:03:16.184" v="370" actId="478"/>
+          <ac:picMkLst>
+            <pc:docMk/>
+            <pc:sldMk cId="18945092" sldId="277"/>
+            <ac:picMk id="3" creationId="{15C6D720-7468-60E2-B782-72A7ED970AEF}"/>
+          </ac:picMkLst>
+        </pc:picChg>
+        <pc:picChg chg="del">
+          <ac:chgData name="Pien, Catarina L" userId="055f424c-5a88-4e6e-9e88-d4462ff2eeee" providerId="ADAL" clId="{FF688F30-8267-4759-92EF-AC87E68B1938}" dt="2023-07-18T22:03:22.015" v="373" actId="478"/>
+          <ac:picMkLst>
+            <pc:docMk/>
+            <pc:sldMk cId="18945092" sldId="277"/>
+            <ac:picMk id="4" creationId="{03DCFD95-C68B-379A-A5F3-D938729CBB5B}"/>
+          </ac:picMkLst>
+        </pc:picChg>
+        <pc:picChg chg="add mod">
+          <ac:chgData name="Pien, Catarina L" userId="055f424c-5a88-4e6e-9e88-d4462ff2eeee" providerId="ADAL" clId="{FF688F30-8267-4759-92EF-AC87E68B1938}" dt="2023-07-18T22:03:18.313" v="372" actId="1076"/>
+          <ac:picMkLst>
+            <pc:docMk/>
+            <pc:sldMk cId="18945092" sldId="277"/>
+            <ac:picMk id="5" creationId="{22476E99-F8D7-709B-E271-A3829C7AB4E3}"/>
+          </ac:picMkLst>
+        </pc:picChg>
+        <pc:picChg chg="add mod">
+          <ac:chgData name="Pien, Catarina L" userId="055f424c-5a88-4e6e-9e88-d4462ff2eeee" providerId="ADAL" clId="{FF688F30-8267-4759-92EF-AC87E68B1938}" dt="2023-07-18T22:03:24.666" v="375" actId="1076"/>
+          <ac:picMkLst>
+            <pc:docMk/>
+            <pc:sldMk cId="18945092" sldId="277"/>
+            <ac:picMk id="6" creationId="{062C4520-7632-FA71-1942-17DC3DAC845E}"/>
+          </ac:picMkLst>
+        </pc:picChg>
+        <pc:picChg chg="add mod">
+          <ac:chgData name="Pien, Catarina L" userId="055f424c-5a88-4e6e-9e88-d4462ff2eeee" providerId="ADAL" clId="{FF688F30-8267-4759-92EF-AC87E68B1938}" dt="2023-07-18T22:03:33.497" v="378" actId="1076"/>
+          <ac:picMkLst>
+            <pc:docMk/>
+            <pc:sldMk cId="18945092" sldId="277"/>
+            <ac:picMk id="7" creationId="{E05A7350-5F0D-33B0-CDB5-343C93BC7A15}"/>
+          </ac:picMkLst>
+        </pc:picChg>
       </pc:sldChg>
     </pc:docChg>
   </pc:docChgLst>
@@ -290,7 +1040,7 @@
           <a:p>
             <a:fld id="{E9C75B26-09DD-47E1-82EF-72E4F0C40FE4}" type="datetimeFigureOut">
               <a:rPr lang="en-US" smtClean="0"/>
-              <a:t>7/14/2023</a:t>
+              <a:t>7/18/2023</a:t>
             </a:fld>
             <a:endParaRPr lang="en-US"/>
           </a:p>
@@ -488,7 +1238,7 @@
           <a:p>
             <a:fld id="{E9C75B26-09DD-47E1-82EF-72E4F0C40FE4}" type="datetimeFigureOut">
               <a:rPr lang="en-US" smtClean="0"/>
-              <a:t>7/14/2023</a:t>
+              <a:t>7/18/2023</a:t>
             </a:fld>
             <a:endParaRPr lang="en-US"/>
           </a:p>
@@ -696,7 +1446,7 @@
           <a:p>
             <a:fld id="{E9C75B26-09DD-47E1-82EF-72E4F0C40FE4}" type="datetimeFigureOut">
               <a:rPr lang="en-US" smtClean="0"/>
-              <a:t>7/14/2023</a:t>
+              <a:t>7/18/2023</a:t>
             </a:fld>
             <a:endParaRPr lang="en-US"/>
           </a:p>
@@ -894,7 +1644,7 @@
           <a:p>
             <a:fld id="{E9C75B26-09DD-47E1-82EF-72E4F0C40FE4}" type="datetimeFigureOut">
               <a:rPr lang="en-US" smtClean="0"/>
-              <a:t>7/14/2023</a:t>
+              <a:t>7/18/2023</a:t>
             </a:fld>
             <a:endParaRPr lang="en-US"/>
           </a:p>
@@ -1169,7 +1919,7 @@
           <a:p>
             <a:fld id="{E9C75B26-09DD-47E1-82EF-72E4F0C40FE4}" type="datetimeFigureOut">
               <a:rPr lang="en-US" smtClean="0"/>
-              <a:t>7/14/2023</a:t>
+              <a:t>7/18/2023</a:t>
             </a:fld>
             <a:endParaRPr lang="en-US"/>
           </a:p>
@@ -1434,7 +2184,7 @@
           <a:p>
             <a:fld id="{E9C75B26-09DD-47E1-82EF-72E4F0C40FE4}" type="datetimeFigureOut">
               <a:rPr lang="en-US" smtClean="0"/>
-              <a:t>7/14/2023</a:t>
+              <a:t>7/18/2023</a:t>
             </a:fld>
             <a:endParaRPr lang="en-US"/>
           </a:p>
@@ -1846,7 +2596,7 @@
           <a:p>
             <a:fld id="{E9C75B26-09DD-47E1-82EF-72E4F0C40FE4}" type="datetimeFigureOut">
               <a:rPr lang="en-US" smtClean="0"/>
-              <a:t>7/14/2023</a:t>
+              <a:t>7/18/2023</a:t>
             </a:fld>
             <a:endParaRPr lang="en-US"/>
           </a:p>
@@ -1987,7 +2737,7 @@
           <a:p>
             <a:fld id="{E9C75B26-09DD-47E1-82EF-72E4F0C40FE4}" type="datetimeFigureOut">
               <a:rPr lang="en-US" smtClean="0"/>
-              <a:t>7/14/2023</a:t>
+              <a:t>7/18/2023</a:t>
             </a:fld>
             <a:endParaRPr lang="en-US"/>
           </a:p>
@@ -2100,7 +2850,7 @@
           <a:p>
             <a:fld id="{E9C75B26-09DD-47E1-82EF-72E4F0C40FE4}" type="datetimeFigureOut">
               <a:rPr lang="en-US" smtClean="0"/>
-              <a:t>7/14/2023</a:t>
+              <a:t>7/18/2023</a:t>
             </a:fld>
             <a:endParaRPr lang="en-US"/>
           </a:p>
@@ -2411,7 +3161,7 @@
           <a:p>
             <a:fld id="{E9C75B26-09DD-47E1-82EF-72E4F0C40FE4}" type="datetimeFigureOut">
               <a:rPr lang="en-US" smtClean="0"/>
-              <a:t>7/14/2023</a:t>
+              <a:t>7/18/2023</a:t>
             </a:fld>
             <a:endParaRPr lang="en-US"/>
           </a:p>
@@ -2699,7 +3449,7 @@
           <a:p>
             <a:fld id="{E9C75B26-09DD-47E1-82EF-72E4F0C40FE4}" type="datetimeFigureOut">
               <a:rPr lang="en-US" smtClean="0"/>
-              <a:t>7/14/2023</a:t>
+              <a:t>7/18/2023</a:t>
             </a:fld>
             <a:endParaRPr lang="en-US"/>
           </a:p>
@@ -2940,7 +3690,7 @@
           <a:p>
             <a:fld id="{E9C75B26-09DD-47E1-82EF-72E4F0C40FE4}" type="datetimeFigureOut">
               <a:rPr lang="en-US" smtClean="0"/>
-              <a:t>7/14/2023</a:t>
+              <a:t>7/18/2023</a:t>
             </a:fld>
             <a:endParaRPr lang="en-US"/>
           </a:p>
@@ -3423,6 +4173,2147 @@
 </p:sld>
 </file>
 
+<file path=ppt/slides/slide10.xml><?xml version="1.0" encoding="utf-8"?>
+<p:sld xmlns:a="http://schemas.openxmlformats.org/drawingml/2006/main" xmlns:r="http://schemas.openxmlformats.org/officeDocument/2006/relationships" xmlns:p="http://schemas.openxmlformats.org/presentationml/2006/main">
+  <p:cSld>
+    <p:spTree>
+      <p:nvGrpSpPr>
+        <p:cNvPr id="1" name=""/>
+        <p:cNvGrpSpPr/>
+        <p:nvPr/>
+      </p:nvGrpSpPr>
+      <p:grpSpPr>
+        <a:xfrm>
+          <a:off x="0" y="0"/>
+          <a:ext cx="0" cy="0"/>
+          <a:chOff x="0" y="0"/>
+          <a:chExt cx="0" cy="0"/>
+        </a:xfrm>
+      </p:grpSpPr>
+      <p:sp>
+        <p:nvSpPr>
+          <p:cNvPr id="9" name="TextBox 8">
+            <a:extLst>
+              <a:ext uri="{FF2B5EF4-FFF2-40B4-BE49-F238E27FC236}">
+                <a16:creationId xmlns:a16="http://schemas.microsoft.com/office/drawing/2014/main" id="{BF682709-69E1-D64C-E2E6-246C83C997B7}"/>
+              </a:ext>
+            </a:extLst>
+          </p:cNvPr>
+          <p:cNvSpPr txBox="1"/>
+          <p:nvPr/>
+        </p:nvSpPr>
+        <p:spPr>
+          <a:xfrm>
+            <a:off x="10707693" y="1961450"/>
+            <a:ext cx="1292213" cy="338554"/>
+          </a:xfrm>
+          <a:prstGeom prst="rect">
+            <a:avLst/>
+          </a:prstGeom>
+          <a:noFill/>
+          <a:ln>
+            <a:solidFill>
+              <a:schemeClr val="tx1"/>
+            </a:solidFill>
+          </a:ln>
+        </p:spPr>
+        <p:txBody>
+          <a:bodyPr wrap="none" rtlCol="0">
+            <a:spAutoFit/>
+          </a:bodyPr>
+          <a:lstStyle/>
+          <a:p>
+            <a:r>
+              <a:rPr lang="en-US" sz="1600" dirty="0"/>
+              <a:t>Daily average</a:t>
+            </a:r>
+          </a:p>
+        </p:txBody>
+      </p:sp>
+      <p:sp>
+        <p:nvSpPr>
+          <p:cNvPr id="12" name="Title 1">
+            <a:extLst>
+              <a:ext uri="{FF2B5EF4-FFF2-40B4-BE49-F238E27FC236}">
+                <a16:creationId xmlns:a16="http://schemas.microsoft.com/office/drawing/2014/main" id="{0FD1B733-A17B-8287-7182-407C3DA1E09B}"/>
+              </a:ext>
+            </a:extLst>
+          </p:cNvPr>
+          <p:cNvSpPr>
+            <a:spLocks noGrp="1"/>
+          </p:cNvSpPr>
+          <p:nvPr>
+            <p:ph type="title"/>
+          </p:nvPr>
+        </p:nvSpPr>
+        <p:spPr>
+          <a:xfrm>
+            <a:off x="0" y="-3880"/>
+            <a:ext cx="10515600" cy="530802"/>
+          </a:xfrm>
+        </p:spPr>
+        <p:txBody>
+          <a:bodyPr>
+            <a:normAutofit fontScale="90000"/>
+          </a:bodyPr>
+          <a:lstStyle/>
+          <a:p>
+            <a:r>
+              <a:rPr lang="en-US" dirty="0"/>
+              <a:t>Mike</a:t>
+            </a:r>
+          </a:p>
+        </p:txBody>
+      </p:sp>
+      <p:sp>
+        <p:nvSpPr>
+          <p:cNvPr id="13" name="TextBox 12">
+            <a:extLst>
+              <a:ext uri="{FF2B5EF4-FFF2-40B4-BE49-F238E27FC236}">
+                <a16:creationId xmlns:a16="http://schemas.microsoft.com/office/drawing/2014/main" id="{1146637D-6BFC-E596-E843-88D63AD45F92}"/>
+              </a:ext>
+            </a:extLst>
+          </p:cNvPr>
+          <p:cNvSpPr txBox="1"/>
+          <p:nvPr/>
+        </p:nvSpPr>
+        <p:spPr>
+          <a:xfrm>
+            <a:off x="10707693" y="5226166"/>
+            <a:ext cx="1438086" cy="338554"/>
+          </a:xfrm>
+          <a:prstGeom prst="rect">
+            <a:avLst/>
+          </a:prstGeom>
+          <a:noFill/>
+          <a:ln>
+            <a:solidFill>
+              <a:schemeClr val="tx1"/>
+            </a:solidFill>
+          </a:ln>
+        </p:spPr>
+        <p:txBody>
+          <a:bodyPr wrap="none" rtlCol="0">
+            <a:spAutoFit/>
+          </a:bodyPr>
+          <a:lstStyle/>
+          <a:p>
+            <a:r>
+              <a:rPr lang="en-US" sz="1600" dirty="0"/>
+              <a:t>Hourly average</a:t>
+            </a:r>
+          </a:p>
+        </p:txBody>
+      </p:sp>
+      <p:sp>
+        <p:nvSpPr>
+          <p:cNvPr id="10" name="TextBox 9">
+            <a:extLst>
+              <a:ext uri="{FF2B5EF4-FFF2-40B4-BE49-F238E27FC236}">
+                <a16:creationId xmlns:a16="http://schemas.microsoft.com/office/drawing/2014/main" id="{54CB47FB-F5F9-ED08-821B-7AF4C48AAFCE}"/>
+              </a:ext>
+            </a:extLst>
+          </p:cNvPr>
+          <p:cNvSpPr txBox="1"/>
+          <p:nvPr/>
+        </p:nvSpPr>
+        <p:spPr>
+          <a:xfrm>
+            <a:off x="4516241" y="357645"/>
+            <a:ext cx="1770036" cy="338554"/>
+          </a:xfrm>
+          <a:prstGeom prst="rect">
+            <a:avLst/>
+          </a:prstGeom>
+          <a:noFill/>
+          <a:ln>
+            <a:solidFill>
+              <a:schemeClr val="tx1"/>
+            </a:solidFill>
+          </a:ln>
+        </p:spPr>
+        <p:txBody>
+          <a:bodyPr wrap="none" rtlCol="0">
+            <a:spAutoFit/>
+          </a:bodyPr>
+          <a:lstStyle/>
+          <a:p>
+            <a:r>
+              <a:rPr lang="en-US" sz="1600" dirty="0"/>
+              <a:t>channel 54, node 8</a:t>
+            </a:r>
+          </a:p>
+        </p:txBody>
+      </p:sp>
+      <p:pic>
+        <p:nvPicPr>
+          <p:cNvPr id="5" name="Picture 4" descr="Chart, histogram&#10;&#10;Description automatically generated">
+            <a:extLst>
+              <a:ext uri="{FF2B5EF4-FFF2-40B4-BE49-F238E27FC236}">
+                <a16:creationId xmlns:a16="http://schemas.microsoft.com/office/drawing/2014/main" id="{22476E99-F8D7-709B-E271-A3829C7AB4E3}"/>
+              </a:ext>
+            </a:extLst>
+          </p:cNvPr>
+          <p:cNvPicPr>
+            <a:picLocks noChangeAspect="1"/>
+          </p:cNvPicPr>
+          <p:nvPr/>
+        </p:nvPicPr>
+        <p:blipFill>
+          <a:blip r:embed="rId2" cstate="print">
+            <a:extLst>
+              <a:ext uri="{28A0092B-C50C-407E-A947-70E740481C1C}">
+                <a14:useLocalDpi xmlns:a14="http://schemas.microsoft.com/office/drawing/2010/main" val="0"/>
+              </a:ext>
+            </a:extLst>
+          </a:blip>
+          <a:stretch>
+            <a:fillRect/>
+          </a:stretch>
+        </p:blipFill>
+        <p:spPr>
+          <a:xfrm>
+            <a:off x="3520550" y="870150"/>
+            <a:ext cx="3429000" cy="2571750"/>
+          </a:xfrm>
+          <a:prstGeom prst="rect">
+            <a:avLst/>
+          </a:prstGeom>
+        </p:spPr>
+      </p:pic>
+      <p:pic>
+        <p:nvPicPr>
+          <p:cNvPr id="6" name="Picture 5" descr="Chart, histogram&#10;&#10;Description automatically generated">
+            <a:extLst>
+              <a:ext uri="{FF2B5EF4-FFF2-40B4-BE49-F238E27FC236}">
+                <a16:creationId xmlns:a16="http://schemas.microsoft.com/office/drawing/2014/main" id="{062C4520-7632-FA71-1942-17DC3DAC845E}"/>
+              </a:ext>
+            </a:extLst>
+          </p:cNvPr>
+          <p:cNvPicPr>
+            <a:picLocks noChangeAspect="1"/>
+          </p:cNvPicPr>
+          <p:nvPr/>
+        </p:nvPicPr>
+        <p:blipFill>
+          <a:blip r:embed="rId3" cstate="print">
+            <a:extLst>
+              <a:ext uri="{28A0092B-C50C-407E-A947-70E740481C1C}">
+                <a14:useLocalDpi xmlns:a14="http://schemas.microsoft.com/office/drawing/2010/main" val="0"/>
+              </a:ext>
+            </a:extLst>
+          </a:blip>
+          <a:stretch>
+            <a:fillRect/>
+          </a:stretch>
+        </p:blipFill>
+        <p:spPr>
+          <a:xfrm>
+            <a:off x="6949550" y="870150"/>
+            <a:ext cx="3429000" cy="2571750"/>
+          </a:xfrm>
+          <a:prstGeom prst="rect">
+            <a:avLst/>
+          </a:prstGeom>
+        </p:spPr>
+      </p:pic>
+      <p:pic>
+        <p:nvPicPr>
+          <p:cNvPr id="7" name="Picture 6" descr="Chart, histogram&#10;&#10;Description automatically generated">
+            <a:extLst>
+              <a:ext uri="{FF2B5EF4-FFF2-40B4-BE49-F238E27FC236}">
+                <a16:creationId xmlns:a16="http://schemas.microsoft.com/office/drawing/2014/main" id="{E05A7350-5F0D-33B0-CDB5-343C93BC7A15}"/>
+              </a:ext>
+            </a:extLst>
+          </p:cNvPr>
+          <p:cNvPicPr>
+            <a:picLocks noChangeAspect="1"/>
+          </p:cNvPicPr>
+          <p:nvPr/>
+        </p:nvPicPr>
+        <p:blipFill>
+          <a:blip r:embed="rId4" cstate="print">
+            <a:extLst>
+              <a:ext uri="{28A0092B-C50C-407E-A947-70E740481C1C}">
+                <a14:useLocalDpi xmlns:a14="http://schemas.microsoft.com/office/drawing/2010/main" val="0"/>
+              </a:ext>
+            </a:extLst>
+          </a:blip>
+          <a:stretch>
+            <a:fillRect/>
+          </a:stretch>
+        </p:blipFill>
+        <p:spPr>
+          <a:xfrm>
+            <a:off x="86084" y="844852"/>
+            <a:ext cx="3429000" cy="2571750"/>
+          </a:xfrm>
+          <a:prstGeom prst="rect">
+            <a:avLst/>
+          </a:prstGeom>
+        </p:spPr>
+      </p:pic>
+    </p:spTree>
+    <p:extLst>
+      <p:ext uri="{BB962C8B-B14F-4D97-AF65-F5344CB8AC3E}">
+        <p14:creationId xmlns:p14="http://schemas.microsoft.com/office/powerpoint/2010/main" val="18945092"/>
+      </p:ext>
+    </p:extLst>
+  </p:cSld>
+  <p:clrMapOvr>
+    <a:masterClrMapping/>
+  </p:clrMapOvr>
+</p:sld>
+</file>
+
+<file path=ppt/slides/slide11.xml><?xml version="1.0" encoding="utf-8"?>
+<p:sld xmlns:a="http://schemas.openxmlformats.org/drawingml/2006/main" xmlns:r="http://schemas.openxmlformats.org/officeDocument/2006/relationships" xmlns:p="http://schemas.openxmlformats.org/presentationml/2006/main">
+  <p:cSld>
+    <p:spTree>
+      <p:nvGrpSpPr>
+        <p:cNvPr id="1" name=""/>
+        <p:cNvGrpSpPr/>
+        <p:nvPr/>
+      </p:nvGrpSpPr>
+      <p:grpSpPr>
+        <a:xfrm>
+          <a:off x="0" y="0"/>
+          <a:ext cx="0" cy="0"/>
+          <a:chOff x="0" y="0"/>
+          <a:chExt cx="0" cy="0"/>
+        </a:xfrm>
+      </p:grpSpPr>
+      <p:sp>
+        <p:nvSpPr>
+          <p:cNvPr id="9" name="TextBox 8">
+            <a:extLst>
+              <a:ext uri="{FF2B5EF4-FFF2-40B4-BE49-F238E27FC236}">
+                <a16:creationId xmlns:a16="http://schemas.microsoft.com/office/drawing/2014/main" id="{BF682709-69E1-D64C-E2E6-246C83C997B7}"/>
+              </a:ext>
+            </a:extLst>
+          </p:cNvPr>
+          <p:cNvSpPr txBox="1"/>
+          <p:nvPr/>
+        </p:nvSpPr>
+        <p:spPr>
+          <a:xfrm>
+            <a:off x="10707693" y="1961450"/>
+            <a:ext cx="1292213" cy="338554"/>
+          </a:xfrm>
+          <a:prstGeom prst="rect">
+            <a:avLst/>
+          </a:prstGeom>
+          <a:noFill/>
+          <a:ln>
+            <a:solidFill>
+              <a:schemeClr val="tx1"/>
+            </a:solidFill>
+          </a:ln>
+        </p:spPr>
+        <p:txBody>
+          <a:bodyPr wrap="none" rtlCol="0">
+            <a:spAutoFit/>
+          </a:bodyPr>
+          <a:lstStyle/>
+          <a:p>
+            <a:r>
+              <a:rPr lang="en-US" sz="1600" dirty="0"/>
+              <a:t>Daily average</a:t>
+            </a:r>
+          </a:p>
+        </p:txBody>
+      </p:sp>
+      <p:sp>
+        <p:nvSpPr>
+          <p:cNvPr id="12" name="Title 1">
+            <a:extLst>
+              <a:ext uri="{FF2B5EF4-FFF2-40B4-BE49-F238E27FC236}">
+                <a16:creationId xmlns:a16="http://schemas.microsoft.com/office/drawing/2014/main" id="{0FD1B733-A17B-8287-7182-407C3DA1E09B}"/>
+              </a:ext>
+            </a:extLst>
+          </p:cNvPr>
+          <p:cNvSpPr>
+            <a:spLocks noGrp="1"/>
+          </p:cNvSpPr>
+          <p:nvPr>
+            <p:ph type="title"/>
+          </p:nvPr>
+        </p:nvSpPr>
+        <p:spPr>
+          <a:xfrm>
+            <a:off x="0" y="-3880"/>
+            <a:ext cx="10515600" cy="530802"/>
+          </a:xfrm>
+        </p:spPr>
+        <p:txBody>
+          <a:bodyPr>
+            <a:normAutofit fontScale="90000"/>
+          </a:bodyPr>
+          <a:lstStyle/>
+          <a:p>
+            <a:r>
+              <a:rPr lang="en-US" dirty="0"/>
+              <a:t>Mike</a:t>
+            </a:r>
+          </a:p>
+        </p:txBody>
+      </p:sp>
+      <p:sp>
+        <p:nvSpPr>
+          <p:cNvPr id="13" name="TextBox 12">
+            <a:extLst>
+              <a:ext uri="{FF2B5EF4-FFF2-40B4-BE49-F238E27FC236}">
+                <a16:creationId xmlns:a16="http://schemas.microsoft.com/office/drawing/2014/main" id="{1146637D-6BFC-E596-E843-88D63AD45F92}"/>
+              </a:ext>
+            </a:extLst>
+          </p:cNvPr>
+          <p:cNvSpPr txBox="1"/>
+          <p:nvPr/>
+        </p:nvSpPr>
+        <p:spPr>
+          <a:xfrm>
+            <a:off x="10707693" y="5226166"/>
+            <a:ext cx="1438086" cy="338554"/>
+          </a:xfrm>
+          <a:prstGeom prst="rect">
+            <a:avLst/>
+          </a:prstGeom>
+          <a:noFill/>
+          <a:ln>
+            <a:solidFill>
+              <a:schemeClr val="tx1"/>
+            </a:solidFill>
+          </a:ln>
+        </p:spPr>
+        <p:txBody>
+          <a:bodyPr wrap="none" rtlCol="0">
+            <a:spAutoFit/>
+          </a:bodyPr>
+          <a:lstStyle/>
+          <a:p>
+            <a:r>
+              <a:rPr lang="en-US" sz="1600" dirty="0"/>
+              <a:t>Hourly average</a:t>
+            </a:r>
+          </a:p>
+        </p:txBody>
+      </p:sp>
+      <p:sp>
+        <p:nvSpPr>
+          <p:cNvPr id="10" name="TextBox 9">
+            <a:extLst>
+              <a:ext uri="{FF2B5EF4-FFF2-40B4-BE49-F238E27FC236}">
+                <a16:creationId xmlns:a16="http://schemas.microsoft.com/office/drawing/2014/main" id="{54CB47FB-F5F9-ED08-821B-7AF4C48AAFCE}"/>
+              </a:ext>
+            </a:extLst>
+          </p:cNvPr>
+          <p:cNvSpPr txBox="1"/>
+          <p:nvPr/>
+        </p:nvSpPr>
+        <p:spPr>
+          <a:xfrm>
+            <a:off x="4516241" y="357645"/>
+            <a:ext cx="1874231" cy="338554"/>
+          </a:xfrm>
+          <a:prstGeom prst="rect">
+            <a:avLst/>
+          </a:prstGeom>
+          <a:noFill/>
+          <a:ln>
+            <a:solidFill>
+              <a:schemeClr val="tx1"/>
+            </a:solidFill>
+          </a:ln>
+        </p:spPr>
+        <p:txBody>
+          <a:bodyPr wrap="none" rtlCol="0">
+            <a:spAutoFit/>
+          </a:bodyPr>
+          <a:lstStyle/>
+          <a:p>
+            <a:r>
+              <a:rPr lang="en-US" sz="1600" dirty="0"/>
+              <a:t>channel 59, node 52</a:t>
+            </a:r>
+          </a:p>
+        </p:txBody>
+      </p:sp>
+      <p:pic>
+        <p:nvPicPr>
+          <p:cNvPr id="2" name="Picture 1" descr="Chart, histogram&#10;&#10;Description automatically generated">
+            <a:extLst>
+              <a:ext uri="{FF2B5EF4-FFF2-40B4-BE49-F238E27FC236}">
+                <a16:creationId xmlns:a16="http://schemas.microsoft.com/office/drawing/2014/main" id="{76E0356B-D97D-A063-0FDA-9B4D8C0B5D1B}"/>
+              </a:ext>
+            </a:extLst>
+          </p:cNvPr>
+          <p:cNvPicPr>
+            <a:picLocks noChangeAspect="1"/>
+          </p:cNvPicPr>
+          <p:nvPr/>
+        </p:nvPicPr>
+        <p:blipFill>
+          <a:blip r:embed="rId2" cstate="print">
+            <a:extLst>
+              <a:ext uri="{28A0092B-C50C-407E-A947-70E740481C1C}">
+                <a14:useLocalDpi xmlns:a14="http://schemas.microsoft.com/office/drawing/2010/main" val="0"/>
+              </a:ext>
+            </a:extLst>
+          </a:blip>
+          <a:stretch>
+            <a:fillRect/>
+          </a:stretch>
+        </p:blipFill>
+        <p:spPr>
+          <a:xfrm>
+            <a:off x="91550" y="870150"/>
+            <a:ext cx="3429000" cy="2571750"/>
+          </a:xfrm>
+          <a:prstGeom prst="rect">
+            <a:avLst/>
+          </a:prstGeom>
+        </p:spPr>
+      </p:pic>
+      <p:pic>
+        <p:nvPicPr>
+          <p:cNvPr id="3" name="Picture 2" descr="Chart, histogram&#10;&#10;Description automatically generated">
+            <a:extLst>
+              <a:ext uri="{FF2B5EF4-FFF2-40B4-BE49-F238E27FC236}">
+                <a16:creationId xmlns:a16="http://schemas.microsoft.com/office/drawing/2014/main" id="{15C6D720-7468-60E2-B782-72A7ED970AEF}"/>
+              </a:ext>
+            </a:extLst>
+          </p:cNvPr>
+          <p:cNvPicPr>
+            <a:picLocks noChangeAspect="1"/>
+          </p:cNvPicPr>
+          <p:nvPr/>
+        </p:nvPicPr>
+        <p:blipFill>
+          <a:blip r:embed="rId3" cstate="print">
+            <a:extLst>
+              <a:ext uri="{28A0092B-C50C-407E-A947-70E740481C1C}">
+                <a14:useLocalDpi xmlns:a14="http://schemas.microsoft.com/office/drawing/2010/main" val="0"/>
+              </a:ext>
+            </a:extLst>
+          </a:blip>
+          <a:stretch>
+            <a:fillRect/>
+          </a:stretch>
+        </p:blipFill>
+        <p:spPr>
+          <a:xfrm>
+            <a:off x="3520550" y="888447"/>
+            <a:ext cx="3429000" cy="2571750"/>
+          </a:xfrm>
+          <a:prstGeom prst="rect">
+            <a:avLst/>
+          </a:prstGeom>
+        </p:spPr>
+      </p:pic>
+      <p:pic>
+        <p:nvPicPr>
+          <p:cNvPr id="4" name="Picture 3" descr="Chart, histogram&#10;&#10;Description automatically generated">
+            <a:extLst>
+              <a:ext uri="{FF2B5EF4-FFF2-40B4-BE49-F238E27FC236}">
+                <a16:creationId xmlns:a16="http://schemas.microsoft.com/office/drawing/2014/main" id="{03DCFD95-C68B-379A-A5F3-D938729CBB5B}"/>
+              </a:ext>
+            </a:extLst>
+          </p:cNvPr>
+          <p:cNvPicPr>
+            <a:picLocks noChangeAspect="1"/>
+          </p:cNvPicPr>
+          <p:nvPr/>
+        </p:nvPicPr>
+        <p:blipFill>
+          <a:blip r:embed="rId4" cstate="print">
+            <a:extLst>
+              <a:ext uri="{28A0092B-C50C-407E-A947-70E740481C1C}">
+                <a14:useLocalDpi xmlns:a14="http://schemas.microsoft.com/office/drawing/2010/main" val="0"/>
+              </a:ext>
+            </a:extLst>
+          </a:blip>
+          <a:stretch>
+            <a:fillRect/>
+          </a:stretch>
+        </p:blipFill>
+        <p:spPr>
+          <a:xfrm>
+            <a:off x="6949550" y="888447"/>
+            <a:ext cx="3429000" cy="2571750"/>
+          </a:xfrm>
+          <a:prstGeom prst="rect">
+            <a:avLst/>
+          </a:prstGeom>
+        </p:spPr>
+      </p:pic>
+    </p:spTree>
+    <p:extLst>
+      <p:ext uri="{BB962C8B-B14F-4D97-AF65-F5344CB8AC3E}">
+        <p14:creationId xmlns:p14="http://schemas.microsoft.com/office/powerpoint/2010/main" val="3601026263"/>
+      </p:ext>
+    </p:extLst>
+  </p:cSld>
+  <p:clrMapOvr>
+    <a:masterClrMapping/>
+  </p:clrMapOvr>
+</p:sld>
+</file>
+
+<file path=ppt/slides/slide12.xml><?xml version="1.0" encoding="utf-8"?>
+<p:sld xmlns:a="http://schemas.openxmlformats.org/drawingml/2006/main" xmlns:r="http://schemas.openxmlformats.org/officeDocument/2006/relationships" xmlns:p="http://schemas.openxmlformats.org/presentationml/2006/main">
+  <p:cSld>
+    <p:spTree>
+      <p:nvGrpSpPr>
+        <p:cNvPr id="1" name=""/>
+        <p:cNvGrpSpPr/>
+        <p:nvPr/>
+      </p:nvGrpSpPr>
+      <p:grpSpPr>
+        <a:xfrm>
+          <a:off x="0" y="0"/>
+          <a:ext cx="0" cy="0"/>
+          <a:chOff x="0" y="0"/>
+          <a:chExt cx="0" cy="0"/>
+        </a:xfrm>
+      </p:grpSpPr>
+      <p:sp>
+        <p:nvSpPr>
+          <p:cNvPr id="2" name="Title 1">
+            <a:extLst>
+              <a:ext uri="{FF2B5EF4-FFF2-40B4-BE49-F238E27FC236}">
+                <a16:creationId xmlns:a16="http://schemas.microsoft.com/office/drawing/2014/main" id="{35D1CFB4-6B3B-A24D-496D-61F77A311C0D}"/>
+              </a:ext>
+            </a:extLst>
+          </p:cNvPr>
+          <p:cNvSpPr>
+            <a:spLocks noGrp="1"/>
+          </p:cNvSpPr>
+          <p:nvPr>
+            <p:ph type="title"/>
+          </p:nvPr>
+        </p:nvSpPr>
+        <p:spPr>
+          <a:xfrm>
+            <a:off x="128225" y="73981"/>
+            <a:ext cx="10515600" cy="530802"/>
+          </a:xfrm>
+        </p:spPr>
+        <p:txBody>
+          <a:bodyPr>
+            <a:normAutofit fontScale="90000"/>
+          </a:bodyPr>
+          <a:lstStyle/>
+          <a:p>
+            <a:r>
+              <a:rPr lang="en-US" dirty="0"/>
+              <a:t>Cat</a:t>
+            </a:r>
+          </a:p>
+        </p:txBody>
+      </p:sp>
+      <p:sp>
+        <p:nvSpPr>
+          <p:cNvPr id="6" name="TextBox 5">
+            <a:extLst>
+              <a:ext uri="{FF2B5EF4-FFF2-40B4-BE49-F238E27FC236}">
+                <a16:creationId xmlns:a16="http://schemas.microsoft.com/office/drawing/2014/main" id="{C9C84A0F-F923-796A-A8DB-13B8E889B417}"/>
+              </a:ext>
+            </a:extLst>
+          </p:cNvPr>
+          <p:cNvSpPr txBox="1"/>
+          <p:nvPr/>
+        </p:nvSpPr>
+        <p:spPr>
+          <a:xfrm>
+            <a:off x="4448910" y="188368"/>
+            <a:ext cx="2082621" cy="338554"/>
+          </a:xfrm>
+          <a:prstGeom prst="rect">
+            <a:avLst/>
+          </a:prstGeom>
+          <a:noFill/>
+          <a:ln>
+            <a:solidFill>
+              <a:schemeClr val="tx1"/>
+            </a:solidFill>
+          </a:ln>
+        </p:spPr>
+        <p:txBody>
+          <a:bodyPr wrap="none" rtlCol="0">
+            <a:spAutoFit/>
+          </a:bodyPr>
+          <a:lstStyle/>
+          <a:p>
+            <a:r>
+              <a:rPr lang="en-US" sz="1600" dirty="0"/>
+              <a:t>channel 430, node 351</a:t>
+            </a:r>
+          </a:p>
+        </p:txBody>
+      </p:sp>
+      <p:sp>
+        <p:nvSpPr>
+          <p:cNvPr id="9" name="TextBox 8">
+            <a:extLst>
+              <a:ext uri="{FF2B5EF4-FFF2-40B4-BE49-F238E27FC236}">
+                <a16:creationId xmlns:a16="http://schemas.microsoft.com/office/drawing/2014/main" id="{1E0FDA2C-57EE-59D9-43F2-099A0FC9DA60}"/>
+              </a:ext>
+            </a:extLst>
+          </p:cNvPr>
+          <p:cNvSpPr txBox="1"/>
+          <p:nvPr/>
+        </p:nvSpPr>
+        <p:spPr>
+          <a:xfrm>
+            <a:off x="10707693" y="5226166"/>
+            <a:ext cx="1438086" cy="338554"/>
+          </a:xfrm>
+          <a:prstGeom prst="rect">
+            <a:avLst/>
+          </a:prstGeom>
+          <a:noFill/>
+          <a:ln>
+            <a:solidFill>
+              <a:schemeClr val="tx1"/>
+            </a:solidFill>
+          </a:ln>
+        </p:spPr>
+        <p:txBody>
+          <a:bodyPr wrap="none" rtlCol="0">
+            <a:spAutoFit/>
+          </a:bodyPr>
+          <a:lstStyle/>
+          <a:p>
+            <a:r>
+              <a:rPr lang="en-US" sz="1600" dirty="0"/>
+              <a:t>Hourly average</a:t>
+            </a:r>
+          </a:p>
+        </p:txBody>
+      </p:sp>
+      <p:sp>
+        <p:nvSpPr>
+          <p:cNvPr id="7" name="TextBox 6">
+            <a:extLst>
+              <a:ext uri="{FF2B5EF4-FFF2-40B4-BE49-F238E27FC236}">
+                <a16:creationId xmlns:a16="http://schemas.microsoft.com/office/drawing/2014/main" id="{3927DC66-0A9C-6E1F-1351-DD2D9218BB17}"/>
+              </a:ext>
+            </a:extLst>
+          </p:cNvPr>
+          <p:cNvSpPr txBox="1"/>
+          <p:nvPr/>
+        </p:nvSpPr>
+        <p:spPr>
+          <a:xfrm>
+            <a:off x="10853566" y="1850528"/>
+            <a:ext cx="1292213" cy="338554"/>
+          </a:xfrm>
+          <a:prstGeom prst="rect">
+            <a:avLst/>
+          </a:prstGeom>
+          <a:noFill/>
+          <a:ln>
+            <a:solidFill>
+              <a:schemeClr val="tx1"/>
+            </a:solidFill>
+          </a:ln>
+        </p:spPr>
+        <p:txBody>
+          <a:bodyPr wrap="none" rtlCol="0">
+            <a:spAutoFit/>
+          </a:bodyPr>
+          <a:lstStyle/>
+          <a:p>
+            <a:r>
+              <a:rPr lang="en-US" sz="1600" dirty="0"/>
+              <a:t>Daily average</a:t>
+            </a:r>
+          </a:p>
+        </p:txBody>
+      </p:sp>
+      <p:pic>
+        <p:nvPicPr>
+          <p:cNvPr id="4" name="Picture 3" descr="Chart, histogram&#10;&#10;Description automatically generated">
+            <a:extLst>
+              <a:ext uri="{FF2B5EF4-FFF2-40B4-BE49-F238E27FC236}">
+                <a16:creationId xmlns:a16="http://schemas.microsoft.com/office/drawing/2014/main" id="{C22D5395-0143-B90A-DD52-8396CECAC238}"/>
+              </a:ext>
+            </a:extLst>
+          </p:cNvPr>
+          <p:cNvPicPr>
+            <a:picLocks noChangeAspect="1"/>
+          </p:cNvPicPr>
+          <p:nvPr/>
+        </p:nvPicPr>
+        <p:blipFill>
+          <a:blip r:embed="rId2" cstate="print">
+            <a:extLst>
+              <a:ext uri="{28A0092B-C50C-407E-A947-70E740481C1C}">
+                <a14:useLocalDpi xmlns:a14="http://schemas.microsoft.com/office/drawing/2010/main" val="0"/>
+              </a:ext>
+            </a:extLst>
+          </a:blip>
+          <a:stretch>
+            <a:fillRect/>
+          </a:stretch>
+        </p:blipFill>
+        <p:spPr>
+          <a:xfrm>
+            <a:off x="248778" y="971582"/>
+            <a:ext cx="3429000" cy="2571750"/>
+          </a:xfrm>
+          <a:prstGeom prst="rect">
+            <a:avLst/>
+          </a:prstGeom>
+        </p:spPr>
+      </p:pic>
+      <p:pic>
+        <p:nvPicPr>
+          <p:cNvPr id="5" name="Picture 4" descr="Chart, histogram&#10;&#10;Description automatically generated">
+            <a:extLst>
+              <a:ext uri="{FF2B5EF4-FFF2-40B4-BE49-F238E27FC236}">
+                <a16:creationId xmlns:a16="http://schemas.microsoft.com/office/drawing/2014/main" id="{98C923AA-A37A-6F94-48AD-0992A6026F97}"/>
+              </a:ext>
+            </a:extLst>
+          </p:cNvPr>
+          <p:cNvPicPr>
+            <a:picLocks noChangeAspect="1"/>
+          </p:cNvPicPr>
+          <p:nvPr/>
+        </p:nvPicPr>
+        <p:blipFill>
+          <a:blip r:embed="rId3" cstate="print">
+            <a:extLst>
+              <a:ext uri="{28A0092B-C50C-407E-A947-70E740481C1C}">
+                <a14:useLocalDpi xmlns:a14="http://schemas.microsoft.com/office/drawing/2010/main" val="0"/>
+              </a:ext>
+            </a:extLst>
+          </a:blip>
+          <a:stretch>
+            <a:fillRect/>
+          </a:stretch>
+        </p:blipFill>
+        <p:spPr>
+          <a:xfrm>
+            <a:off x="3671525" y="971582"/>
+            <a:ext cx="3429000" cy="2571750"/>
+          </a:xfrm>
+          <a:prstGeom prst="rect">
+            <a:avLst/>
+          </a:prstGeom>
+        </p:spPr>
+      </p:pic>
+      <p:pic>
+        <p:nvPicPr>
+          <p:cNvPr id="8" name="Picture 7" descr="Chart, histogram&#10;&#10;Description automatically generated">
+            <a:extLst>
+              <a:ext uri="{FF2B5EF4-FFF2-40B4-BE49-F238E27FC236}">
+                <a16:creationId xmlns:a16="http://schemas.microsoft.com/office/drawing/2014/main" id="{FD69CBF5-1CA3-B62C-6F61-84FCADDE2428}"/>
+              </a:ext>
+            </a:extLst>
+          </p:cNvPr>
+          <p:cNvPicPr>
+            <a:picLocks noChangeAspect="1"/>
+          </p:cNvPicPr>
+          <p:nvPr/>
+        </p:nvPicPr>
+        <p:blipFill>
+          <a:blip r:embed="rId4" cstate="print">
+            <a:extLst>
+              <a:ext uri="{28A0092B-C50C-407E-A947-70E740481C1C}">
+                <a14:useLocalDpi xmlns:a14="http://schemas.microsoft.com/office/drawing/2010/main" val="0"/>
+              </a:ext>
+            </a:extLst>
+          </a:blip>
+          <a:stretch>
+            <a:fillRect/>
+          </a:stretch>
+        </p:blipFill>
+        <p:spPr>
+          <a:xfrm>
+            <a:off x="6940142" y="971582"/>
+            <a:ext cx="3429000" cy="2571750"/>
+          </a:xfrm>
+          <a:prstGeom prst="rect">
+            <a:avLst/>
+          </a:prstGeom>
+        </p:spPr>
+      </p:pic>
+    </p:spTree>
+    <p:extLst>
+      <p:ext uri="{BB962C8B-B14F-4D97-AF65-F5344CB8AC3E}">
+        <p14:creationId xmlns:p14="http://schemas.microsoft.com/office/powerpoint/2010/main" val="1583880285"/>
+      </p:ext>
+    </p:extLst>
+  </p:cSld>
+  <p:clrMapOvr>
+    <a:masterClrMapping/>
+  </p:clrMapOvr>
+</p:sld>
+</file>
+
+<file path=ppt/slides/slide13.xml><?xml version="1.0" encoding="utf-8"?>
+<p:sld xmlns:a="http://schemas.openxmlformats.org/drawingml/2006/main" xmlns:r="http://schemas.openxmlformats.org/officeDocument/2006/relationships" xmlns:p="http://schemas.openxmlformats.org/presentationml/2006/main">
+  <p:cSld>
+    <p:spTree>
+      <p:nvGrpSpPr>
+        <p:cNvPr id="1" name=""/>
+        <p:cNvGrpSpPr/>
+        <p:nvPr/>
+      </p:nvGrpSpPr>
+      <p:grpSpPr>
+        <a:xfrm>
+          <a:off x="0" y="0"/>
+          <a:ext cx="0" cy="0"/>
+          <a:chOff x="0" y="0"/>
+          <a:chExt cx="0" cy="0"/>
+        </a:xfrm>
+      </p:grpSpPr>
+      <p:sp>
+        <p:nvSpPr>
+          <p:cNvPr id="2" name="Title 1">
+            <a:extLst>
+              <a:ext uri="{FF2B5EF4-FFF2-40B4-BE49-F238E27FC236}">
+                <a16:creationId xmlns:a16="http://schemas.microsoft.com/office/drawing/2014/main" id="{35D1CFB4-6B3B-A24D-496D-61F77A311C0D}"/>
+              </a:ext>
+            </a:extLst>
+          </p:cNvPr>
+          <p:cNvSpPr>
+            <a:spLocks noGrp="1"/>
+          </p:cNvSpPr>
+          <p:nvPr>
+            <p:ph type="title"/>
+          </p:nvPr>
+        </p:nvSpPr>
+        <p:spPr>
+          <a:xfrm>
+            <a:off x="128225" y="73981"/>
+            <a:ext cx="10515600" cy="530802"/>
+          </a:xfrm>
+        </p:spPr>
+        <p:txBody>
+          <a:bodyPr>
+            <a:normAutofit fontScale="90000"/>
+          </a:bodyPr>
+          <a:lstStyle/>
+          <a:p>
+            <a:r>
+              <a:rPr lang="en-US" dirty="0"/>
+              <a:t>Cat</a:t>
+            </a:r>
+          </a:p>
+        </p:txBody>
+      </p:sp>
+      <p:sp>
+        <p:nvSpPr>
+          <p:cNvPr id="6" name="TextBox 5">
+            <a:extLst>
+              <a:ext uri="{FF2B5EF4-FFF2-40B4-BE49-F238E27FC236}">
+                <a16:creationId xmlns:a16="http://schemas.microsoft.com/office/drawing/2014/main" id="{C9C84A0F-F923-796A-A8DB-13B8E889B417}"/>
+              </a:ext>
+            </a:extLst>
+          </p:cNvPr>
+          <p:cNvSpPr txBox="1"/>
+          <p:nvPr/>
+        </p:nvSpPr>
+        <p:spPr>
+          <a:xfrm>
+            <a:off x="4448910" y="188368"/>
+            <a:ext cx="1978427" cy="338554"/>
+          </a:xfrm>
+          <a:prstGeom prst="rect">
+            <a:avLst/>
+          </a:prstGeom>
+          <a:noFill/>
+          <a:ln>
+            <a:solidFill>
+              <a:schemeClr val="tx1"/>
+            </a:solidFill>
+          </a:ln>
+        </p:spPr>
+        <p:txBody>
+          <a:bodyPr wrap="none" rtlCol="0">
+            <a:spAutoFit/>
+          </a:bodyPr>
+          <a:lstStyle/>
+          <a:p>
+            <a:r>
+              <a:rPr lang="en-US" sz="1600" dirty="0"/>
+              <a:t>channel 172, node 26</a:t>
+            </a:r>
+          </a:p>
+        </p:txBody>
+      </p:sp>
+      <p:sp>
+        <p:nvSpPr>
+          <p:cNvPr id="9" name="TextBox 8">
+            <a:extLst>
+              <a:ext uri="{FF2B5EF4-FFF2-40B4-BE49-F238E27FC236}">
+                <a16:creationId xmlns:a16="http://schemas.microsoft.com/office/drawing/2014/main" id="{1E0FDA2C-57EE-59D9-43F2-099A0FC9DA60}"/>
+              </a:ext>
+            </a:extLst>
+          </p:cNvPr>
+          <p:cNvSpPr txBox="1"/>
+          <p:nvPr/>
+        </p:nvSpPr>
+        <p:spPr>
+          <a:xfrm>
+            <a:off x="10707693" y="5226166"/>
+            <a:ext cx="1438086" cy="338554"/>
+          </a:xfrm>
+          <a:prstGeom prst="rect">
+            <a:avLst/>
+          </a:prstGeom>
+          <a:noFill/>
+          <a:ln>
+            <a:solidFill>
+              <a:schemeClr val="tx1"/>
+            </a:solidFill>
+          </a:ln>
+        </p:spPr>
+        <p:txBody>
+          <a:bodyPr wrap="none" rtlCol="0">
+            <a:spAutoFit/>
+          </a:bodyPr>
+          <a:lstStyle/>
+          <a:p>
+            <a:r>
+              <a:rPr lang="en-US" sz="1600" dirty="0"/>
+              <a:t>Hourly average</a:t>
+            </a:r>
+          </a:p>
+        </p:txBody>
+      </p:sp>
+      <p:pic>
+        <p:nvPicPr>
+          <p:cNvPr id="3" name="Picture 2">
+            <a:extLst>
+              <a:ext uri="{FF2B5EF4-FFF2-40B4-BE49-F238E27FC236}">
+                <a16:creationId xmlns:a16="http://schemas.microsoft.com/office/drawing/2014/main" id="{B0378381-121A-58FC-6540-A6B534FFCE03}"/>
+              </a:ext>
+            </a:extLst>
+          </p:cNvPr>
+          <p:cNvPicPr>
+            <a:picLocks noChangeAspect="1"/>
+          </p:cNvPicPr>
+          <p:nvPr/>
+        </p:nvPicPr>
+        <p:blipFill>
+          <a:blip r:embed="rId2" cstate="print">
+            <a:extLst>
+              <a:ext uri="{28A0092B-C50C-407E-A947-70E740481C1C}">
+                <a14:useLocalDpi xmlns:a14="http://schemas.microsoft.com/office/drawing/2010/main" val="0"/>
+              </a:ext>
+            </a:extLst>
+          </a:blip>
+          <a:stretch>
+            <a:fillRect/>
+          </a:stretch>
+        </p:blipFill>
+        <p:spPr>
+          <a:xfrm>
+            <a:off x="-1" y="702871"/>
+            <a:ext cx="3787281" cy="2840461"/>
+          </a:xfrm>
+          <a:prstGeom prst="rect">
+            <a:avLst/>
+          </a:prstGeom>
+        </p:spPr>
+      </p:pic>
+      <p:pic>
+        <p:nvPicPr>
+          <p:cNvPr id="10" name="Picture 9">
+            <a:extLst>
+              <a:ext uri="{FF2B5EF4-FFF2-40B4-BE49-F238E27FC236}">
+                <a16:creationId xmlns:a16="http://schemas.microsoft.com/office/drawing/2014/main" id="{78F7F509-4CBC-08A3-8EE2-8B07D9BF60D6}"/>
+              </a:ext>
+            </a:extLst>
+          </p:cNvPr>
+          <p:cNvPicPr>
+            <a:picLocks noChangeAspect="1"/>
+          </p:cNvPicPr>
+          <p:nvPr/>
+        </p:nvPicPr>
+        <p:blipFill>
+          <a:blip r:embed="rId3" cstate="print">
+            <a:extLst>
+              <a:ext uri="{28A0092B-C50C-407E-A947-70E740481C1C}">
+                <a14:useLocalDpi xmlns:a14="http://schemas.microsoft.com/office/drawing/2010/main" val="0"/>
+              </a:ext>
+            </a:extLst>
+          </a:blip>
+          <a:stretch>
+            <a:fillRect/>
+          </a:stretch>
+        </p:blipFill>
+        <p:spPr>
+          <a:xfrm>
+            <a:off x="3671524" y="719170"/>
+            <a:ext cx="3765549" cy="2824162"/>
+          </a:xfrm>
+          <a:prstGeom prst="rect">
+            <a:avLst/>
+          </a:prstGeom>
+        </p:spPr>
+      </p:pic>
+      <p:pic>
+        <p:nvPicPr>
+          <p:cNvPr id="11" name="Picture 10">
+            <a:extLst>
+              <a:ext uri="{FF2B5EF4-FFF2-40B4-BE49-F238E27FC236}">
+                <a16:creationId xmlns:a16="http://schemas.microsoft.com/office/drawing/2014/main" id="{F236008F-DB1A-672C-3C19-B64A7C5BB81F}"/>
+              </a:ext>
+            </a:extLst>
+          </p:cNvPr>
+          <p:cNvPicPr>
+            <a:picLocks noChangeAspect="1"/>
+          </p:cNvPicPr>
+          <p:nvPr/>
+        </p:nvPicPr>
+        <p:blipFill>
+          <a:blip r:embed="rId4" cstate="print">
+            <a:extLst>
+              <a:ext uri="{28A0092B-C50C-407E-A947-70E740481C1C}">
+                <a14:useLocalDpi xmlns:a14="http://schemas.microsoft.com/office/drawing/2010/main" val="0"/>
+              </a:ext>
+            </a:extLst>
+          </a:blip>
+          <a:stretch>
+            <a:fillRect/>
+          </a:stretch>
+        </p:blipFill>
+        <p:spPr>
+          <a:xfrm>
+            <a:off x="7337744" y="719170"/>
+            <a:ext cx="3765549" cy="2824162"/>
+          </a:xfrm>
+          <a:prstGeom prst="rect">
+            <a:avLst/>
+          </a:prstGeom>
+        </p:spPr>
+      </p:pic>
+      <p:sp>
+        <p:nvSpPr>
+          <p:cNvPr id="7" name="TextBox 6">
+            <a:extLst>
+              <a:ext uri="{FF2B5EF4-FFF2-40B4-BE49-F238E27FC236}">
+                <a16:creationId xmlns:a16="http://schemas.microsoft.com/office/drawing/2014/main" id="{3927DC66-0A9C-6E1F-1351-DD2D9218BB17}"/>
+              </a:ext>
+            </a:extLst>
+          </p:cNvPr>
+          <p:cNvSpPr txBox="1"/>
+          <p:nvPr/>
+        </p:nvSpPr>
+        <p:spPr>
+          <a:xfrm>
+            <a:off x="10853566" y="1850528"/>
+            <a:ext cx="1292213" cy="338554"/>
+          </a:xfrm>
+          <a:prstGeom prst="rect">
+            <a:avLst/>
+          </a:prstGeom>
+          <a:noFill/>
+          <a:ln>
+            <a:solidFill>
+              <a:schemeClr val="tx1"/>
+            </a:solidFill>
+          </a:ln>
+        </p:spPr>
+        <p:txBody>
+          <a:bodyPr wrap="none" rtlCol="0">
+            <a:spAutoFit/>
+          </a:bodyPr>
+          <a:lstStyle/>
+          <a:p>
+            <a:r>
+              <a:rPr lang="en-US" sz="1600" dirty="0"/>
+              <a:t>Daily average</a:t>
+            </a:r>
+          </a:p>
+        </p:txBody>
+      </p:sp>
+    </p:spTree>
+    <p:extLst>
+      <p:ext uri="{BB962C8B-B14F-4D97-AF65-F5344CB8AC3E}">
+        <p14:creationId xmlns:p14="http://schemas.microsoft.com/office/powerpoint/2010/main" val="2389441221"/>
+      </p:ext>
+    </p:extLst>
+  </p:cSld>
+  <p:clrMapOvr>
+    <a:masterClrMapping/>
+  </p:clrMapOvr>
+</p:sld>
+</file>
+
+<file path=ppt/slides/slide14.xml><?xml version="1.0" encoding="utf-8"?>
+<p:sld xmlns:a="http://schemas.openxmlformats.org/drawingml/2006/main" xmlns:r="http://schemas.openxmlformats.org/officeDocument/2006/relationships" xmlns:p="http://schemas.openxmlformats.org/presentationml/2006/main">
+  <p:cSld>
+    <p:spTree>
+      <p:nvGrpSpPr>
+        <p:cNvPr id="1" name=""/>
+        <p:cNvGrpSpPr/>
+        <p:nvPr/>
+      </p:nvGrpSpPr>
+      <p:grpSpPr>
+        <a:xfrm>
+          <a:off x="0" y="0"/>
+          <a:ext cx="0" cy="0"/>
+          <a:chOff x="0" y="0"/>
+          <a:chExt cx="0" cy="0"/>
+        </a:xfrm>
+      </p:grpSpPr>
+      <p:sp>
+        <p:nvSpPr>
+          <p:cNvPr id="2" name="Title 1">
+            <a:extLst>
+              <a:ext uri="{FF2B5EF4-FFF2-40B4-BE49-F238E27FC236}">
+                <a16:creationId xmlns:a16="http://schemas.microsoft.com/office/drawing/2014/main" id="{35D1CFB4-6B3B-A24D-496D-61F77A311C0D}"/>
+              </a:ext>
+            </a:extLst>
+          </p:cNvPr>
+          <p:cNvSpPr>
+            <a:spLocks noGrp="1"/>
+          </p:cNvSpPr>
+          <p:nvPr>
+            <p:ph type="title"/>
+          </p:nvPr>
+        </p:nvSpPr>
+        <p:spPr>
+          <a:xfrm>
+            <a:off x="128225" y="73981"/>
+            <a:ext cx="10515600" cy="530802"/>
+          </a:xfrm>
+        </p:spPr>
+        <p:txBody>
+          <a:bodyPr>
+            <a:normAutofit fontScale="90000"/>
+          </a:bodyPr>
+          <a:lstStyle/>
+          <a:p>
+            <a:r>
+              <a:rPr lang="en-US" dirty="0"/>
+              <a:t>Cat</a:t>
+            </a:r>
+          </a:p>
+        </p:txBody>
+      </p:sp>
+      <p:sp>
+        <p:nvSpPr>
+          <p:cNvPr id="6" name="TextBox 5">
+            <a:extLst>
+              <a:ext uri="{FF2B5EF4-FFF2-40B4-BE49-F238E27FC236}">
+                <a16:creationId xmlns:a16="http://schemas.microsoft.com/office/drawing/2014/main" id="{C9C84A0F-F923-796A-A8DB-13B8E889B417}"/>
+              </a:ext>
+            </a:extLst>
+          </p:cNvPr>
+          <p:cNvSpPr txBox="1"/>
+          <p:nvPr/>
+        </p:nvSpPr>
+        <p:spPr>
+          <a:xfrm>
+            <a:off x="4448910" y="188368"/>
+            <a:ext cx="1978427" cy="338554"/>
+          </a:xfrm>
+          <a:prstGeom prst="rect">
+            <a:avLst/>
+          </a:prstGeom>
+          <a:noFill/>
+          <a:ln>
+            <a:solidFill>
+              <a:schemeClr val="tx1"/>
+            </a:solidFill>
+          </a:ln>
+        </p:spPr>
+        <p:txBody>
+          <a:bodyPr wrap="none" rtlCol="0">
+            <a:spAutoFit/>
+          </a:bodyPr>
+          <a:lstStyle/>
+          <a:p>
+            <a:r>
+              <a:rPr lang="en-US" sz="1600" dirty="0"/>
+              <a:t>channel 160, node 31</a:t>
+            </a:r>
+          </a:p>
+        </p:txBody>
+      </p:sp>
+      <p:sp>
+        <p:nvSpPr>
+          <p:cNvPr id="7" name="TextBox 6">
+            <a:extLst>
+              <a:ext uri="{FF2B5EF4-FFF2-40B4-BE49-F238E27FC236}">
+                <a16:creationId xmlns:a16="http://schemas.microsoft.com/office/drawing/2014/main" id="{3927DC66-0A9C-6E1F-1351-DD2D9218BB17}"/>
+              </a:ext>
+            </a:extLst>
+          </p:cNvPr>
+          <p:cNvSpPr txBox="1"/>
+          <p:nvPr/>
+        </p:nvSpPr>
+        <p:spPr>
+          <a:xfrm>
+            <a:off x="10768084" y="1850528"/>
+            <a:ext cx="1292213" cy="338554"/>
+          </a:xfrm>
+          <a:prstGeom prst="rect">
+            <a:avLst/>
+          </a:prstGeom>
+          <a:noFill/>
+          <a:ln>
+            <a:solidFill>
+              <a:schemeClr val="tx1"/>
+            </a:solidFill>
+          </a:ln>
+        </p:spPr>
+        <p:txBody>
+          <a:bodyPr wrap="none" rtlCol="0">
+            <a:spAutoFit/>
+          </a:bodyPr>
+          <a:lstStyle/>
+          <a:p>
+            <a:r>
+              <a:rPr lang="en-US" sz="1600" dirty="0"/>
+              <a:t>Daily average</a:t>
+            </a:r>
+          </a:p>
+        </p:txBody>
+      </p:sp>
+      <p:sp>
+        <p:nvSpPr>
+          <p:cNvPr id="9" name="TextBox 8">
+            <a:extLst>
+              <a:ext uri="{FF2B5EF4-FFF2-40B4-BE49-F238E27FC236}">
+                <a16:creationId xmlns:a16="http://schemas.microsoft.com/office/drawing/2014/main" id="{1E0FDA2C-57EE-59D9-43F2-099A0FC9DA60}"/>
+              </a:ext>
+            </a:extLst>
+          </p:cNvPr>
+          <p:cNvSpPr txBox="1"/>
+          <p:nvPr/>
+        </p:nvSpPr>
+        <p:spPr>
+          <a:xfrm>
+            <a:off x="10707693" y="5226166"/>
+            <a:ext cx="1438086" cy="338554"/>
+          </a:xfrm>
+          <a:prstGeom prst="rect">
+            <a:avLst/>
+          </a:prstGeom>
+          <a:noFill/>
+          <a:ln>
+            <a:solidFill>
+              <a:schemeClr val="tx1"/>
+            </a:solidFill>
+          </a:ln>
+        </p:spPr>
+        <p:txBody>
+          <a:bodyPr wrap="none" rtlCol="0">
+            <a:spAutoFit/>
+          </a:bodyPr>
+          <a:lstStyle/>
+          <a:p>
+            <a:r>
+              <a:rPr lang="en-US" sz="1600" dirty="0"/>
+              <a:t>Hourly average</a:t>
+            </a:r>
+          </a:p>
+        </p:txBody>
+      </p:sp>
+      <p:pic>
+        <p:nvPicPr>
+          <p:cNvPr id="3" name="Picture 2" descr="Chart, histogram&#10;&#10;Description automatically generated">
+            <a:extLst>
+              <a:ext uri="{FF2B5EF4-FFF2-40B4-BE49-F238E27FC236}">
+                <a16:creationId xmlns:a16="http://schemas.microsoft.com/office/drawing/2014/main" id="{BC4E1979-6786-22A5-B49E-FB87AEB870E7}"/>
+              </a:ext>
+            </a:extLst>
+          </p:cNvPr>
+          <p:cNvPicPr>
+            <a:picLocks noChangeAspect="1"/>
+          </p:cNvPicPr>
+          <p:nvPr/>
+        </p:nvPicPr>
+        <p:blipFill>
+          <a:blip r:embed="rId2" cstate="print">
+            <a:extLst>
+              <a:ext uri="{28A0092B-C50C-407E-A947-70E740481C1C}">
+                <a14:useLocalDpi xmlns:a14="http://schemas.microsoft.com/office/drawing/2010/main" val="0"/>
+              </a:ext>
+            </a:extLst>
+          </a:blip>
+          <a:stretch>
+            <a:fillRect/>
+          </a:stretch>
+        </p:blipFill>
+        <p:spPr>
+          <a:xfrm>
+            <a:off x="-40957" y="719170"/>
+            <a:ext cx="3762455" cy="2821841"/>
+          </a:xfrm>
+          <a:prstGeom prst="rect">
+            <a:avLst/>
+          </a:prstGeom>
+        </p:spPr>
+      </p:pic>
+      <p:pic>
+        <p:nvPicPr>
+          <p:cNvPr id="4" name="Picture 3" descr="Chart, histogram&#10;&#10;Description automatically generated">
+            <a:extLst>
+              <a:ext uri="{FF2B5EF4-FFF2-40B4-BE49-F238E27FC236}">
+                <a16:creationId xmlns:a16="http://schemas.microsoft.com/office/drawing/2014/main" id="{F8BCD1EB-656E-FEC2-9747-50CB4F9643B0}"/>
+              </a:ext>
+            </a:extLst>
+          </p:cNvPr>
+          <p:cNvPicPr>
+            <a:picLocks noChangeAspect="1"/>
+          </p:cNvPicPr>
+          <p:nvPr/>
+        </p:nvPicPr>
+        <p:blipFill>
+          <a:blip r:embed="rId3" cstate="print">
+            <a:extLst>
+              <a:ext uri="{28A0092B-C50C-407E-A947-70E740481C1C}">
+                <a14:useLocalDpi xmlns:a14="http://schemas.microsoft.com/office/drawing/2010/main" val="0"/>
+              </a:ext>
+            </a:extLst>
+          </a:blip>
+          <a:stretch>
+            <a:fillRect/>
+          </a:stretch>
+        </p:blipFill>
+        <p:spPr>
+          <a:xfrm>
+            <a:off x="3671524" y="719170"/>
+            <a:ext cx="3674383" cy="2755787"/>
+          </a:xfrm>
+          <a:prstGeom prst="rect">
+            <a:avLst/>
+          </a:prstGeom>
+        </p:spPr>
+      </p:pic>
+      <p:pic>
+        <p:nvPicPr>
+          <p:cNvPr id="5" name="Picture 4" descr="Chart, histogram&#10;&#10;Description automatically generated">
+            <a:extLst>
+              <a:ext uri="{FF2B5EF4-FFF2-40B4-BE49-F238E27FC236}">
+                <a16:creationId xmlns:a16="http://schemas.microsoft.com/office/drawing/2014/main" id="{8C595270-114F-9E13-491C-B593A81C39A3}"/>
+              </a:ext>
+            </a:extLst>
+          </p:cNvPr>
+          <p:cNvPicPr>
+            <a:picLocks noChangeAspect="1"/>
+          </p:cNvPicPr>
+          <p:nvPr/>
+        </p:nvPicPr>
+        <p:blipFill>
+          <a:blip r:embed="rId4" cstate="print">
+            <a:extLst>
+              <a:ext uri="{28A0092B-C50C-407E-A947-70E740481C1C}">
+                <a14:useLocalDpi xmlns:a14="http://schemas.microsoft.com/office/drawing/2010/main" val="0"/>
+              </a:ext>
+            </a:extLst>
+          </a:blip>
+          <a:stretch>
+            <a:fillRect/>
+          </a:stretch>
+        </p:blipFill>
+        <p:spPr>
+          <a:xfrm>
+            <a:off x="7143674" y="719169"/>
+            <a:ext cx="3624409" cy="2718307"/>
+          </a:xfrm>
+          <a:prstGeom prst="rect">
+            <a:avLst/>
+          </a:prstGeom>
+        </p:spPr>
+      </p:pic>
+    </p:spTree>
+    <p:extLst>
+      <p:ext uri="{BB962C8B-B14F-4D97-AF65-F5344CB8AC3E}">
+        <p14:creationId xmlns:p14="http://schemas.microsoft.com/office/powerpoint/2010/main" val="1571644646"/>
+      </p:ext>
+    </p:extLst>
+  </p:cSld>
+  <p:clrMapOvr>
+    <a:masterClrMapping/>
+  </p:clrMapOvr>
+</p:sld>
+</file>
+
+<file path=ppt/slides/slide15.xml><?xml version="1.0" encoding="utf-8"?>
+<p:sld xmlns:a="http://schemas.openxmlformats.org/drawingml/2006/main" xmlns:r="http://schemas.openxmlformats.org/officeDocument/2006/relationships" xmlns:p="http://schemas.openxmlformats.org/presentationml/2006/main">
+  <p:cSld>
+    <p:spTree>
+      <p:nvGrpSpPr>
+        <p:cNvPr id="1" name=""/>
+        <p:cNvGrpSpPr/>
+        <p:nvPr/>
+      </p:nvGrpSpPr>
+      <p:grpSpPr>
+        <a:xfrm>
+          <a:off x="0" y="0"/>
+          <a:ext cx="0" cy="0"/>
+          <a:chOff x="0" y="0"/>
+          <a:chExt cx="0" cy="0"/>
+        </a:xfrm>
+      </p:grpSpPr>
+      <p:sp>
+        <p:nvSpPr>
+          <p:cNvPr id="2" name="Title 1">
+            <a:extLst>
+              <a:ext uri="{FF2B5EF4-FFF2-40B4-BE49-F238E27FC236}">
+                <a16:creationId xmlns:a16="http://schemas.microsoft.com/office/drawing/2014/main" id="{35D1CFB4-6B3B-A24D-496D-61F77A311C0D}"/>
+              </a:ext>
+            </a:extLst>
+          </p:cNvPr>
+          <p:cNvSpPr>
+            <a:spLocks noGrp="1"/>
+          </p:cNvSpPr>
+          <p:nvPr>
+            <p:ph type="title"/>
+          </p:nvPr>
+        </p:nvSpPr>
+        <p:spPr>
+          <a:xfrm>
+            <a:off x="128225" y="73981"/>
+            <a:ext cx="10515600" cy="530802"/>
+          </a:xfrm>
+        </p:spPr>
+        <p:txBody>
+          <a:bodyPr>
+            <a:normAutofit fontScale="90000"/>
+          </a:bodyPr>
+          <a:lstStyle/>
+          <a:p>
+            <a:r>
+              <a:rPr lang="en-US" dirty="0"/>
+              <a:t>Cat</a:t>
+            </a:r>
+          </a:p>
+        </p:txBody>
+      </p:sp>
+      <p:sp>
+        <p:nvSpPr>
+          <p:cNvPr id="6" name="TextBox 5">
+            <a:extLst>
+              <a:ext uri="{FF2B5EF4-FFF2-40B4-BE49-F238E27FC236}">
+                <a16:creationId xmlns:a16="http://schemas.microsoft.com/office/drawing/2014/main" id="{C9C84A0F-F923-796A-A8DB-13B8E889B417}"/>
+              </a:ext>
+            </a:extLst>
+          </p:cNvPr>
+          <p:cNvSpPr txBox="1"/>
+          <p:nvPr/>
+        </p:nvSpPr>
+        <p:spPr>
+          <a:xfrm>
+            <a:off x="4448910" y="188368"/>
+            <a:ext cx="1978427" cy="338554"/>
+          </a:xfrm>
+          <a:prstGeom prst="rect">
+            <a:avLst/>
+          </a:prstGeom>
+          <a:noFill/>
+          <a:ln>
+            <a:solidFill>
+              <a:schemeClr val="tx1"/>
+            </a:solidFill>
+          </a:ln>
+        </p:spPr>
+        <p:txBody>
+          <a:bodyPr wrap="none" rtlCol="0">
+            <a:spAutoFit/>
+          </a:bodyPr>
+          <a:lstStyle/>
+          <a:p>
+            <a:r>
+              <a:rPr lang="en-US" sz="1600" dirty="0"/>
+              <a:t>channel 124, node 38</a:t>
+            </a:r>
+          </a:p>
+        </p:txBody>
+      </p:sp>
+      <p:sp>
+        <p:nvSpPr>
+          <p:cNvPr id="7" name="TextBox 6">
+            <a:extLst>
+              <a:ext uri="{FF2B5EF4-FFF2-40B4-BE49-F238E27FC236}">
+                <a16:creationId xmlns:a16="http://schemas.microsoft.com/office/drawing/2014/main" id="{3927DC66-0A9C-6E1F-1351-DD2D9218BB17}"/>
+              </a:ext>
+            </a:extLst>
+          </p:cNvPr>
+          <p:cNvSpPr txBox="1"/>
+          <p:nvPr/>
+        </p:nvSpPr>
+        <p:spPr>
+          <a:xfrm>
+            <a:off x="10768084" y="1850528"/>
+            <a:ext cx="1292213" cy="338554"/>
+          </a:xfrm>
+          <a:prstGeom prst="rect">
+            <a:avLst/>
+          </a:prstGeom>
+          <a:noFill/>
+          <a:ln>
+            <a:solidFill>
+              <a:schemeClr val="tx1"/>
+            </a:solidFill>
+          </a:ln>
+        </p:spPr>
+        <p:txBody>
+          <a:bodyPr wrap="none" rtlCol="0">
+            <a:spAutoFit/>
+          </a:bodyPr>
+          <a:lstStyle/>
+          <a:p>
+            <a:r>
+              <a:rPr lang="en-US" sz="1600" dirty="0"/>
+              <a:t>Daily average</a:t>
+            </a:r>
+          </a:p>
+        </p:txBody>
+      </p:sp>
+      <p:sp>
+        <p:nvSpPr>
+          <p:cNvPr id="9" name="TextBox 8">
+            <a:extLst>
+              <a:ext uri="{FF2B5EF4-FFF2-40B4-BE49-F238E27FC236}">
+                <a16:creationId xmlns:a16="http://schemas.microsoft.com/office/drawing/2014/main" id="{1E0FDA2C-57EE-59D9-43F2-099A0FC9DA60}"/>
+              </a:ext>
+            </a:extLst>
+          </p:cNvPr>
+          <p:cNvSpPr txBox="1"/>
+          <p:nvPr/>
+        </p:nvSpPr>
+        <p:spPr>
+          <a:xfrm>
+            <a:off x="10707693" y="5226166"/>
+            <a:ext cx="1438086" cy="338554"/>
+          </a:xfrm>
+          <a:prstGeom prst="rect">
+            <a:avLst/>
+          </a:prstGeom>
+          <a:noFill/>
+          <a:ln>
+            <a:solidFill>
+              <a:schemeClr val="tx1"/>
+            </a:solidFill>
+          </a:ln>
+        </p:spPr>
+        <p:txBody>
+          <a:bodyPr wrap="none" rtlCol="0">
+            <a:spAutoFit/>
+          </a:bodyPr>
+          <a:lstStyle/>
+          <a:p>
+            <a:r>
+              <a:rPr lang="en-US" sz="1600" dirty="0"/>
+              <a:t>Hourly average</a:t>
+            </a:r>
+          </a:p>
+        </p:txBody>
+      </p:sp>
+      <p:pic>
+        <p:nvPicPr>
+          <p:cNvPr id="4" name="Picture 3" descr="Chart, histogram&#10;&#10;Description automatically generated">
+            <a:extLst>
+              <a:ext uri="{FF2B5EF4-FFF2-40B4-BE49-F238E27FC236}">
+                <a16:creationId xmlns:a16="http://schemas.microsoft.com/office/drawing/2014/main" id="{A3B2D16C-2748-1E3B-AC56-2B5FEFB17854}"/>
+              </a:ext>
+            </a:extLst>
+          </p:cNvPr>
+          <p:cNvPicPr>
+            <a:picLocks noChangeAspect="1"/>
+          </p:cNvPicPr>
+          <p:nvPr/>
+        </p:nvPicPr>
+        <p:blipFill>
+          <a:blip r:embed="rId2" cstate="print">
+            <a:extLst>
+              <a:ext uri="{28A0092B-C50C-407E-A947-70E740481C1C}">
+                <a14:useLocalDpi xmlns:a14="http://schemas.microsoft.com/office/drawing/2010/main" val="0"/>
+              </a:ext>
+            </a:extLst>
+          </a:blip>
+          <a:stretch>
+            <a:fillRect/>
+          </a:stretch>
+        </p:blipFill>
+        <p:spPr>
+          <a:xfrm>
+            <a:off x="128225" y="969261"/>
+            <a:ext cx="3429000" cy="2571750"/>
+          </a:xfrm>
+          <a:prstGeom prst="rect">
+            <a:avLst/>
+          </a:prstGeom>
+        </p:spPr>
+      </p:pic>
+      <p:pic>
+        <p:nvPicPr>
+          <p:cNvPr id="5" name="Picture 4" descr="Chart, histogram&#10;&#10;Description automatically generated">
+            <a:extLst>
+              <a:ext uri="{FF2B5EF4-FFF2-40B4-BE49-F238E27FC236}">
+                <a16:creationId xmlns:a16="http://schemas.microsoft.com/office/drawing/2014/main" id="{514B79AF-B1B7-249F-C042-5B1386FB2692}"/>
+              </a:ext>
+            </a:extLst>
+          </p:cNvPr>
+          <p:cNvPicPr>
+            <a:picLocks noChangeAspect="1"/>
+          </p:cNvPicPr>
+          <p:nvPr/>
+        </p:nvPicPr>
+        <p:blipFill>
+          <a:blip r:embed="rId3" cstate="print">
+            <a:extLst>
+              <a:ext uri="{28A0092B-C50C-407E-A947-70E740481C1C}">
+                <a14:useLocalDpi xmlns:a14="http://schemas.microsoft.com/office/drawing/2010/main" val="0"/>
+              </a:ext>
+            </a:extLst>
+          </a:blip>
+          <a:stretch>
+            <a:fillRect/>
+          </a:stretch>
+        </p:blipFill>
+        <p:spPr>
+          <a:xfrm>
+            <a:off x="3458711" y="969261"/>
+            <a:ext cx="3429000" cy="2571750"/>
+          </a:xfrm>
+          <a:prstGeom prst="rect">
+            <a:avLst/>
+          </a:prstGeom>
+        </p:spPr>
+      </p:pic>
+      <p:pic>
+        <p:nvPicPr>
+          <p:cNvPr id="8" name="Picture 7" descr="Chart, histogram&#10;&#10;Description automatically generated">
+            <a:extLst>
+              <a:ext uri="{FF2B5EF4-FFF2-40B4-BE49-F238E27FC236}">
+                <a16:creationId xmlns:a16="http://schemas.microsoft.com/office/drawing/2014/main" id="{FCD8F6F2-EDB9-FB0E-EA85-B460117BCAED}"/>
+              </a:ext>
+            </a:extLst>
+          </p:cNvPr>
+          <p:cNvPicPr>
+            <a:picLocks noChangeAspect="1"/>
+          </p:cNvPicPr>
+          <p:nvPr/>
+        </p:nvPicPr>
+        <p:blipFill>
+          <a:blip r:embed="rId4" cstate="print">
+            <a:extLst>
+              <a:ext uri="{28A0092B-C50C-407E-A947-70E740481C1C}">
+                <a14:useLocalDpi xmlns:a14="http://schemas.microsoft.com/office/drawing/2010/main" val="0"/>
+              </a:ext>
+            </a:extLst>
+          </a:blip>
+          <a:stretch>
+            <a:fillRect/>
+          </a:stretch>
+        </p:blipFill>
+        <p:spPr>
+          <a:xfrm>
+            <a:off x="6789197" y="969261"/>
+            <a:ext cx="3429000" cy="2571750"/>
+          </a:xfrm>
+          <a:prstGeom prst="rect">
+            <a:avLst/>
+          </a:prstGeom>
+        </p:spPr>
+      </p:pic>
+    </p:spTree>
+    <p:extLst>
+      <p:ext uri="{BB962C8B-B14F-4D97-AF65-F5344CB8AC3E}">
+        <p14:creationId xmlns:p14="http://schemas.microsoft.com/office/powerpoint/2010/main" val="2008240708"/>
+      </p:ext>
+    </p:extLst>
+  </p:cSld>
+  <p:clrMapOvr>
+    <a:masterClrMapping/>
+  </p:clrMapOvr>
+</p:sld>
+</file>
+
+<file path=ppt/slides/slide16.xml><?xml version="1.0" encoding="utf-8"?>
+<p:sld xmlns:a="http://schemas.openxmlformats.org/drawingml/2006/main" xmlns:r="http://schemas.openxmlformats.org/officeDocument/2006/relationships" xmlns:p="http://schemas.openxmlformats.org/presentationml/2006/main">
+  <p:cSld>
+    <p:spTree>
+      <p:nvGrpSpPr>
+        <p:cNvPr id="1" name=""/>
+        <p:cNvGrpSpPr/>
+        <p:nvPr/>
+      </p:nvGrpSpPr>
+      <p:grpSpPr>
+        <a:xfrm>
+          <a:off x="0" y="0"/>
+          <a:ext cx="0" cy="0"/>
+          <a:chOff x="0" y="0"/>
+          <a:chExt cx="0" cy="0"/>
+        </a:xfrm>
+      </p:grpSpPr>
+      <p:sp>
+        <p:nvSpPr>
+          <p:cNvPr id="2" name="Title 1">
+            <a:extLst>
+              <a:ext uri="{FF2B5EF4-FFF2-40B4-BE49-F238E27FC236}">
+                <a16:creationId xmlns:a16="http://schemas.microsoft.com/office/drawing/2014/main" id="{35D1CFB4-6B3B-A24D-496D-61F77A311C0D}"/>
+              </a:ext>
+            </a:extLst>
+          </p:cNvPr>
+          <p:cNvSpPr>
+            <a:spLocks noGrp="1"/>
+          </p:cNvSpPr>
+          <p:nvPr>
+            <p:ph type="title"/>
+          </p:nvPr>
+        </p:nvSpPr>
+        <p:spPr>
+          <a:xfrm>
+            <a:off x="128225" y="73981"/>
+            <a:ext cx="10515600" cy="530802"/>
+          </a:xfrm>
+        </p:spPr>
+        <p:txBody>
+          <a:bodyPr>
+            <a:normAutofit fontScale="90000"/>
+          </a:bodyPr>
+          <a:lstStyle/>
+          <a:p>
+            <a:r>
+              <a:rPr lang="en-US" dirty="0"/>
+              <a:t>Cat</a:t>
+            </a:r>
+          </a:p>
+        </p:txBody>
+      </p:sp>
+      <p:sp>
+        <p:nvSpPr>
+          <p:cNvPr id="6" name="TextBox 5">
+            <a:extLst>
+              <a:ext uri="{FF2B5EF4-FFF2-40B4-BE49-F238E27FC236}">
+                <a16:creationId xmlns:a16="http://schemas.microsoft.com/office/drawing/2014/main" id="{C9C84A0F-F923-796A-A8DB-13B8E889B417}"/>
+              </a:ext>
+            </a:extLst>
+          </p:cNvPr>
+          <p:cNvSpPr txBox="1"/>
+          <p:nvPr/>
+        </p:nvSpPr>
+        <p:spPr>
+          <a:xfrm>
+            <a:off x="4448910" y="188368"/>
+            <a:ext cx="1978427" cy="338554"/>
+          </a:xfrm>
+          <a:prstGeom prst="rect">
+            <a:avLst/>
+          </a:prstGeom>
+          <a:noFill/>
+          <a:ln>
+            <a:solidFill>
+              <a:schemeClr val="tx1"/>
+            </a:solidFill>
+          </a:ln>
+        </p:spPr>
+        <p:txBody>
+          <a:bodyPr wrap="none" rtlCol="0">
+            <a:spAutoFit/>
+          </a:bodyPr>
+          <a:lstStyle/>
+          <a:p>
+            <a:r>
+              <a:rPr lang="en-US" sz="1600" dirty="0"/>
+              <a:t>channel 106, node 93</a:t>
+            </a:r>
+          </a:p>
+        </p:txBody>
+      </p:sp>
+      <p:sp>
+        <p:nvSpPr>
+          <p:cNvPr id="7" name="TextBox 6">
+            <a:extLst>
+              <a:ext uri="{FF2B5EF4-FFF2-40B4-BE49-F238E27FC236}">
+                <a16:creationId xmlns:a16="http://schemas.microsoft.com/office/drawing/2014/main" id="{3927DC66-0A9C-6E1F-1351-DD2D9218BB17}"/>
+              </a:ext>
+            </a:extLst>
+          </p:cNvPr>
+          <p:cNvSpPr txBox="1"/>
+          <p:nvPr/>
+        </p:nvSpPr>
+        <p:spPr>
+          <a:xfrm>
+            <a:off x="10768084" y="1850528"/>
+            <a:ext cx="1292213" cy="338554"/>
+          </a:xfrm>
+          <a:prstGeom prst="rect">
+            <a:avLst/>
+          </a:prstGeom>
+          <a:noFill/>
+          <a:ln>
+            <a:solidFill>
+              <a:schemeClr val="tx1"/>
+            </a:solidFill>
+          </a:ln>
+        </p:spPr>
+        <p:txBody>
+          <a:bodyPr wrap="none" rtlCol="0">
+            <a:spAutoFit/>
+          </a:bodyPr>
+          <a:lstStyle/>
+          <a:p>
+            <a:r>
+              <a:rPr lang="en-US" sz="1600" dirty="0"/>
+              <a:t>Daily average</a:t>
+            </a:r>
+          </a:p>
+        </p:txBody>
+      </p:sp>
+      <p:sp>
+        <p:nvSpPr>
+          <p:cNvPr id="9" name="TextBox 8">
+            <a:extLst>
+              <a:ext uri="{FF2B5EF4-FFF2-40B4-BE49-F238E27FC236}">
+                <a16:creationId xmlns:a16="http://schemas.microsoft.com/office/drawing/2014/main" id="{1E0FDA2C-57EE-59D9-43F2-099A0FC9DA60}"/>
+              </a:ext>
+            </a:extLst>
+          </p:cNvPr>
+          <p:cNvSpPr txBox="1"/>
+          <p:nvPr/>
+        </p:nvSpPr>
+        <p:spPr>
+          <a:xfrm>
+            <a:off x="10707693" y="5226166"/>
+            <a:ext cx="1438086" cy="338554"/>
+          </a:xfrm>
+          <a:prstGeom prst="rect">
+            <a:avLst/>
+          </a:prstGeom>
+          <a:noFill/>
+          <a:ln>
+            <a:solidFill>
+              <a:schemeClr val="tx1"/>
+            </a:solidFill>
+          </a:ln>
+        </p:spPr>
+        <p:txBody>
+          <a:bodyPr wrap="none" rtlCol="0">
+            <a:spAutoFit/>
+          </a:bodyPr>
+          <a:lstStyle/>
+          <a:p>
+            <a:r>
+              <a:rPr lang="en-US" sz="1600" dirty="0"/>
+              <a:t>Hourly average</a:t>
+            </a:r>
+          </a:p>
+        </p:txBody>
+      </p:sp>
+      <p:pic>
+        <p:nvPicPr>
+          <p:cNvPr id="10" name="Picture 9" descr="Chart, histogram&#10;&#10;Description automatically generated">
+            <a:extLst>
+              <a:ext uri="{FF2B5EF4-FFF2-40B4-BE49-F238E27FC236}">
+                <a16:creationId xmlns:a16="http://schemas.microsoft.com/office/drawing/2014/main" id="{A763625D-09EC-71D4-EFF1-3357C390DACD}"/>
+              </a:ext>
+            </a:extLst>
+          </p:cNvPr>
+          <p:cNvPicPr>
+            <a:picLocks noChangeAspect="1"/>
+          </p:cNvPicPr>
+          <p:nvPr/>
+        </p:nvPicPr>
+        <p:blipFill>
+          <a:blip r:embed="rId2" cstate="print">
+            <a:extLst>
+              <a:ext uri="{28A0092B-C50C-407E-A947-70E740481C1C}">
+                <a14:useLocalDpi xmlns:a14="http://schemas.microsoft.com/office/drawing/2010/main" val="0"/>
+              </a:ext>
+            </a:extLst>
+          </a:blip>
+          <a:stretch>
+            <a:fillRect/>
+          </a:stretch>
+        </p:blipFill>
+        <p:spPr>
+          <a:xfrm>
+            <a:off x="-1" y="702871"/>
+            <a:ext cx="3784187" cy="2838140"/>
+          </a:xfrm>
+          <a:prstGeom prst="rect">
+            <a:avLst/>
+          </a:prstGeom>
+        </p:spPr>
+      </p:pic>
+      <p:pic>
+        <p:nvPicPr>
+          <p:cNvPr id="11" name="Picture 10" descr="Chart, histogram&#10;&#10;Description automatically generated">
+            <a:extLst>
+              <a:ext uri="{FF2B5EF4-FFF2-40B4-BE49-F238E27FC236}">
+                <a16:creationId xmlns:a16="http://schemas.microsoft.com/office/drawing/2014/main" id="{B68CFEAF-A051-EC6E-9ECC-5D58D852EA00}"/>
+              </a:ext>
+            </a:extLst>
+          </p:cNvPr>
+          <p:cNvPicPr>
+            <a:picLocks noChangeAspect="1"/>
+          </p:cNvPicPr>
+          <p:nvPr/>
+        </p:nvPicPr>
+        <p:blipFill>
+          <a:blip r:embed="rId3" cstate="print">
+            <a:extLst>
+              <a:ext uri="{28A0092B-C50C-407E-A947-70E740481C1C}">
+                <a14:useLocalDpi xmlns:a14="http://schemas.microsoft.com/office/drawing/2010/main" val="0"/>
+              </a:ext>
+            </a:extLst>
+          </a:blip>
+          <a:stretch>
+            <a:fillRect/>
+          </a:stretch>
+        </p:blipFill>
+        <p:spPr>
+          <a:xfrm>
+            <a:off x="3618868" y="719170"/>
+            <a:ext cx="3762455" cy="2821841"/>
+          </a:xfrm>
+          <a:prstGeom prst="rect">
+            <a:avLst/>
+          </a:prstGeom>
+        </p:spPr>
+      </p:pic>
+      <p:pic>
+        <p:nvPicPr>
+          <p:cNvPr id="12" name="Picture 11" descr="Chart, histogram&#10;&#10;Description automatically generated">
+            <a:extLst>
+              <a:ext uri="{FF2B5EF4-FFF2-40B4-BE49-F238E27FC236}">
+                <a16:creationId xmlns:a16="http://schemas.microsoft.com/office/drawing/2014/main" id="{FF9FC845-BFCF-324C-F1E7-5C9AF9F6553F}"/>
+              </a:ext>
+            </a:extLst>
+          </p:cNvPr>
+          <p:cNvPicPr>
+            <a:picLocks noChangeAspect="1"/>
+          </p:cNvPicPr>
+          <p:nvPr/>
+        </p:nvPicPr>
+        <p:blipFill>
+          <a:blip r:embed="rId4" cstate="print">
+            <a:extLst>
+              <a:ext uri="{28A0092B-C50C-407E-A947-70E740481C1C}">
+                <a14:useLocalDpi xmlns:a14="http://schemas.microsoft.com/office/drawing/2010/main" val="0"/>
+              </a:ext>
+            </a:extLst>
+          </a:blip>
+          <a:stretch>
+            <a:fillRect/>
+          </a:stretch>
+        </p:blipFill>
+        <p:spPr>
+          <a:xfrm>
+            <a:off x="7278692" y="719170"/>
+            <a:ext cx="3762455" cy="2821841"/>
+          </a:xfrm>
+          <a:prstGeom prst="rect">
+            <a:avLst/>
+          </a:prstGeom>
+        </p:spPr>
+      </p:pic>
+    </p:spTree>
+    <p:extLst>
+      <p:ext uri="{BB962C8B-B14F-4D97-AF65-F5344CB8AC3E}">
+        <p14:creationId xmlns:p14="http://schemas.microsoft.com/office/powerpoint/2010/main" val="2044165108"/>
+      </p:ext>
+    </p:extLst>
+  </p:cSld>
+  <p:clrMapOvr>
+    <a:masterClrMapping/>
+  </p:clrMapOvr>
+</p:sld>
+</file>
+
+<file path=ppt/slides/slide17.xml><?xml version="1.0" encoding="utf-8"?>
+<p:sld xmlns:a="http://schemas.openxmlformats.org/drawingml/2006/main" xmlns:r="http://schemas.openxmlformats.org/officeDocument/2006/relationships" xmlns:p="http://schemas.openxmlformats.org/presentationml/2006/main">
+  <p:cSld>
+    <p:spTree>
+      <p:nvGrpSpPr>
+        <p:cNvPr id="1" name=""/>
+        <p:cNvGrpSpPr/>
+        <p:nvPr/>
+      </p:nvGrpSpPr>
+      <p:grpSpPr>
+        <a:xfrm>
+          <a:off x="0" y="0"/>
+          <a:ext cx="0" cy="0"/>
+          <a:chOff x="0" y="0"/>
+          <a:chExt cx="0" cy="0"/>
+        </a:xfrm>
+      </p:grpSpPr>
+      <p:sp>
+        <p:nvSpPr>
+          <p:cNvPr id="2" name="Title 1">
+            <a:extLst>
+              <a:ext uri="{FF2B5EF4-FFF2-40B4-BE49-F238E27FC236}">
+                <a16:creationId xmlns:a16="http://schemas.microsoft.com/office/drawing/2014/main" id="{EF92A176-DA57-F275-78DF-D3EE84A50CFD}"/>
+              </a:ext>
+            </a:extLst>
+          </p:cNvPr>
+          <p:cNvSpPr>
+            <a:spLocks noGrp="1"/>
+          </p:cNvSpPr>
+          <p:nvPr>
+            <p:ph type="title"/>
+          </p:nvPr>
+        </p:nvSpPr>
+        <p:spPr/>
+        <p:txBody>
+          <a:bodyPr/>
+          <a:lstStyle/>
+          <a:p>
+            <a:endParaRPr lang="en-US"/>
+          </a:p>
+        </p:txBody>
+      </p:sp>
+      <p:pic>
+        <p:nvPicPr>
+          <p:cNvPr id="5" name="Content Placeholder 4" descr="Chart, scatter chart&#10;&#10;Description automatically generated">
+            <a:extLst>
+              <a:ext uri="{FF2B5EF4-FFF2-40B4-BE49-F238E27FC236}">
+                <a16:creationId xmlns:a16="http://schemas.microsoft.com/office/drawing/2014/main" id="{CE99511F-0CCD-8220-BA67-00192E878A95}"/>
+              </a:ext>
+            </a:extLst>
+          </p:cNvPr>
+          <p:cNvPicPr>
+            <a:picLocks noGrp="1" noChangeAspect="1"/>
+          </p:cNvPicPr>
+          <p:nvPr>
+            <p:ph idx="1"/>
+          </p:nvPr>
+        </p:nvPicPr>
+        <p:blipFill>
+          <a:blip r:embed="rId2">
+            <a:extLst>
+              <a:ext uri="{28A0092B-C50C-407E-A947-70E740481C1C}">
+                <a14:useLocalDpi xmlns:a14="http://schemas.microsoft.com/office/drawing/2010/main" val="0"/>
+              </a:ext>
+            </a:extLst>
+          </a:blip>
+          <a:stretch>
+            <a:fillRect/>
+          </a:stretch>
+        </p:blipFill>
+        <p:spPr>
+          <a:xfrm>
+            <a:off x="201268" y="92364"/>
+            <a:ext cx="5149127" cy="6620308"/>
+          </a:xfrm>
+        </p:spPr>
+      </p:pic>
+    </p:spTree>
+    <p:extLst>
+      <p:ext uri="{BB962C8B-B14F-4D97-AF65-F5344CB8AC3E}">
+        <p14:creationId xmlns:p14="http://schemas.microsoft.com/office/powerpoint/2010/main" val="3624297614"/>
+      </p:ext>
+    </p:extLst>
+  </p:cSld>
+  <p:clrMapOvr>
+    <a:masterClrMapping/>
+  </p:clrMapOvr>
+</p:sld>
+</file>
+
 <file path=ppt/slides/slide2.xml><?xml version="1.0" encoding="utf-8"?>
 <p:sld xmlns:a="http://schemas.openxmlformats.org/drawingml/2006/main" xmlns:r="http://schemas.openxmlformats.org/officeDocument/2006/relationships" xmlns:p="http://schemas.openxmlformats.org/presentationml/2006/main">
   <p:cSld>
@@ -4124,7 +7015,7 @@
           <p:cNvPr id="2" name="Title 1">
             <a:extLst>
               <a:ext uri="{FF2B5EF4-FFF2-40B4-BE49-F238E27FC236}">
-                <a16:creationId xmlns:a16="http://schemas.microsoft.com/office/drawing/2014/main" id="{EF92A176-DA57-F275-78DF-D3EE84A50CFD}"/>
+                <a16:creationId xmlns:a16="http://schemas.microsoft.com/office/drawing/2014/main" id="{45411D96-91BE-C68C-8793-151ECA24D968}"/>
               </a:ext>
             </a:extLst>
           </p:cNvPr>
@@ -4135,30 +7026,38 @@
             <p:ph type="title"/>
           </p:nvPr>
         </p:nvSpPr>
-        <p:spPr/>
-        <p:txBody>
-          <a:bodyPr/>
-          <a:lstStyle/>
-          <a:p>
-            <a:endParaRPr lang="en-US"/>
+        <p:spPr>
+          <a:xfrm>
+            <a:off x="838200" y="365126"/>
+            <a:ext cx="10515600" cy="723446"/>
+          </a:xfrm>
+        </p:spPr>
+        <p:txBody>
+          <a:bodyPr>
+            <a:normAutofit/>
+          </a:bodyPr>
+          <a:lstStyle/>
+          <a:p>
+            <a:r>
+              <a:rPr lang="en-US" sz="4000" dirty="0"/>
+              <a:t>Daily vs Hourly</a:t>
+            </a:r>
           </a:p>
         </p:txBody>
       </p:sp>
       <p:pic>
         <p:nvPicPr>
-          <p:cNvPr id="5" name="Content Placeholder 4" descr="Chart, scatter chart&#10;&#10;Description automatically generated">
-            <a:extLst>
-              <a:ext uri="{FF2B5EF4-FFF2-40B4-BE49-F238E27FC236}">
-                <a16:creationId xmlns:a16="http://schemas.microsoft.com/office/drawing/2014/main" id="{CE99511F-0CCD-8220-BA67-00192E878A95}"/>
+          <p:cNvPr id="4" name="Picture 3">
+            <a:extLst>
+              <a:ext uri="{FF2B5EF4-FFF2-40B4-BE49-F238E27FC236}">
+                <a16:creationId xmlns:a16="http://schemas.microsoft.com/office/drawing/2014/main" id="{16E9FA9E-BCCA-2E4B-86B7-CB0C68C54A3D}"/>
               </a:ext>
             </a:extLst>
           </p:cNvPr>
           <p:cNvPicPr>
-            <a:picLocks noGrp="1" noChangeAspect="1"/>
+            <a:picLocks noChangeAspect="1"/>
           </p:cNvPicPr>
-          <p:nvPr>
-            <p:ph idx="1"/>
-          </p:nvPr>
+          <p:nvPr/>
         </p:nvPicPr>
         <p:blipFill>
           <a:blip r:embed="rId2">
@@ -4174,15 +7073,53 @@
         </p:blipFill>
         <p:spPr>
           <a:xfrm>
-            <a:off x="201268" y="92364"/>
-            <a:ext cx="5149127" cy="6620308"/>
-          </a:xfrm>
+            <a:off x="294112" y="1243446"/>
+            <a:ext cx="4572000" cy="3429000"/>
+          </a:xfrm>
+          <a:prstGeom prst="rect">
+            <a:avLst/>
+          </a:prstGeom>
         </p:spPr>
       </p:pic>
+      <p:sp>
+        <p:nvSpPr>
+          <p:cNvPr id="5" name="TextBox 4">
+            <a:extLst>
+              <a:ext uri="{FF2B5EF4-FFF2-40B4-BE49-F238E27FC236}">
+                <a16:creationId xmlns:a16="http://schemas.microsoft.com/office/drawing/2014/main" id="{704D93DB-C32D-2522-2AEA-2CC80CE2FAF6}"/>
+              </a:ext>
+            </a:extLst>
+          </p:cNvPr>
+          <p:cNvSpPr txBox="1"/>
+          <p:nvPr/>
+        </p:nvSpPr>
+        <p:spPr>
+          <a:xfrm>
+            <a:off x="1514765" y="1690255"/>
+            <a:ext cx="2000869" cy="338554"/>
+          </a:xfrm>
+          <a:prstGeom prst="rect">
+            <a:avLst/>
+          </a:prstGeom>
+          <a:noFill/>
+        </p:spPr>
+        <p:txBody>
+          <a:bodyPr wrap="none" rtlCol="0">
+            <a:spAutoFit/>
+          </a:bodyPr>
+          <a:lstStyle/>
+          <a:p>
+            <a:r>
+              <a:rPr lang="en-US" sz="1600" dirty="0"/>
+              <a:t>channel 83, node 469</a:t>
+            </a:r>
+          </a:p>
+        </p:txBody>
+      </p:sp>
     </p:spTree>
     <p:extLst>
       <p:ext uri="{BB962C8B-B14F-4D97-AF65-F5344CB8AC3E}">
-        <p14:creationId xmlns:p14="http://schemas.microsoft.com/office/powerpoint/2010/main" val="3624297614"/>
+        <p14:creationId xmlns:p14="http://schemas.microsoft.com/office/powerpoint/2010/main" val="2806809707"/>
       </p:ext>
     </p:extLst>
   </p:cSld>
@@ -4214,7 +7151,7 @@
           <p:cNvPr id="2" name="Title 1">
             <a:extLst>
               <a:ext uri="{FF2B5EF4-FFF2-40B4-BE49-F238E27FC236}">
-                <a16:creationId xmlns:a16="http://schemas.microsoft.com/office/drawing/2014/main" id="{45411D96-91BE-C68C-8793-151ECA24D968}"/>
+                <a16:creationId xmlns:a16="http://schemas.microsoft.com/office/drawing/2014/main" id="{35D1CFB4-6B3B-A24D-496D-61F77A311C0D}"/>
               </a:ext>
             </a:extLst>
           </p:cNvPr>
@@ -4225,24 +7162,477 @@
             <p:ph type="title"/>
           </p:nvPr>
         </p:nvSpPr>
-        <p:spPr/>
-        <p:txBody>
-          <a:bodyPr/>
+        <p:spPr>
+          <a:xfrm>
+            <a:off x="128225" y="73981"/>
+            <a:ext cx="10515600" cy="530802"/>
+          </a:xfrm>
+        </p:spPr>
+        <p:txBody>
+          <a:bodyPr>
+            <a:normAutofit fontScale="90000"/>
+          </a:bodyPr>
           <a:lstStyle/>
           <a:p>
             <a:r>
               <a:rPr lang="en-US" dirty="0"/>
-              <a:t>Other metrics</a:t>
-            </a:r>
-          </a:p>
-        </p:txBody>
-      </p:sp>
-      <p:sp>
-        <p:nvSpPr>
-          <p:cNvPr id="3" name="Content Placeholder 2">
-            <a:extLst>
-              <a:ext uri="{FF2B5EF4-FFF2-40B4-BE49-F238E27FC236}">
-                <a16:creationId xmlns:a16="http://schemas.microsoft.com/office/drawing/2014/main" id="{24382230-B47C-53F5-6DFA-D4C323DA577D}"/>
+              <a:t>Mike</a:t>
+            </a:r>
+          </a:p>
+        </p:txBody>
+      </p:sp>
+      <p:pic>
+        <p:nvPicPr>
+          <p:cNvPr id="4" name="Picture 3">
+            <a:extLst>
+              <a:ext uri="{FF2B5EF4-FFF2-40B4-BE49-F238E27FC236}">
+                <a16:creationId xmlns:a16="http://schemas.microsoft.com/office/drawing/2014/main" id="{7CEB76A2-637B-B8E2-6CB8-99E047948FF7}"/>
+              </a:ext>
+            </a:extLst>
+          </p:cNvPr>
+          <p:cNvPicPr>
+            <a:picLocks noChangeAspect="1"/>
+          </p:cNvPicPr>
+          <p:nvPr/>
+        </p:nvPicPr>
+        <p:blipFill>
+          <a:blip r:embed="rId2">
+            <a:extLst>
+              <a:ext uri="{28A0092B-C50C-407E-A947-70E740481C1C}">
+                <a14:useLocalDpi xmlns:a14="http://schemas.microsoft.com/office/drawing/2010/main" val="0"/>
+              </a:ext>
+            </a:extLst>
+          </a:blip>
+          <a:stretch>
+            <a:fillRect/>
+          </a:stretch>
+        </p:blipFill>
+        <p:spPr>
+          <a:xfrm>
+            <a:off x="0" y="692757"/>
+            <a:ext cx="3800767" cy="2850575"/>
+          </a:xfrm>
+          <a:prstGeom prst="rect">
+            <a:avLst/>
+          </a:prstGeom>
+        </p:spPr>
+      </p:pic>
+      <p:pic>
+        <p:nvPicPr>
+          <p:cNvPr id="5" name="Picture 4" descr="Chart, histogram&#10;&#10;Description automatically generated">
+            <a:extLst>
+              <a:ext uri="{FF2B5EF4-FFF2-40B4-BE49-F238E27FC236}">
+                <a16:creationId xmlns:a16="http://schemas.microsoft.com/office/drawing/2014/main" id="{061314B8-554A-D3E1-F9F4-998F5ABF6F2C}"/>
+              </a:ext>
+            </a:extLst>
+          </p:cNvPr>
+          <p:cNvPicPr>
+            <a:picLocks noChangeAspect="1"/>
+          </p:cNvPicPr>
+          <p:nvPr/>
+        </p:nvPicPr>
+        <p:blipFill>
+          <a:blip r:embed="rId3" cstate="print">
+            <a:extLst>
+              <a:ext uri="{28A0092B-C50C-407E-A947-70E740481C1C}">
+                <a14:useLocalDpi xmlns:a14="http://schemas.microsoft.com/office/drawing/2010/main" val="0"/>
+              </a:ext>
+            </a:extLst>
+          </a:blip>
+          <a:stretch>
+            <a:fillRect/>
+          </a:stretch>
+        </p:blipFill>
+        <p:spPr>
+          <a:xfrm>
+            <a:off x="7176660" y="702871"/>
+            <a:ext cx="3787281" cy="2840461"/>
+          </a:xfrm>
+          <a:prstGeom prst="rect">
+            <a:avLst/>
+          </a:prstGeom>
+        </p:spPr>
+      </p:pic>
+      <p:sp>
+        <p:nvSpPr>
+          <p:cNvPr id="6" name="TextBox 5">
+            <a:extLst>
+              <a:ext uri="{FF2B5EF4-FFF2-40B4-BE49-F238E27FC236}">
+                <a16:creationId xmlns:a16="http://schemas.microsoft.com/office/drawing/2014/main" id="{C9C84A0F-F923-796A-A8DB-13B8E889B417}"/>
+              </a:ext>
+            </a:extLst>
+          </p:cNvPr>
+          <p:cNvSpPr txBox="1"/>
+          <p:nvPr/>
+        </p:nvSpPr>
+        <p:spPr>
+          <a:xfrm>
+            <a:off x="4448910" y="188368"/>
+            <a:ext cx="1874231" cy="338554"/>
+          </a:xfrm>
+          <a:prstGeom prst="rect">
+            <a:avLst/>
+          </a:prstGeom>
+          <a:noFill/>
+          <a:ln>
+            <a:solidFill>
+              <a:schemeClr val="tx1"/>
+            </a:solidFill>
+          </a:ln>
+        </p:spPr>
+        <p:txBody>
+          <a:bodyPr wrap="none" rtlCol="0">
+            <a:spAutoFit/>
+          </a:bodyPr>
+          <a:lstStyle/>
+          <a:p>
+            <a:r>
+              <a:rPr lang="en-US" sz="1600" dirty="0"/>
+              <a:t>channel 42, node 37</a:t>
+            </a:r>
+          </a:p>
+        </p:txBody>
+      </p:sp>
+      <p:sp>
+        <p:nvSpPr>
+          <p:cNvPr id="7" name="TextBox 6">
+            <a:extLst>
+              <a:ext uri="{FF2B5EF4-FFF2-40B4-BE49-F238E27FC236}">
+                <a16:creationId xmlns:a16="http://schemas.microsoft.com/office/drawing/2014/main" id="{3927DC66-0A9C-6E1F-1351-DD2D9218BB17}"/>
+              </a:ext>
+            </a:extLst>
+          </p:cNvPr>
+          <p:cNvSpPr txBox="1"/>
+          <p:nvPr/>
+        </p:nvSpPr>
+        <p:spPr>
+          <a:xfrm>
+            <a:off x="10768084" y="1850528"/>
+            <a:ext cx="1292213" cy="338554"/>
+          </a:xfrm>
+          <a:prstGeom prst="rect">
+            <a:avLst/>
+          </a:prstGeom>
+          <a:noFill/>
+          <a:ln>
+            <a:solidFill>
+              <a:schemeClr val="tx1"/>
+            </a:solidFill>
+          </a:ln>
+        </p:spPr>
+        <p:txBody>
+          <a:bodyPr wrap="none" rtlCol="0">
+            <a:spAutoFit/>
+          </a:bodyPr>
+          <a:lstStyle/>
+          <a:p>
+            <a:r>
+              <a:rPr lang="en-US" sz="1600" dirty="0"/>
+              <a:t>Daily average</a:t>
+            </a:r>
+          </a:p>
+        </p:txBody>
+      </p:sp>
+      <p:pic>
+        <p:nvPicPr>
+          <p:cNvPr id="8" name="Picture 7" descr="Chart&#10;&#10;Description automatically generated">
+            <a:extLst>
+              <a:ext uri="{FF2B5EF4-FFF2-40B4-BE49-F238E27FC236}">
+                <a16:creationId xmlns:a16="http://schemas.microsoft.com/office/drawing/2014/main" id="{FE664C89-D589-0347-2217-469E9E18B2F9}"/>
+              </a:ext>
+            </a:extLst>
+          </p:cNvPr>
+          <p:cNvPicPr>
+            <a:picLocks noChangeAspect="1"/>
+          </p:cNvPicPr>
+          <p:nvPr/>
+        </p:nvPicPr>
+        <p:blipFill>
+          <a:blip r:embed="rId4" cstate="print">
+            <a:extLst>
+              <a:ext uri="{28A0092B-C50C-407E-A947-70E740481C1C}">
+                <a14:useLocalDpi xmlns:a14="http://schemas.microsoft.com/office/drawing/2010/main" val="0"/>
+              </a:ext>
+            </a:extLst>
+          </a:blip>
+          <a:stretch>
+            <a:fillRect/>
+          </a:stretch>
+        </p:blipFill>
+        <p:spPr>
+          <a:xfrm>
+            <a:off x="3588330" y="702871"/>
+            <a:ext cx="3787281" cy="2840461"/>
+          </a:xfrm>
+          <a:prstGeom prst="rect">
+            <a:avLst/>
+          </a:prstGeom>
+        </p:spPr>
+      </p:pic>
+      <p:sp>
+        <p:nvSpPr>
+          <p:cNvPr id="9" name="TextBox 8">
+            <a:extLst>
+              <a:ext uri="{FF2B5EF4-FFF2-40B4-BE49-F238E27FC236}">
+                <a16:creationId xmlns:a16="http://schemas.microsoft.com/office/drawing/2014/main" id="{1E0FDA2C-57EE-59D9-43F2-099A0FC9DA60}"/>
+              </a:ext>
+            </a:extLst>
+          </p:cNvPr>
+          <p:cNvSpPr txBox="1"/>
+          <p:nvPr/>
+        </p:nvSpPr>
+        <p:spPr>
+          <a:xfrm>
+            <a:off x="10707693" y="5226166"/>
+            <a:ext cx="1438086" cy="338554"/>
+          </a:xfrm>
+          <a:prstGeom prst="rect">
+            <a:avLst/>
+          </a:prstGeom>
+          <a:noFill/>
+          <a:ln>
+            <a:solidFill>
+              <a:schemeClr val="tx1"/>
+            </a:solidFill>
+          </a:ln>
+        </p:spPr>
+        <p:txBody>
+          <a:bodyPr wrap="none" rtlCol="0">
+            <a:spAutoFit/>
+          </a:bodyPr>
+          <a:lstStyle/>
+          <a:p>
+            <a:r>
+              <a:rPr lang="en-US" sz="1600" dirty="0"/>
+              <a:t>Hourly average</a:t>
+            </a:r>
+          </a:p>
+        </p:txBody>
+      </p:sp>
+    </p:spTree>
+    <p:extLst>
+      <p:ext uri="{BB962C8B-B14F-4D97-AF65-F5344CB8AC3E}">
+        <p14:creationId xmlns:p14="http://schemas.microsoft.com/office/powerpoint/2010/main" val="4046760473"/>
+      </p:ext>
+    </p:extLst>
+  </p:cSld>
+  <p:clrMapOvr>
+    <a:masterClrMapping/>
+  </p:clrMapOvr>
+</p:sld>
+</file>
+
+<file path=ppt/slides/slide9.xml><?xml version="1.0" encoding="utf-8"?>
+<p:sld xmlns:a="http://schemas.openxmlformats.org/drawingml/2006/main" xmlns:r="http://schemas.openxmlformats.org/officeDocument/2006/relationships" xmlns:p="http://schemas.openxmlformats.org/presentationml/2006/main">
+  <p:cSld>
+    <p:spTree>
+      <p:nvGrpSpPr>
+        <p:cNvPr id="1" name=""/>
+        <p:cNvGrpSpPr/>
+        <p:nvPr/>
+      </p:nvGrpSpPr>
+      <p:grpSpPr>
+        <a:xfrm>
+          <a:off x="0" y="0"/>
+          <a:ext cx="0" cy="0"/>
+          <a:chOff x="0" y="0"/>
+          <a:chExt cx="0" cy="0"/>
+        </a:xfrm>
+      </p:grpSpPr>
+      <p:pic>
+        <p:nvPicPr>
+          <p:cNvPr id="5" name="Picture 4" descr="Chart, histogram&#10;&#10;Description automatically generated">
+            <a:extLst>
+              <a:ext uri="{FF2B5EF4-FFF2-40B4-BE49-F238E27FC236}">
+                <a16:creationId xmlns:a16="http://schemas.microsoft.com/office/drawing/2014/main" id="{6E348895-CF5B-754A-BC48-DF30DA0297B7}"/>
+              </a:ext>
+            </a:extLst>
+          </p:cNvPr>
+          <p:cNvPicPr>
+            <a:picLocks noChangeAspect="1"/>
+          </p:cNvPicPr>
+          <p:nvPr/>
+        </p:nvPicPr>
+        <p:blipFill>
+          <a:blip r:embed="rId2" cstate="print">
+            <a:extLst>
+              <a:ext uri="{28A0092B-C50C-407E-A947-70E740481C1C}">
+                <a14:useLocalDpi xmlns:a14="http://schemas.microsoft.com/office/drawing/2010/main" val="0"/>
+              </a:ext>
+            </a:extLst>
+          </a:blip>
+          <a:stretch>
+            <a:fillRect/>
+          </a:stretch>
+        </p:blipFill>
+        <p:spPr>
+          <a:xfrm>
+            <a:off x="-1" y="822121"/>
+            <a:ext cx="3743893" cy="2807920"/>
+          </a:xfrm>
+          <a:prstGeom prst="rect">
+            <a:avLst/>
+          </a:prstGeom>
+        </p:spPr>
+      </p:pic>
+      <p:pic>
+        <p:nvPicPr>
+          <p:cNvPr id="6" name="Picture 5" descr="Chart, histogram&#10;&#10;Description automatically generated">
+            <a:extLst>
+              <a:ext uri="{FF2B5EF4-FFF2-40B4-BE49-F238E27FC236}">
+                <a16:creationId xmlns:a16="http://schemas.microsoft.com/office/drawing/2014/main" id="{9D662AD9-C4D9-405B-8FAE-536464F9B108}"/>
+              </a:ext>
+            </a:extLst>
+          </p:cNvPr>
+          <p:cNvPicPr>
+            <a:picLocks noChangeAspect="1"/>
+          </p:cNvPicPr>
+          <p:nvPr/>
+        </p:nvPicPr>
+        <p:blipFill>
+          <a:blip r:embed="rId3" cstate="print">
+            <a:extLst>
+              <a:ext uri="{28A0092B-C50C-407E-A947-70E740481C1C}">
+                <a14:useLocalDpi xmlns:a14="http://schemas.microsoft.com/office/drawing/2010/main" val="0"/>
+              </a:ext>
+            </a:extLst>
+          </a:blip>
+          <a:stretch>
+            <a:fillRect/>
+          </a:stretch>
+        </p:blipFill>
+        <p:spPr>
+          <a:xfrm>
+            <a:off x="3640531" y="822121"/>
+            <a:ext cx="3743893" cy="2807920"/>
+          </a:xfrm>
+          <a:prstGeom prst="rect">
+            <a:avLst/>
+          </a:prstGeom>
+        </p:spPr>
+      </p:pic>
+      <p:pic>
+        <p:nvPicPr>
+          <p:cNvPr id="8" name="Picture 7" descr="Chart, histogram&#10;&#10;Description automatically generated">
+            <a:extLst>
+              <a:ext uri="{FF2B5EF4-FFF2-40B4-BE49-F238E27FC236}">
+                <a16:creationId xmlns:a16="http://schemas.microsoft.com/office/drawing/2014/main" id="{A7DC26E4-B2EC-8690-3B7F-13F54B9E9556}"/>
+              </a:ext>
+            </a:extLst>
+          </p:cNvPr>
+          <p:cNvPicPr>
+            <a:picLocks noChangeAspect="1"/>
+          </p:cNvPicPr>
+          <p:nvPr/>
+        </p:nvPicPr>
+        <p:blipFill>
+          <a:blip r:embed="rId4" cstate="print">
+            <a:extLst>
+              <a:ext uri="{28A0092B-C50C-407E-A947-70E740481C1C}">
+                <a14:useLocalDpi xmlns:a14="http://schemas.microsoft.com/office/drawing/2010/main" val="0"/>
+              </a:ext>
+            </a:extLst>
+          </a:blip>
+          <a:stretch>
+            <a:fillRect/>
+          </a:stretch>
+        </p:blipFill>
+        <p:spPr>
+          <a:xfrm>
+            <a:off x="7276961" y="822121"/>
+            <a:ext cx="3743893" cy="2807920"/>
+          </a:xfrm>
+          <a:prstGeom prst="rect">
+            <a:avLst/>
+          </a:prstGeom>
+        </p:spPr>
+      </p:pic>
+      <p:sp>
+        <p:nvSpPr>
+          <p:cNvPr id="9" name="TextBox 8">
+            <a:extLst>
+              <a:ext uri="{FF2B5EF4-FFF2-40B4-BE49-F238E27FC236}">
+                <a16:creationId xmlns:a16="http://schemas.microsoft.com/office/drawing/2014/main" id="{BF682709-69E1-D64C-E2E6-246C83C997B7}"/>
+              </a:ext>
+            </a:extLst>
+          </p:cNvPr>
+          <p:cNvSpPr txBox="1"/>
+          <p:nvPr/>
+        </p:nvSpPr>
+        <p:spPr>
+          <a:xfrm>
+            <a:off x="10707693" y="1961450"/>
+            <a:ext cx="1292213" cy="338554"/>
+          </a:xfrm>
+          <a:prstGeom prst="rect">
+            <a:avLst/>
+          </a:prstGeom>
+          <a:noFill/>
+          <a:ln>
+            <a:solidFill>
+              <a:schemeClr val="tx1"/>
+            </a:solidFill>
+          </a:ln>
+        </p:spPr>
+        <p:txBody>
+          <a:bodyPr wrap="none" rtlCol="0">
+            <a:spAutoFit/>
+          </a:bodyPr>
+          <a:lstStyle/>
+          <a:p>
+            <a:r>
+              <a:rPr lang="en-US" sz="1600" dirty="0"/>
+              <a:t>Daily average</a:t>
+            </a:r>
+          </a:p>
+        </p:txBody>
+      </p:sp>
+      <p:sp>
+        <p:nvSpPr>
+          <p:cNvPr id="10" name="TextBox 9">
+            <a:extLst>
+              <a:ext uri="{FF2B5EF4-FFF2-40B4-BE49-F238E27FC236}">
+                <a16:creationId xmlns:a16="http://schemas.microsoft.com/office/drawing/2014/main" id="{54CB47FB-F5F9-ED08-821B-7AF4C48AAFCE}"/>
+              </a:ext>
+            </a:extLst>
+          </p:cNvPr>
+          <p:cNvSpPr txBox="1"/>
+          <p:nvPr/>
+        </p:nvSpPr>
+        <p:spPr>
+          <a:xfrm>
+            <a:off x="4499463" y="271439"/>
+            <a:ext cx="1874231" cy="338554"/>
+          </a:xfrm>
+          <a:prstGeom prst="rect">
+            <a:avLst/>
+          </a:prstGeom>
+          <a:noFill/>
+          <a:ln>
+            <a:solidFill>
+              <a:schemeClr val="tx1"/>
+            </a:solidFill>
+          </a:ln>
+        </p:spPr>
+        <p:txBody>
+          <a:bodyPr wrap="none" rtlCol="0">
+            <a:spAutoFit/>
+          </a:bodyPr>
+          <a:lstStyle/>
+          <a:p>
+            <a:r>
+              <a:rPr lang="en-US" sz="1600" dirty="0"/>
+              <a:t>channel 43, node 39</a:t>
+            </a:r>
+          </a:p>
+        </p:txBody>
+      </p:sp>
+      <p:sp>
+        <p:nvSpPr>
+          <p:cNvPr id="12" name="Title 1">
+            <a:extLst>
+              <a:ext uri="{FF2B5EF4-FFF2-40B4-BE49-F238E27FC236}">
+                <a16:creationId xmlns:a16="http://schemas.microsoft.com/office/drawing/2014/main" id="{0FD1B733-A17B-8287-7182-407C3DA1E09B}"/>
               </a:ext>
             </a:extLst>
           </p:cNvPr>
@@ -4250,22 +7640,72 @@
             <a:spLocks noGrp="1"/>
           </p:cNvSpPr>
           <p:nvPr>
-            <p:ph idx="1"/>
-          </p:nvPr>
-        </p:nvSpPr>
-        <p:spPr/>
-        <p:txBody>
-          <a:bodyPr/>
-          <a:lstStyle/>
-          <a:p>
-            <a:endParaRPr lang="en-US"/>
+            <p:ph type="title"/>
+          </p:nvPr>
+        </p:nvSpPr>
+        <p:spPr>
+          <a:xfrm>
+            <a:off x="0" y="-3880"/>
+            <a:ext cx="10515600" cy="530802"/>
+          </a:xfrm>
+        </p:spPr>
+        <p:txBody>
+          <a:bodyPr>
+            <a:normAutofit fontScale="90000"/>
+          </a:bodyPr>
+          <a:lstStyle/>
+          <a:p>
+            <a:r>
+              <a:rPr lang="en-US" dirty="0"/>
+              <a:t>Mike</a:t>
+            </a:r>
+          </a:p>
+        </p:txBody>
+      </p:sp>
+      <p:sp>
+        <p:nvSpPr>
+          <p:cNvPr id="13" name="TextBox 12">
+            <a:extLst>
+              <a:ext uri="{FF2B5EF4-FFF2-40B4-BE49-F238E27FC236}">
+                <a16:creationId xmlns:a16="http://schemas.microsoft.com/office/drawing/2014/main" id="{1146637D-6BFC-E596-E843-88D63AD45F92}"/>
+              </a:ext>
+            </a:extLst>
+          </p:cNvPr>
+          <p:cNvSpPr txBox="1"/>
+          <p:nvPr/>
+        </p:nvSpPr>
+        <p:spPr>
+          <a:xfrm>
+            <a:off x="10707693" y="5226166"/>
+            <a:ext cx="1438086" cy="338554"/>
+          </a:xfrm>
+          <a:prstGeom prst="rect">
+            <a:avLst/>
+          </a:prstGeom>
+          <a:noFill/>
+          <a:ln>
+            <a:solidFill>
+              <a:schemeClr val="tx1"/>
+            </a:solidFill>
+          </a:ln>
+        </p:spPr>
+        <p:txBody>
+          <a:bodyPr wrap="none" rtlCol="0">
+            <a:spAutoFit/>
+          </a:bodyPr>
+          <a:lstStyle/>
+          <a:p>
+            <a:r>
+              <a:rPr lang="en-US" sz="1600" dirty="0"/>
+              <a:t>Hourly average</a:t>
+            </a:r>
           </a:p>
         </p:txBody>
       </p:sp>
     </p:spTree>
     <p:extLst>
       <p:ext uri="{BB962C8B-B14F-4D97-AF65-F5344CB8AC3E}">
-        <p14:creationId xmlns:p14="http://schemas.microsoft.com/office/powerpoint/2010/main" val="2806809707"/>
+        <p14:creationId xmlns:p14="http://schemas.microsoft.com/office/powerpoint/2010/main" val="1921078000"/>
       </p:ext>
     </p:extLst>
   </p:cSld>

</xml_diff>

<commit_message>
further updates to ppt
</commit_message>
<xml_diff>
--- a/figures/zoi_figures.pptx
+++ b/figures/zoi_figures.pptx
@@ -11,17 +11,16 @@
     <p:sldId id="260" r:id="rId5"/>
     <p:sldId id="257" r:id="rId6"/>
     <p:sldId id="262" r:id="rId7"/>
-    <p:sldId id="264" r:id="rId8"/>
-    <p:sldId id="265" r:id="rId9"/>
-    <p:sldId id="266" r:id="rId10"/>
-    <p:sldId id="277" r:id="rId11"/>
-    <p:sldId id="276" r:id="rId12"/>
-    <p:sldId id="274" r:id="rId13"/>
-    <p:sldId id="267" r:id="rId14"/>
-    <p:sldId id="271" r:id="rId15"/>
-    <p:sldId id="273" r:id="rId16"/>
-    <p:sldId id="268" r:id="rId17"/>
-    <p:sldId id="263" r:id="rId18"/>
+    <p:sldId id="265" r:id="rId8"/>
+    <p:sldId id="266" r:id="rId9"/>
+    <p:sldId id="277" r:id="rId10"/>
+    <p:sldId id="276" r:id="rId11"/>
+    <p:sldId id="274" r:id="rId12"/>
+    <p:sldId id="267" r:id="rId13"/>
+    <p:sldId id="271" r:id="rId14"/>
+    <p:sldId id="273" r:id="rId15"/>
+    <p:sldId id="268" r:id="rId16"/>
+    <p:sldId id="263" r:id="rId17"/>
   </p:sldIdLst>
   <p:sldSz cx="12192000" cy="6858000"/>
   <p:notesSz cx="6858000" cy="9144000"/>
@@ -141,7 +140,7 @@
   <pc:docChgLst>
     <pc:chgData name="Pien, Catarina L" userId="055f424c-5a88-4e6e-9e88-d4462ff2eeee" providerId="ADAL" clId="{FF688F30-8267-4759-92EF-AC87E68B1938}"/>
     <pc:docChg chg="undo custSel addSld delSld modSld sldOrd">
-      <pc:chgData name="Pien, Catarina L" userId="055f424c-5a88-4e6e-9e88-d4462ff2eeee" providerId="ADAL" clId="{FF688F30-8267-4759-92EF-AC87E68B1938}" dt="2023-07-18T22:03:33.497" v="378" actId="1076"/>
+      <pc:chgData name="Pien, Catarina L" userId="055f424c-5a88-4e6e-9e88-d4462ff2eeee" providerId="ADAL" clId="{FF688F30-8267-4759-92EF-AC87E68B1938}" dt="2023-07-18T22:25:34.315" v="379" actId="47"/>
       <pc:docMkLst>
         <pc:docMk/>
       </pc:docMkLst>
@@ -152,8 +151,8 @@
           <pc:sldMk cId="3624297614" sldId="263"/>
         </pc:sldMkLst>
       </pc:sldChg>
-      <pc:sldChg chg="addSp delSp modSp new mod">
-        <pc:chgData name="Pien, Catarina L" userId="055f424c-5a88-4e6e-9e88-d4462ff2eeee" providerId="ADAL" clId="{FF688F30-8267-4759-92EF-AC87E68B1938}" dt="2023-07-18T21:05:30.192" v="71" actId="1076"/>
+      <pc:sldChg chg="addSp delSp modSp new del mod">
+        <pc:chgData name="Pien, Catarina L" userId="055f424c-5a88-4e6e-9e88-d4462ff2eeee" providerId="ADAL" clId="{FF688F30-8267-4759-92EF-AC87E68B1938}" dt="2023-07-18T22:25:34.315" v="379" actId="47"/>
         <pc:sldMkLst>
           <pc:docMk/>
           <pc:sldMk cId="2806809707" sldId="264"/>
@@ -4320,7 +4319,7 @@
         <p:spPr>
           <a:xfrm>
             <a:off x="4516241" y="357645"/>
-            <a:ext cx="1770036" cy="338554"/>
+            <a:ext cx="1874231" cy="338554"/>
           </a:xfrm>
           <a:prstGeom prst="rect">
             <a:avLst/>
@@ -4340,17 +4339,17 @@
           <a:p>
             <a:r>
               <a:rPr lang="en-US" sz="1600" dirty="0"/>
-              <a:t>channel 54, node 8</a:t>
+              <a:t>channel 59, node 52</a:t>
             </a:r>
           </a:p>
         </p:txBody>
       </p:sp>
       <p:pic>
         <p:nvPicPr>
-          <p:cNvPr id="5" name="Picture 4" descr="Chart, histogram&#10;&#10;Description automatically generated">
-            <a:extLst>
-              <a:ext uri="{FF2B5EF4-FFF2-40B4-BE49-F238E27FC236}">
-                <a16:creationId xmlns:a16="http://schemas.microsoft.com/office/drawing/2014/main" id="{22476E99-F8D7-709B-E271-A3829C7AB4E3}"/>
+          <p:cNvPr id="2" name="Picture 1" descr="Chart, histogram&#10;&#10;Description automatically generated">
+            <a:extLst>
+              <a:ext uri="{FF2B5EF4-FFF2-40B4-BE49-F238E27FC236}">
+                <a16:creationId xmlns:a16="http://schemas.microsoft.com/office/drawing/2014/main" id="{76E0356B-D97D-A063-0FDA-9B4D8C0B5D1B}"/>
               </a:ext>
             </a:extLst>
           </p:cNvPr>
@@ -4373,7 +4372,7 @@
         </p:blipFill>
         <p:spPr>
           <a:xfrm>
-            <a:off x="3520550" y="870150"/>
+            <a:off x="91550" y="870150"/>
             <a:ext cx="3429000" cy="2571750"/>
           </a:xfrm>
           <a:prstGeom prst="rect">
@@ -4383,10 +4382,10 @@
       </p:pic>
       <p:pic>
         <p:nvPicPr>
-          <p:cNvPr id="6" name="Picture 5" descr="Chart, histogram&#10;&#10;Description automatically generated">
-            <a:extLst>
-              <a:ext uri="{FF2B5EF4-FFF2-40B4-BE49-F238E27FC236}">
-                <a16:creationId xmlns:a16="http://schemas.microsoft.com/office/drawing/2014/main" id="{062C4520-7632-FA71-1942-17DC3DAC845E}"/>
+          <p:cNvPr id="3" name="Picture 2" descr="Chart, histogram&#10;&#10;Description automatically generated">
+            <a:extLst>
+              <a:ext uri="{FF2B5EF4-FFF2-40B4-BE49-F238E27FC236}">
+                <a16:creationId xmlns:a16="http://schemas.microsoft.com/office/drawing/2014/main" id="{15C6D720-7468-60E2-B782-72A7ED970AEF}"/>
               </a:ext>
             </a:extLst>
           </p:cNvPr>
@@ -4409,7 +4408,7 @@
         </p:blipFill>
         <p:spPr>
           <a:xfrm>
-            <a:off x="6949550" y="870150"/>
+            <a:off x="3520550" y="888447"/>
             <a:ext cx="3429000" cy="2571750"/>
           </a:xfrm>
           <a:prstGeom prst="rect">
@@ -4419,10 +4418,10 @@
       </p:pic>
       <p:pic>
         <p:nvPicPr>
-          <p:cNvPr id="7" name="Picture 6" descr="Chart, histogram&#10;&#10;Description automatically generated">
-            <a:extLst>
-              <a:ext uri="{FF2B5EF4-FFF2-40B4-BE49-F238E27FC236}">
-                <a16:creationId xmlns:a16="http://schemas.microsoft.com/office/drawing/2014/main" id="{E05A7350-5F0D-33B0-CDB5-343C93BC7A15}"/>
+          <p:cNvPr id="4" name="Picture 3" descr="Chart, histogram&#10;&#10;Description automatically generated">
+            <a:extLst>
+              <a:ext uri="{FF2B5EF4-FFF2-40B4-BE49-F238E27FC236}">
+                <a16:creationId xmlns:a16="http://schemas.microsoft.com/office/drawing/2014/main" id="{03DCFD95-C68B-379A-A5F3-D938729CBB5B}"/>
               </a:ext>
             </a:extLst>
           </p:cNvPr>
@@ -4445,7 +4444,7 @@
         </p:blipFill>
         <p:spPr>
           <a:xfrm>
-            <a:off x="86084" y="844852"/>
+            <a:off x="6949550" y="888447"/>
             <a:ext cx="3429000" cy="2571750"/>
           </a:xfrm>
           <a:prstGeom prst="rect">
@@ -4456,7 +4455,7 @@
     </p:spTree>
     <p:extLst>
       <p:ext uri="{BB962C8B-B14F-4D97-AF65-F5344CB8AC3E}">
-        <p14:creationId xmlns:p14="http://schemas.microsoft.com/office/powerpoint/2010/main" val="18945092"/>
+        <p14:creationId xmlns:p14="http://schemas.microsoft.com/office/powerpoint/2010/main" val="3601026263"/>
       </p:ext>
     </p:extLst>
   </p:cSld>
@@ -4485,10 +4484,45 @@
       </p:grpSpPr>
       <p:sp>
         <p:nvSpPr>
-          <p:cNvPr id="9" name="TextBox 8">
-            <a:extLst>
-              <a:ext uri="{FF2B5EF4-FFF2-40B4-BE49-F238E27FC236}">
-                <a16:creationId xmlns:a16="http://schemas.microsoft.com/office/drawing/2014/main" id="{BF682709-69E1-D64C-E2E6-246C83C997B7}"/>
+          <p:cNvPr id="2" name="Title 1">
+            <a:extLst>
+              <a:ext uri="{FF2B5EF4-FFF2-40B4-BE49-F238E27FC236}">
+                <a16:creationId xmlns:a16="http://schemas.microsoft.com/office/drawing/2014/main" id="{35D1CFB4-6B3B-A24D-496D-61F77A311C0D}"/>
+              </a:ext>
+            </a:extLst>
+          </p:cNvPr>
+          <p:cNvSpPr>
+            <a:spLocks noGrp="1"/>
+          </p:cNvSpPr>
+          <p:nvPr>
+            <p:ph type="title"/>
+          </p:nvPr>
+        </p:nvSpPr>
+        <p:spPr>
+          <a:xfrm>
+            <a:off x="128225" y="73981"/>
+            <a:ext cx="10515600" cy="530802"/>
+          </a:xfrm>
+        </p:spPr>
+        <p:txBody>
+          <a:bodyPr>
+            <a:normAutofit fontScale="90000"/>
+          </a:bodyPr>
+          <a:lstStyle/>
+          <a:p>
+            <a:r>
+              <a:rPr lang="en-US" dirty="0"/>
+              <a:t>Cat</a:t>
+            </a:r>
+          </a:p>
+        </p:txBody>
+      </p:sp>
+      <p:sp>
+        <p:nvSpPr>
+          <p:cNvPr id="6" name="TextBox 5">
+            <a:extLst>
+              <a:ext uri="{FF2B5EF4-FFF2-40B4-BE49-F238E27FC236}">
+                <a16:creationId xmlns:a16="http://schemas.microsoft.com/office/drawing/2014/main" id="{C9C84A0F-F923-796A-A8DB-13B8E889B417}"/>
               </a:ext>
             </a:extLst>
           </p:cNvPr>
@@ -4497,8 +4531,8 @@
         </p:nvSpPr>
         <p:spPr>
           <a:xfrm>
-            <a:off x="10707693" y="1961450"/>
-            <a:ext cx="1292213" cy="338554"/>
+            <a:off x="4448910" y="188368"/>
+            <a:ext cx="2082621" cy="338554"/>
           </a:xfrm>
           <a:prstGeom prst="rect">
             <a:avLst/>
@@ -4518,52 +4552,17 @@
           <a:p>
             <a:r>
               <a:rPr lang="en-US" sz="1600" dirty="0"/>
-              <a:t>Daily average</a:t>
-            </a:r>
-          </a:p>
-        </p:txBody>
-      </p:sp>
-      <p:sp>
-        <p:nvSpPr>
-          <p:cNvPr id="12" name="Title 1">
-            <a:extLst>
-              <a:ext uri="{FF2B5EF4-FFF2-40B4-BE49-F238E27FC236}">
-                <a16:creationId xmlns:a16="http://schemas.microsoft.com/office/drawing/2014/main" id="{0FD1B733-A17B-8287-7182-407C3DA1E09B}"/>
-              </a:ext>
-            </a:extLst>
-          </p:cNvPr>
-          <p:cNvSpPr>
-            <a:spLocks noGrp="1"/>
-          </p:cNvSpPr>
-          <p:nvPr>
-            <p:ph type="title"/>
-          </p:nvPr>
-        </p:nvSpPr>
-        <p:spPr>
-          <a:xfrm>
-            <a:off x="0" y="-3880"/>
-            <a:ext cx="10515600" cy="530802"/>
-          </a:xfrm>
-        </p:spPr>
-        <p:txBody>
-          <a:bodyPr>
-            <a:normAutofit fontScale="90000"/>
-          </a:bodyPr>
-          <a:lstStyle/>
-          <a:p>
-            <a:r>
-              <a:rPr lang="en-US" dirty="0"/>
-              <a:t>Mike</a:t>
-            </a:r>
-          </a:p>
-        </p:txBody>
-      </p:sp>
-      <p:sp>
-        <p:nvSpPr>
-          <p:cNvPr id="13" name="TextBox 12">
-            <a:extLst>
-              <a:ext uri="{FF2B5EF4-FFF2-40B4-BE49-F238E27FC236}">
-                <a16:creationId xmlns:a16="http://schemas.microsoft.com/office/drawing/2014/main" id="{1146637D-6BFC-E596-E843-88D63AD45F92}"/>
+              <a:t>channel 430, node 351</a:t>
+            </a:r>
+          </a:p>
+        </p:txBody>
+      </p:sp>
+      <p:sp>
+        <p:nvSpPr>
+          <p:cNvPr id="9" name="TextBox 8">
+            <a:extLst>
+              <a:ext uri="{FF2B5EF4-FFF2-40B4-BE49-F238E27FC236}">
+                <a16:creationId xmlns:a16="http://schemas.microsoft.com/office/drawing/2014/main" id="{1E0FDA2C-57EE-59D9-43F2-099A0FC9DA60}"/>
               </a:ext>
             </a:extLst>
           </p:cNvPr>
@@ -4600,10 +4599,10 @@
       </p:sp>
       <p:sp>
         <p:nvSpPr>
-          <p:cNvPr id="10" name="TextBox 9">
-            <a:extLst>
-              <a:ext uri="{FF2B5EF4-FFF2-40B4-BE49-F238E27FC236}">
-                <a16:creationId xmlns:a16="http://schemas.microsoft.com/office/drawing/2014/main" id="{54CB47FB-F5F9-ED08-821B-7AF4C48AAFCE}"/>
+          <p:cNvPr id="7" name="TextBox 6">
+            <a:extLst>
+              <a:ext uri="{FF2B5EF4-FFF2-40B4-BE49-F238E27FC236}">
+                <a16:creationId xmlns:a16="http://schemas.microsoft.com/office/drawing/2014/main" id="{3927DC66-0A9C-6E1F-1351-DD2D9218BB17}"/>
               </a:ext>
             </a:extLst>
           </p:cNvPr>
@@ -4612,8 +4611,8 @@
         </p:nvSpPr>
         <p:spPr>
           <a:xfrm>
-            <a:off x="4516241" y="357645"/>
-            <a:ext cx="1874231" cy="338554"/>
+            <a:off x="10853566" y="1850528"/>
+            <a:ext cx="1292213" cy="338554"/>
           </a:xfrm>
           <a:prstGeom prst="rect">
             <a:avLst/>
@@ -4633,17 +4632,17 @@
           <a:p>
             <a:r>
               <a:rPr lang="en-US" sz="1600" dirty="0"/>
-              <a:t>channel 59, node 52</a:t>
+              <a:t>Daily average</a:t>
             </a:r>
           </a:p>
         </p:txBody>
       </p:sp>
       <p:pic>
         <p:nvPicPr>
-          <p:cNvPr id="2" name="Picture 1" descr="Chart, histogram&#10;&#10;Description automatically generated">
-            <a:extLst>
-              <a:ext uri="{FF2B5EF4-FFF2-40B4-BE49-F238E27FC236}">
-                <a16:creationId xmlns:a16="http://schemas.microsoft.com/office/drawing/2014/main" id="{76E0356B-D97D-A063-0FDA-9B4D8C0B5D1B}"/>
+          <p:cNvPr id="4" name="Picture 3" descr="Chart, histogram&#10;&#10;Description automatically generated">
+            <a:extLst>
+              <a:ext uri="{FF2B5EF4-FFF2-40B4-BE49-F238E27FC236}">
+                <a16:creationId xmlns:a16="http://schemas.microsoft.com/office/drawing/2014/main" id="{C22D5395-0143-B90A-DD52-8396CECAC238}"/>
               </a:ext>
             </a:extLst>
           </p:cNvPr>
@@ -4666,7 +4665,7 @@
         </p:blipFill>
         <p:spPr>
           <a:xfrm>
-            <a:off x="91550" y="870150"/>
+            <a:off x="248778" y="971582"/>
             <a:ext cx="3429000" cy="2571750"/>
           </a:xfrm>
           <a:prstGeom prst="rect">
@@ -4676,10 +4675,10 @@
       </p:pic>
       <p:pic>
         <p:nvPicPr>
-          <p:cNvPr id="3" name="Picture 2" descr="Chart, histogram&#10;&#10;Description automatically generated">
-            <a:extLst>
-              <a:ext uri="{FF2B5EF4-FFF2-40B4-BE49-F238E27FC236}">
-                <a16:creationId xmlns:a16="http://schemas.microsoft.com/office/drawing/2014/main" id="{15C6D720-7468-60E2-B782-72A7ED970AEF}"/>
+          <p:cNvPr id="5" name="Picture 4" descr="Chart, histogram&#10;&#10;Description automatically generated">
+            <a:extLst>
+              <a:ext uri="{FF2B5EF4-FFF2-40B4-BE49-F238E27FC236}">
+                <a16:creationId xmlns:a16="http://schemas.microsoft.com/office/drawing/2014/main" id="{98C923AA-A37A-6F94-48AD-0992A6026F97}"/>
               </a:ext>
             </a:extLst>
           </p:cNvPr>
@@ -4702,7 +4701,7 @@
         </p:blipFill>
         <p:spPr>
           <a:xfrm>
-            <a:off x="3520550" y="888447"/>
+            <a:off x="3671525" y="971582"/>
             <a:ext cx="3429000" cy="2571750"/>
           </a:xfrm>
           <a:prstGeom prst="rect">
@@ -4712,10 +4711,10 @@
       </p:pic>
       <p:pic>
         <p:nvPicPr>
-          <p:cNvPr id="4" name="Picture 3" descr="Chart, histogram&#10;&#10;Description automatically generated">
-            <a:extLst>
-              <a:ext uri="{FF2B5EF4-FFF2-40B4-BE49-F238E27FC236}">
-                <a16:creationId xmlns:a16="http://schemas.microsoft.com/office/drawing/2014/main" id="{03DCFD95-C68B-379A-A5F3-D938729CBB5B}"/>
+          <p:cNvPr id="8" name="Picture 7" descr="Chart, histogram&#10;&#10;Description automatically generated">
+            <a:extLst>
+              <a:ext uri="{FF2B5EF4-FFF2-40B4-BE49-F238E27FC236}">
+                <a16:creationId xmlns:a16="http://schemas.microsoft.com/office/drawing/2014/main" id="{FD69CBF5-1CA3-B62C-6F61-84FCADDE2428}"/>
               </a:ext>
             </a:extLst>
           </p:cNvPr>
@@ -4738,7 +4737,7 @@
         </p:blipFill>
         <p:spPr>
           <a:xfrm>
-            <a:off x="6949550" y="888447"/>
+            <a:off x="6940142" y="971582"/>
             <a:ext cx="3429000" cy="2571750"/>
           </a:xfrm>
           <a:prstGeom prst="rect">
@@ -4749,7 +4748,7 @@
     </p:spTree>
     <p:extLst>
       <p:ext uri="{BB962C8B-B14F-4D97-AF65-F5344CB8AC3E}">
-        <p14:creationId xmlns:p14="http://schemas.microsoft.com/office/powerpoint/2010/main" val="3601026263"/>
+        <p14:creationId xmlns:p14="http://schemas.microsoft.com/office/powerpoint/2010/main" val="1583880285"/>
       </p:ext>
     </p:extLst>
   </p:cSld>
@@ -4826,7 +4825,7 @@
         <p:spPr>
           <a:xfrm>
             <a:off x="4448910" y="188368"/>
-            <a:ext cx="2082621" cy="338554"/>
+            <a:ext cx="1978427" cy="338554"/>
           </a:xfrm>
           <a:prstGeom prst="rect">
             <a:avLst/>
@@ -4846,7 +4845,7 @@
           <a:p>
             <a:r>
               <a:rPr lang="en-US" sz="1600" dirty="0"/>
-              <a:t>channel 430, node 351</a:t>
+              <a:t>channel 172, node 26</a:t>
             </a:r>
           </a:p>
         </p:txBody>
@@ -4891,6 +4890,114 @@
           </a:p>
         </p:txBody>
       </p:sp>
+      <p:pic>
+        <p:nvPicPr>
+          <p:cNvPr id="3" name="Picture 2">
+            <a:extLst>
+              <a:ext uri="{FF2B5EF4-FFF2-40B4-BE49-F238E27FC236}">
+                <a16:creationId xmlns:a16="http://schemas.microsoft.com/office/drawing/2014/main" id="{B0378381-121A-58FC-6540-A6B534FFCE03}"/>
+              </a:ext>
+            </a:extLst>
+          </p:cNvPr>
+          <p:cNvPicPr>
+            <a:picLocks noChangeAspect="1"/>
+          </p:cNvPicPr>
+          <p:nvPr/>
+        </p:nvPicPr>
+        <p:blipFill>
+          <a:blip r:embed="rId2" cstate="print">
+            <a:extLst>
+              <a:ext uri="{28A0092B-C50C-407E-A947-70E740481C1C}">
+                <a14:useLocalDpi xmlns:a14="http://schemas.microsoft.com/office/drawing/2010/main" val="0"/>
+              </a:ext>
+            </a:extLst>
+          </a:blip>
+          <a:stretch>
+            <a:fillRect/>
+          </a:stretch>
+        </p:blipFill>
+        <p:spPr>
+          <a:xfrm>
+            <a:off x="-1" y="702871"/>
+            <a:ext cx="3787281" cy="2840461"/>
+          </a:xfrm>
+          <a:prstGeom prst="rect">
+            <a:avLst/>
+          </a:prstGeom>
+        </p:spPr>
+      </p:pic>
+      <p:pic>
+        <p:nvPicPr>
+          <p:cNvPr id="10" name="Picture 9">
+            <a:extLst>
+              <a:ext uri="{FF2B5EF4-FFF2-40B4-BE49-F238E27FC236}">
+                <a16:creationId xmlns:a16="http://schemas.microsoft.com/office/drawing/2014/main" id="{78F7F509-4CBC-08A3-8EE2-8B07D9BF60D6}"/>
+              </a:ext>
+            </a:extLst>
+          </p:cNvPr>
+          <p:cNvPicPr>
+            <a:picLocks noChangeAspect="1"/>
+          </p:cNvPicPr>
+          <p:nvPr/>
+        </p:nvPicPr>
+        <p:blipFill>
+          <a:blip r:embed="rId3" cstate="print">
+            <a:extLst>
+              <a:ext uri="{28A0092B-C50C-407E-A947-70E740481C1C}">
+                <a14:useLocalDpi xmlns:a14="http://schemas.microsoft.com/office/drawing/2010/main" val="0"/>
+              </a:ext>
+            </a:extLst>
+          </a:blip>
+          <a:stretch>
+            <a:fillRect/>
+          </a:stretch>
+        </p:blipFill>
+        <p:spPr>
+          <a:xfrm>
+            <a:off x="3671524" y="719170"/>
+            <a:ext cx="3765549" cy="2824162"/>
+          </a:xfrm>
+          <a:prstGeom prst="rect">
+            <a:avLst/>
+          </a:prstGeom>
+        </p:spPr>
+      </p:pic>
+      <p:pic>
+        <p:nvPicPr>
+          <p:cNvPr id="11" name="Picture 10">
+            <a:extLst>
+              <a:ext uri="{FF2B5EF4-FFF2-40B4-BE49-F238E27FC236}">
+                <a16:creationId xmlns:a16="http://schemas.microsoft.com/office/drawing/2014/main" id="{F236008F-DB1A-672C-3C19-B64A7C5BB81F}"/>
+              </a:ext>
+            </a:extLst>
+          </p:cNvPr>
+          <p:cNvPicPr>
+            <a:picLocks noChangeAspect="1"/>
+          </p:cNvPicPr>
+          <p:nvPr/>
+        </p:nvPicPr>
+        <p:blipFill>
+          <a:blip r:embed="rId4" cstate="print">
+            <a:extLst>
+              <a:ext uri="{28A0092B-C50C-407E-A947-70E740481C1C}">
+                <a14:useLocalDpi xmlns:a14="http://schemas.microsoft.com/office/drawing/2010/main" val="0"/>
+              </a:ext>
+            </a:extLst>
+          </a:blip>
+          <a:stretch>
+            <a:fillRect/>
+          </a:stretch>
+        </p:blipFill>
+        <p:spPr>
+          <a:xfrm>
+            <a:off x="7337744" y="719170"/>
+            <a:ext cx="3765549" cy="2824162"/>
+          </a:xfrm>
+          <a:prstGeom prst="rect">
+            <a:avLst/>
+          </a:prstGeom>
+        </p:spPr>
+      </p:pic>
       <p:sp>
         <p:nvSpPr>
           <p:cNvPr id="7" name="TextBox 6">
@@ -4931,118 +5038,10 @@
           </a:p>
         </p:txBody>
       </p:sp>
-      <p:pic>
-        <p:nvPicPr>
-          <p:cNvPr id="4" name="Picture 3" descr="Chart, histogram&#10;&#10;Description automatically generated">
-            <a:extLst>
-              <a:ext uri="{FF2B5EF4-FFF2-40B4-BE49-F238E27FC236}">
-                <a16:creationId xmlns:a16="http://schemas.microsoft.com/office/drawing/2014/main" id="{C22D5395-0143-B90A-DD52-8396CECAC238}"/>
-              </a:ext>
-            </a:extLst>
-          </p:cNvPr>
-          <p:cNvPicPr>
-            <a:picLocks noChangeAspect="1"/>
-          </p:cNvPicPr>
-          <p:nvPr/>
-        </p:nvPicPr>
-        <p:blipFill>
-          <a:blip r:embed="rId2" cstate="print">
-            <a:extLst>
-              <a:ext uri="{28A0092B-C50C-407E-A947-70E740481C1C}">
-                <a14:useLocalDpi xmlns:a14="http://schemas.microsoft.com/office/drawing/2010/main" val="0"/>
-              </a:ext>
-            </a:extLst>
-          </a:blip>
-          <a:stretch>
-            <a:fillRect/>
-          </a:stretch>
-        </p:blipFill>
-        <p:spPr>
-          <a:xfrm>
-            <a:off x="248778" y="971582"/>
-            <a:ext cx="3429000" cy="2571750"/>
-          </a:xfrm>
-          <a:prstGeom prst="rect">
-            <a:avLst/>
-          </a:prstGeom>
-        </p:spPr>
-      </p:pic>
-      <p:pic>
-        <p:nvPicPr>
-          <p:cNvPr id="5" name="Picture 4" descr="Chart, histogram&#10;&#10;Description automatically generated">
-            <a:extLst>
-              <a:ext uri="{FF2B5EF4-FFF2-40B4-BE49-F238E27FC236}">
-                <a16:creationId xmlns:a16="http://schemas.microsoft.com/office/drawing/2014/main" id="{98C923AA-A37A-6F94-48AD-0992A6026F97}"/>
-              </a:ext>
-            </a:extLst>
-          </p:cNvPr>
-          <p:cNvPicPr>
-            <a:picLocks noChangeAspect="1"/>
-          </p:cNvPicPr>
-          <p:nvPr/>
-        </p:nvPicPr>
-        <p:blipFill>
-          <a:blip r:embed="rId3" cstate="print">
-            <a:extLst>
-              <a:ext uri="{28A0092B-C50C-407E-A947-70E740481C1C}">
-                <a14:useLocalDpi xmlns:a14="http://schemas.microsoft.com/office/drawing/2010/main" val="0"/>
-              </a:ext>
-            </a:extLst>
-          </a:blip>
-          <a:stretch>
-            <a:fillRect/>
-          </a:stretch>
-        </p:blipFill>
-        <p:spPr>
-          <a:xfrm>
-            <a:off x="3671525" y="971582"/>
-            <a:ext cx="3429000" cy="2571750"/>
-          </a:xfrm>
-          <a:prstGeom prst="rect">
-            <a:avLst/>
-          </a:prstGeom>
-        </p:spPr>
-      </p:pic>
-      <p:pic>
-        <p:nvPicPr>
-          <p:cNvPr id="8" name="Picture 7" descr="Chart, histogram&#10;&#10;Description automatically generated">
-            <a:extLst>
-              <a:ext uri="{FF2B5EF4-FFF2-40B4-BE49-F238E27FC236}">
-                <a16:creationId xmlns:a16="http://schemas.microsoft.com/office/drawing/2014/main" id="{FD69CBF5-1CA3-B62C-6F61-84FCADDE2428}"/>
-              </a:ext>
-            </a:extLst>
-          </p:cNvPr>
-          <p:cNvPicPr>
-            <a:picLocks noChangeAspect="1"/>
-          </p:cNvPicPr>
-          <p:nvPr/>
-        </p:nvPicPr>
-        <p:blipFill>
-          <a:blip r:embed="rId4" cstate="print">
-            <a:extLst>
-              <a:ext uri="{28A0092B-C50C-407E-A947-70E740481C1C}">
-                <a14:useLocalDpi xmlns:a14="http://schemas.microsoft.com/office/drawing/2010/main" val="0"/>
-              </a:ext>
-            </a:extLst>
-          </a:blip>
-          <a:stretch>
-            <a:fillRect/>
-          </a:stretch>
-        </p:blipFill>
-        <p:spPr>
-          <a:xfrm>
-            <a:off x="6940142" y="971582"/>
-            <a:ext cx="3429000" cy="2571750"/>
-          </a:xfrm>
-          <a:prstGeom prst="rect">
-            <a:avLst/>
-          </a:prstGeom>
-        </p:spPr>
-      </p:pic>
     </p:spTree>
     <p:extLst>
       <p:ext uri="{BB962C8B-B14F-4D97-AF65-F5344CB8AC3E}">
-        <p14:creationId xmlns:p14="http://schemas.microsoft.com/office/powerpoint/2010/main" val="1583880285"/>
+        <p14:creationId xmlns:p14="http://schemas.microsoft.com/office/powerpoint/2010/main" val="2389441221"/>
       </p:ext>
     </p:extLst>
   </p:cSld>
@@ -5139,17 +5138,17 @@
           <a:p>
             <a:r>
               <a:rPr lang="en-US" sz="1600" dirty="0"/>
-              <a:t>channel 172, node 26</a:t>
-            </a:r>
-          </a:p>
-        </p:txBody>
-      </p:sp>
-      <p:sp>
-        <p:nvSpPr>
-          <p:cNvPr id="9" name="TextBox 8">
-            <a:extLst>
-              <a:ext uri="{FF2B5EF4-FFF2-40B4-BE49-F238E27FC236}">
-                <a16:creationId xmlns:a16="http://schemas.microsoft.com/office/drawing/2014/main" id="{1E0FDA2C-57EE-59D9-43F2-099A0FC9DA60}"/>
+              <a:t>channel 160, node 31</a:t>
+            </a:r>
+          </a:p>
+        </p:txBody>
+      </p:sp>
+      <p:sp>
+        <p:nvSpPr>
+          <p:cNvPr id="7" name="TextBox 6">
+            <a:extLst>
+              <a:ext uri="{FF2B5EF4-FFF2-40B4-BE49-F238E27FC236}">
+                <a16:creationId xmlns:a16="http://schemas.microsoft.com/office/drawing/2014/main" id="{3927DC66-0A9C-6E1F-1351-DD2D9218BB17}"/>
               </a:ext>
             </a:extLst>
           </p:cNvPr>
@@ -5158,8 +5157,8 @@
         </p:nvSpPr>
         <p:spPr>
           <a:xfrm>
-            <a:off x="10707693" y="5226166"/>
-            <a:ext cx="1438086" cy="338554"/>
+            <a:off x="10768084" y="1850528"/>
+            <a:ext cx="1292213" cy="338554"/>
           </a:xfrm>
           <a:prstGeom prst="rect">
             <a:avLst/>
@@ -5179,125 +5178,17 @@
           <a:p>
             <a:r>
               <a:rPr lang="en-US" sz="1600" dirty="0"/>
-              <a:t>Hourly average</a:t>
-            </a:r>
-          </a:p>
-        </p:txBody>
-      </p:sp>
-      <p:pic>
-        <p:nvPicPr>
-          <p:cNvPr id="3" name="Picture 2">
-            <a:extLst>
-              <a:ext uri="{FF2B5EF4-FFF2-40B4-BE49-F238E27FC236}">
-                <a16:creationId xmlns:a16="http://schemas.microsoft.com/office/drawing/2014/main" id="{B0378381-121A-58FC-6540-A6B534FFCE03}"/>
-              </a:ext>
-            </a:extLst>
-          </p:cNvPr>
-          <p:cNvPicPr>
-            <a:picLocks noChangeAspect="1"/>
-          </p:cNvPicPr>
-          <p:nvPr/>
-        </p:nvPicPr>
-        <p:blipFill>
-          <a:blip r:embed="rId2" cstate="print">
-            <a:extLst>
-              <a:ext uri="{28A0092B-C50C-407E-A947-70E740481C1C}">
-                <a14:useLocalDpi xmlns:a14="http://schemas.microsoft.com/office/drawing/2010/main" val="0"/>
-              </a:ext>
-            </a:extLst>
-          </a:blip>
-          <a:stretch>
-            <a:fillRect/>
-          </a:stretch>
-        </p:blipFill>
-        <p:spPr>
-          <a:xfrm>
-            <a:off x="-1" y="702871"/>
-            <a:ext cx="3787281" cy="2840461"/>
-          </a:xfrm>
-          <a:prstGeom prst="rect">
-            <a:avLst/>
-          </a:prstGeom>
-        </p:spPr>
-      </p:pic>
-      <p:pic>
-        <p:nvPicPr>
-          <p:cNvPr id="10" name="Picture 9">
-            <a:extLst>
-              <a:ext uri="{FF2B5EF4-FFF2-40B4-BE49-F238E27FC236}">
-                <a16:creationId xmlns:a16="http://schemas.microsoft.com/office/drawing/2014/main" id="{78F7F509-4CBC-08A3-8EE2-8B07D9BF60D6}"/>
-              </a:ext>
-            </a:extLst>
-          </p:cNvPr>
-          <p:cNvPicPr>
-            <a:picLocks noChangeAspect="1"/>
-          </p:cNvPicPr>
-          <p:nvPr/>
-        </p:nvPicPr>
-        <p:blipFill>
-          <a:blip r:embed="rId3" cstate="print">
-            <a:extLst>
-              <a:ext uri="{28A0092B-C50C-407E-A947-70E740481C1C}">
-                <a14:useLocalDpi xmlns:a14="http://schemas.microsoft.com/office/drawing/2010/main" val="0"/>
-              </a:ext>
-            </a:extLst>
-          </a:blip>
-          <a:stretch>
-            <a:fillRect/>
-          </a:stretch>
-        </p:blipFill>
-        <p:spPr>
-          <a:xfrm>
-            <a:off x="3671524" y="719170"/>
-            <a:ext cx="3765549" cy="2824162"/>
-          </a:xfrm>
-          <a:prstGeom prst="rect">
-            <a:avLst/>
-          </a:prstGeom>
-        </p:spPr>
-      </p:pic>
-      <p:pic>
-        <p:nvPicPr>
-          <p:cNvPr id="11" name="Picture 10">
-            <a:extLst>
-              <a:ext uri="{FF2B5EF4-FFF2-40B4-BE49-F238E27FC236}">
-                <a16:creationId xmlns:a16="http://schemas.microsoft.com/office/drawing/2014/main" id="{F236008F-DB1A-672C-3C19-B64A7C5BB81F}"/>
-              </a:ext>
-            </a:extLst>
-          </p:cNvPr>
-          <p:cNvPicPr>
-            <a:picLocks noChangeAspect="1"/>
-          </p:cNvPicPr>
-          <p:nvPr/>
-        </p:nvPicPr>
-        <p:blipFill>
-          <a:blip r:embed="rId4" cstate="print">
-            <a:extLst>
-              <a:ext uri="{28A0092B-C50C-407E-A947-70E740481C1C}">
-                <a14:useLocalDpi xmlns:a14="http://schemas.microsoft.com/office/drawing/2010/main" val="0"/>
-              </a:ext>
-            </a:extLst>
-          </a:blip>
-          <a:stretch>
-            <a:fillRect/>
-          </a:stretch>
-        </p:blipFill>
-        <p:spPr>
-          <a:xfrm>
-            <a:off x="7337744" y="719170"/>
-            <a:ext cx="3765549" cy="2824162"/>
-          </a:xfrm>
-          <a:prstGeom prst="rect">
-            <a:avLst/>
-          </a:prstGeom>
-        </p:spPr>
-      </p:pic>
-      <p:sp>
-        <p:nvSpPr>
-          <p:cNvPr id="7" name="TextBox 6">
-            <a:extLst>
-              <a:ext uri="{FF2B5EF4-FFF2-40B4-BE49-F238E27FC236}">
-                <a16:creationId xmlns:a16="http://schemas.microsoft.com/office/drawing/2014/main" id="{3927DC66-0A9C-6E1F-1351-DD2D9218BB17}"/>
+              <a:t>Daily average</a:t>
+            </a:r>
+          </a:p>
+        </p:txBody>
+      </p:sp>
+      <p:sp>
+        <p:nvSpPr>
+          <p:cNvPr id="9" name="TextBox 8">
+            <a:extLst>
+              <a:ext uri="{FF2B5EF4-FFF2-40B4-BE49-F238E27FC236}">
+                <a16:creationId xmlns:a16="http://schemas.microsoft.com/office/drawing/2014/main" id="{1E0FDA2C-57EE-59D9-43F2-099A0FC9DA60}"/>
               </a:ext>
             </a:extLst>
           </p:cNvPr>
@@ -5306,8 +5197,8 @@
         </p:nvSpPr>
         <p:spPr>
           <a:xfrm>
-            <a:off x="10853566" y="1850528"/>
-            <a:ext cx="1292213" cy="338554"/>
+            <a:off x="10707693" y="5226166"/>
+            <a:ext cx="1438086" cy="338554"/>
           </a:xfrm>
           <a:prstGeom prst="rect">
             <a:avLst/>
@@ -5327,15 +5218,123 @@
           <a:p>
             <a:r>
               <a:rPr lang="en-US" sz="1600" dirty="0"/>
-              <a:t>Daily average</a:t>
-            </a:r>
-          </a:p>
-        </p:txBody>
-      </p:sp>
+              <a:t>Hourly average</a:t>
+            </a:r>
+          </a:p>
+        </p:txBody>
+      </p:sp>
+      <p:pic>
+        <p:nvPicPr>
+          <p:cNvPr id="3" name="Picture 2" descr="Chart, histogram&#10;&#10;Description automatically generated">
+            <a:extLst>
+              <a:ext uri="{FF2B5EF4-FFF2-40B4-BE49-F238E27FC236}">
+                <a16:creationId xmlns:a16="http://schemas.microsoft.com/office/drawing/2014/main" id="{BC4E1979-6786-22A5-B49E-FB87AEB870E7}"/>
+              </a:ext>
+            </a:extLst>
+          </p:cNvPr>
+          <p:cNvPicPr>
+            <a:picLocks noChangeAspect="1"/>
+          </p:cNvPicPr>
+          <p:nvPr/>
+        </p:nvPicPr>
+        <p:blipFill>
+          <a:blip r:embed="rId2" cstate="print">
+            <a:extLst>
+              <a:ext uri="{28A0092B-C50C-407E-A947-70E740481C1C}">
+                <a14:useLocalDpi xmlns:a14="http://schemas.microsoft.com/office/drawing/2010/main" val="0"/>
+              </a:ext>
+            </a:extLst>
+          </a:blip>
+          <a:stretch>
+            <a:fillRect/>
+          </a:stretch>
+        </p:blipFill>
+        <p:spPr>
+          <a:xfrm>
+            <a:off x="-40957" y="719170"/>
+            <a:ext cx="3762455" cy="2821841"/>
+          </a:xfrm>
+          <a:prstGeom prst="rect">
+            <a:avLst/>
+          </a:prstGeom>
+        </p:spPr>
+      </p:pic>
+      <p:pic>
+        <p:nvPicPr>
+          <p:cNvPr id="4" name="Picture 3" descr="Chart, histogram&#10;&#10;Description automatically generated">
+            <a:extLst>
+              <a:ext uri="{FF2B5EF4-FFF2-40B4-BE49-F238E27FC236}">
+                <a16:creationId xmlns:a16="http://schemas.microsoft.com/office/drawing/2014/main" id="{F8BCD1EB-656E-FEC2-9747-50CB4F9643B0}"/>
+              </a:ext>
+            </a:extLst>
+          </p:cNvPr>
+          <p:cNvPicPr>
+            <a:picLocks noChangeAspect="1"/>
+          </p:cNvPicPr>
+          <p:nvPr/>
+        </p:nvPicPr>
+        <p:blipFill>
+          <a:blip r:embed="rId3" cstate="print">
+            <a:extLst>
+              <a:ext uri="{28A0092B-C50C-407E-A947-70E740481C1C}">
+                <a14:useLocalDpi xmlns:a14="http://schemas.microsoft.com/office/drawing/2010/main" val="0"/>
+              </a:ext>
+            </a:extLst>
+          </a:blip>
+          <a:stretch>
+            <a:fillRect/>
+          </a:stretch>
+        </p:blipFill>
+        <p:spPr>
+          <a:xfrm>
+            <a:off x="3671524" y="719170"/>
+            <a:ext cx="3674383" cy="2755787"/>
+          </a:xfrm>
+          <a:prstGeom prst="rect">
+            <a:avLst/>
+          </a:prstGeom>
+        </p:spPr>
+      </p:pic>
+      <p:pic>
+        <p:nvPicPr>
+          <p:cNvPr id="5" name="Picture 4" descr="Chart, histogram&#10;&#10;Description automatically generated">
+            <a:extLst>
+              <a:ext uri="{FF2B5EF4-FFF2-40B4-BE49-F238E27FC236}">
+                <a16:creationId xmlns:a16="http://schemas.microsoft.com/office/drawing/2014/main" id="{8C595270-114F-9E13-491C-B593A81C39A3}"/>
+              </a:ext>
+            </a:extLst>
+          </p:cNvPr>
+          <p:cNvPicPr>
+            <a:picLocks noChangeAspect="1"/>
+          </p:cNvPicPr>
+          <p:nvPr/>
+        </p:nvPicPr>
+        <p:blipFill>
+          <a:blip r:embed="rId4" cstate="print">
+            <a:extLst>
+              <a:ext uri="{28A0092B-C50C-407E-A947-70E740481C1C}">
+                <a14:useLocalDpi xmlns:a14="http://schemas.microsoft.com/office/drawing/2010/main" val="0"/>
+              </a:ext>
+            </a:extLst>
+          </a:blip>
+          <a:stretch>
+            <a:fillRect/>
+          </a:stretch>
+        </p:blipFill>
+        <p:spPr>
+          <a:xfrm>
+            <a:off x="7143674" y="719169"/>
+            <a:ext cx="3624409" cy="2718307"/>
+          </a:xfrm>
+          <a:prstGeom prst="rect">
+            <a:avLst/>
+          </a:prstGeom>
+        </p:spPr>
+      </p:pic>
     </p:spTree>
     <p:extLst>
       <p:ext uri="{BB962C8B-B14F-4D97-AF65-F5344CB8AC3E}">
-        <p14:creationId xmlns:p14="http://schemas.microsoft.com/office/powerpoint/2010/main" val="2389441221"/>
+        <p14:creationId xmlns:p14="http://schemas.microsoft.com/office/powerpoint/2010/main" val="1571644646"/>
       </p:ext>
     </p:extLst>
   </p:cSld>
@@ -5432,7 +5431,7 @@
           <a:p>
             <a:r>
               <a:rPr lang="en-US" sz="1600" dirty="0"/>
-              <a:t>channel 160, node 31</a:t>
+              <a:t>channel 124, node 38</a:t>
             </a:r>
           </a:p>
         </p:txBody>
@@ -5519,10 +5518,10 @@
       </p:sp>
       <p:pic>
         <p:nvPicPr>
-          <p:cNvPr id="3" name="Picture 2" descr="Chart, histogram&#10;&#10;Description automatically generated">
-            <a:extLst>
-              <a:ext uri="{FF2B5EF4-FFF2-40B4-BE49-F238E27FC236}">
-                <a16:creationId xmlns:a16="http://schemas.microsoft.com/office/drawing/2014/main" id="{BC4E1979-6786-22A5-B49E-FB87AEB870E7}"/>
+          <p:cNvPr id="4" name="Picture 3" descr="Chart, histogram&#10;&#10;Description automatically generated">
+            <a:extLst>
+              <a:ext uri="{FF2B5EF4-FFF2-40B4-BE49-F238E27FC236}">
+                <a16:creationId xmlns:a16="http://schemas.microsoft.com/office/drawing/2014/main" id="{A3B2D16C-2748-1E3B-AC56-2B5FEFB17854}"/>
               </a:ext>
             </a:extLst>
           </p:cNvPr>
@@ -5545,8 +5544,8 @@
         </p:blipFill>
         <p:spPr>
           <a:xfrm>
-            <a:off x="-40957" y="719170"/>
-            <a:ext cx="3762455" cy="2821841"/>
+            <a:off x="128225" y="969261"/>
+            <a:ext cx="3429000" cy="2571750"/>
           </a:xfrm>
           <a:prstGeom prst="rect">
             <a:avLst/>
@@ -5555,10 +5554,10 @@
       </p:pic>
       <p:pic>
         <p:nvPicPr>
-          <p:cNvPr id="4" name="Picture 3" descr="Chart, histogram&#10;&#10;Description automatically generated">
-            <a:extLst>
-              <a:ext uri="{FF2B5EF4-FFF2-40B4-BE49-F238E27FC236}">
-                <a16:creationId xmlns:a16="http://schemas.microsoft.com/office/drawing/2014/main" id="{F8BCD1EB-656E-FEC2-9747-50CB4F9643B0}"/>
+          <p:cNvPr id="5" name="Picture 4" descr="Chart, histogram&#10;&#10;Description automatically generated">
+            <a:extLst>
+              <a:ext uri="{FF2B5EF4-FFF2-40B4-BE49-F238E27FC236}">
+                <a16:creationId xmlns:a16="http://schemas.microsoft.com/office/drawing/2014/main" id="{514B79AF-B1B7-249F-C042-5B1386FB2692}"/>
               </a:ext>
             </a:extLst>
           </p:cNvPr>
@@ -5581,8 +5580,8 @@
         </p:blipFill>
         <p:spPr>
           <a:xfrm>
-            <a:off x="3671524" y="719170"/>
-            <a:ext cx="3674383" cy="2755787"/>
+            <a:off x="3458711" y="969261"/>
+            <a:ext cx="3429000" cy="2571750"/>
           </a:xfrm>
           <a:prstGeom prst="rect">
             <a:avLst/>
@@ -5591,10 +5590,10 @@
       </p:pic>
       <p:pic>
         <p:nvPicPr>
-          <p:cNvPr id="5" name="Picture 4" descr="Chart, histogram&#10;&#10;Description automatically generated">
-            <a:extLst>
-              <a:ext uri="{FF2B5EF4-FFF2-40B4-BE49-F238E27FC236}">
-                <a16:creationId xmlns:a16="http://schemas.microsoft.com/office/drawing/2014/main" id="{8C595270-114F-9E13-491C-B593A81C39A3}"/>
+          <p:cNvPr id="8" name="Picture 7" descr="Chart, histogram&#10;&#10;Description automatically generated">
+            <a:extLst>
+              <a:ext uri="{FF2B5EF4-FFF2-40B4-BE49-F238E27FC236}">
+                <a16:creationId xmlns:a16="http://schemas.microsoft.com/office/drawing/2014/main" id="{FCD8F6F2-EDB9-FB0E-EA85-B460117BCAED}"/>
               </a:ext>
             </a:extLst>
           </p:cNvPr>
@@ -5617,8 +5616,8 @@
         </p:blipFill>
         <p:spPr>
           <a:xfrm>
-            <a:off x="7143674" y="719169"/>
-            <a:ext cx="3624409" cy="2718307"/>
+            <a:off x="6789197" y="969261"/>
+            <a:ext cx="3429000" cy="2571750"/>
           </a:xfrm>
           <a:prstGeom prst="rect">
             <a:avLst/>
@@ -5628,7 +5627,7 @@
     </p:spTree>
     <p:extLst>
       <p:ext uri="{BB962C8B-B14F-4D97-AF65-F5344CB8AC3E}">
-        <p14:creationId xmlns:p14="http://schemas.microsoft.com/office/powerpoint/2010/main" val="1571644646"/>
+        <p14:creationId xmlns:p14="http://schemas.microsoft.com/office/powerpoint/2010/main" val="2008240708"/>
       </p:ext>
     </p:extLst>
   </p:cSld>
@@ -5725,299 +5724,6 @@
           <a:p>
             <a:r>
               <a:rPr lang="en-US" sz="1600" dirty="0"/>
-              <a:t>channel 124, node 38</a:t>
-            </a:r>
-          </a:p>
-        </p:txBody>
-      </p:sp>
-      <p:sp>
-        <p:nvSpPr>
-          <p:cNvPr id="7" name="TextBox 6">
-            <a:extLst>
-              <a:ext uri="{FF2B5EF4-FFF2-40B4-BE49-F238E27FC236}">
-                <a16:creationId xmlns:a16="http://schemas.microsoft.com/office/drawing/2014/main" id="{3927DC66-0A9C-6E1F-1351-DD2D9218BB17}"/>
-              </a:ext>
-            </a:extLst>
-          </p:cNvPr>
-          <p:cNvSpPr txBox="1"/>
-          <p:nvPr/>
-        </p:nvSpPr>
-        <p:spPr>
-          <a:xfrm>
-            <a:off x="10768084" y="1850528"/>
-            <a:ext cx="1292213" cy="338554"/>
-          </a:xfrm>
-          <a:prstGeom prst="rect">
-            <a:avLst/>
-          </a:prstGeom>
-          <a:noFill/>
-          <a:ln>
-            <a:solidFill>
-              <a:schemeClr val="tx1"/>
-            </a:solidFill>
-          </a:ln>
-        </p:spPr>
-        <p:txBody>
-          <a:bodyPr wrap="none" rtlCol="0">
-            <a:spAutoFit/>
-          </a:bodyPr>
-          <a:lstStyle/>
-          <a:p>
-            <a:r>
-              <a:rPr lang="en-US" sz="1600" dirty="0"/>
-              <a:t>Daily average</a:t>
-            </a:r>
-          </a:p>
-        </p:txBody>
-      </p:sp>
-      <p:sp>
-        <p:nvSpPr>
-          <p:cNvPr id="9" name="TextBox 8">
-            <a:extLst>
-              <a:ext uri="{FF2B5EF4-FFF2-40B4-BE49-F238E27FC236}">
-                <a16:creationId xmlns:a16="http://schemas.microsoft.com/office/drawing/2014/main" id="{1E0FDA2C-57EE-59D9-43F2-099A0FC9DA60}"/>
-              </a:ext>
-            </a:extLst>
-          </p:cNvPr>
-          <p:cNvSpPr txBox="1"/>
-          <p:nvPr/>
-        </p:nvSpPr>
-        <p:spPr>
-          <a:xfrm>
-            <a:off x="10707693" y="5226166"/>
-            <a:ext cx="1438086" cy="338554"/>
-          </a:xfrm>
-          <a:prstGeom prst="rect">
-            <a:avLst/>
-          </a:prstGeom>
-          <a:noFill/>
-          <a:ln>
-            <a:solidFill>
-              <a:schemeClr val="tx1"/>
-            </a:solidFill>
-          </a:ln>
-        </p:spPr>
-        <p:txBody>
-          <a:bodyPr wrap="none" rtlCol="0">
-            <a:spAutoFit/>
-          </a:bodyPr>
-          <a:lstStyle/>
-          <a:p>
-            <a:r>
-              <a:rPr lang="en-US" sz="1600" dirty="0"/>
-              <a:t>Hourly average</a:t>
-            </a:r>
-          </a:p>
-        </p:txBody>
-      </p:sp>
-      <p:pic>
-        <p:nvPicPr>
-          <p:cNvPr id="4" name="Picture 3" descr="Chart, histogram&#10;&#10;Description automatically generated">
-            <a:extLst>
-              <a:ext uri="{FF2B5EF4-FFF2-40B4-BE49-F238E27FC236}">
-                <a16:creationId xmlns:a16="http://schemas.microsoft.com/office/drawing/2014/main" id="{A3B2D16C-2748-1E3B-AC56-2B5FEFB17854}"/>
-              </a:ext>
-            </a:extLst>
-          </p:cNvPr>
-          <p:cNvPicPr>
-            <a:picLocks noChangeAspect="1"/>
-          </p:cNvPicPr>
-          <p:nvPr/>
-        </p:nvPicPr>
-        <p:blipFill>
-          <a:blip r:embed="rId2" cstate="print">
-            <a:extLst>
-              <a:ext uri="{28A0092B-C50C-407E-A947-70E740481C1C}">
-                <a14:useLocalDpi xmlns:a14="http://schemas.microsoft.com/office/drawing/2010/main" val="0"/>
-              </a:ext>
-            </a:extLst>
-          </a:blip>
-          <a:stretch>
-            <a:fillRect/>
-          </a:stretch>
-        </p:blipFill>
-        <p:spPr>
-          <a:xfrm>
-            <a:off x="128225" y="969261"/>
-            <a:ext cx="3429000" cy="2571750"/>
-          </a:xfrm>
-          <a:prstGeom prst="rect">
-            <a:avLst/>
-          </a:prstGeom>
-        </p:spPr>
-      </p:pic>
-      <p:pic>
-        <p:nvPicPr>
-          <p:cNvPr id="5" name="Picture 4" descr="Chart, histogram&#10;&#10;Description automatically generated">
-            <a:extLst>
-              <a:ext uri="{FF2B5EF4-FFF2-40B4-BE49-F238E27FC236}">
-                <a16:creationId xmlns:a16="http://schemas.microsoft.com/office/drawing/2014/main" id="{514B79AF-B1B7-249F-C042-5B1386FB2692}"/>
-              </a:ext>
-            </a:extLst>
-          </p:cNvPr>
-          <p:cNvPicPr>
-            <a:picLocks noChangeAspect="1"/>
-          </p:cNvPicPr>
-          <p:nvPr/>
-        </p:nvPicPr>
-        <p:blipFill>
-          <a:blip r:embed="rId3" cstate="print">
-            <a:extLst>
-              <a:ext uri="{28A0092B-C50C-407E-A947-70E740481C1C}">
-                <a14:useLocalDpi xmlns:a14="http://schemas.microsoft.com/office/drawing/2010/main" val="0"/>
-              </a:ext>
-            </a:extLst>
-          </a:blip>
-          <a:stretch>
-            <a:fillRect/>
-          </a:stretch>
-        </p:blipFill>
-        <p:spPr>
-          <a:xfrm>
-            <a:off x="3458711" y="969261"/>
-            <a:ext cx="3429000" cy="2571750"/>
-          </a:xfrm>
-          <a:prstGeom prst="rect">
-            <a:avLst/>
-          </a:prstGeom>
-        </p:spPr>
-      </p:pic>
-      <p:pic>
-        <p:nvPicPr>
-          <p:cNvPr id="8" name="Picture 7" descr="Chart, histogram&#10;&#10;Description automatically generated">
-            <a:extLst>
-              <a:ext uri="{FF2B5EF4-FFF2-40B4-BE49-F238E27FC236}">
-                <a16:creationId xmlns:a16="http://schemas.microsoft.com/office/drawing/2014/main" id="{FCD8F6F2-EDB9-FB0E-EA85-B460117BCAED}"/>
-              </a:ext>
-            </a:extLst>
-          </p:cNvPr>
-          <p:cNvPicPr>
-            <a:picLocks noChangeAspect="1"/>
-          </p:cNvPicPr>
-          <p:nvPr/>
-        </p:nvPicPr>
-        <p:blipFill>
-          <a:blip r:embed="rId4" cstate="print">
-            <a:extLst>
-              <a:ext uri="{28A0092B-C50C-407E-A947-70E740481C1C}">
-                <a14:useLocalDpi xmlns:a14="http://schemas.microsoft.com/office/drawing/2010/main" val="0"/>
-              </a:ext>
-            </a:extLst>
-          </a:blip>
-          <a:stretch>
-            <a:fillRect/>
-          </a:stretch>
-        </p:blipFill>
-        <p:spPr>
-          <a:xfrm>
-            <a:off x="6789197" y="969261"/>
-            <a:ext cx="3429000" cy="2571750"/>
-          </a:xfrm>
-          <a:prstGeom prst="rect">
-            <a:avLst/>
-          </a:prstGeom>
-        </p:spPr>
-      </p:pic>
-    </p:spTree>
-    <p:extLst>
-      <p:ext uri="{BB962C8B-B14F-4D97-AF65-F5344CB8AC3E}">
-        <p14:creationId xmlns:p14="http://schemas.microsoft.com/office/powerpoint/2010/main" val="2008240708"/>
-      </p:ext>
-    </p:extLst>
-  </p:cSld>
-  <p:clrMapOvr>
-    <a:masterClrMapping/>
-  </p:clrMapOvr>
-</p:sld>
-</file>
-
-<file path=ppt/slides/slide16.xml><?xml version="1.0" encoding="utf-8"?>
-<p:sld xmlns:a="http://schemas.openxmlformats.org/drawingml/2006/main" xmlns:r="http://schemas.openxmlformats.org/officeDocument/2006/relationships" xmlns:p="http://schemas.openxmlformats.org/presentationml/2006/main">
-  <p:cSld>
-    <p:spTree>
-      <p:nvGrpSpPr>
-        <p:cNvPr id="1" name=""/>
-        <p:cNvGrpSpPr/>
-        <p:nvPr/>
-      </p:nvGrpSpPr>
-      <p:grpSpPr>
-        <a:xfrm>
-          <a:off x="0" y="0"/>
-          <a:ext cx="0" cy="0"/>
-          <a:chOff x="0" y="0"/>
-          <a:chExt cx="0" cy="0"/>
-        </a:xfrm>
-      </p:grpSpPr>
-      <p:sp>
-        <p:nvSpPr>
-          <p:cNvPr id="2" name="Title 1">
-            <a:extLst>
-              <a:ext uri="{FF2B5EF4-FFF2-40B4-BE49-F238E27FC236}">
-                <a16:creationId xmlns:a16="http://schemas.microsoft.com/office/drawing/2014/main" id="{35D1CFB4-6B3B-A24D-496D-61F77A311C0D}"/>
-              </a:ext>
-            </a:extLst>
-          </p:cNvPr>
-          <p:cNvSpPr>
-            <a:spLocks noGrp="1"/>
-          </p:cNvSpPr>
-          <p:nvPr>
-            <p:ph type="title"/>
-          </p:nvPr>
-        </p:nvSpPr>
-        <p:spPr>
-          <a:xfrm>
-            <a:off x="128225" y="73981"/>
-            <a:ext cx="10515600" cy="530802"/>
-          </a:xfrm>
-        </p:spPr>
-        <p:txBody>
-          <a:bodyPr>
-            <a:normAutofit fontScale="90000"/>
-          </a:bodyPr>
-          <a:lstStyle/>
-          <a:p>
-            <a:r>
-              <a:rPr lang="en-US" dirty="0"/>
-              <a:t>Cat</a:t>
-            </a:r>
-          </a:p>
-        </p:txBody>
-      </p:sp>
-      <p:sp>
-        <p:nvSpPr>
-          <p:cNvPr id="6" name="TextBox 5">
-            <a:extLst>
-              <a:ext uri="{FF2B5EF4-FFF2-40B4-BE49-F238E27FC236}">
-                <a16:creationId xmlns:a16="http://schemas.microsoft.com/office/drawing/2014/main" id="{C9C84A0F-F923-796A-A8DB-13B8E889B417}"/>
-              </a:ext>
-            </a:extLst>
-          </p:cNvPr>
-          <p:cNvSpPr txBox="1"/>
-          <p:nvPr/>
-        </p:nvSpPr>
-        <p:spPr>
-          <a:xfrm>
-            <a:off x="4448910" y="188368"/>
-            <a:ext cx="1978427" cy="338554"/>
-          </a:xfrm>
-          <a:prstGeom prst="rect">
-            <a:avLst/>
-          </a:prstGeom>
-          <a:noFill/>
-          <a:ln>
-            <a:solidFill>
-              <a:schemeClr val="tx1"/>
-            </a:solidFill>
-          </a:ln>
-        </p:spPr>
-        <p:txBody>
-          <a:bodyPr wrap="none" rtlCol="0">
-            <a:spAutoFit/>
-          </a:bodyPr>
-          <a:lstStyle/>
-          <a:p>
-            <a:r>
-              <a:rPr lang="en-US" sz="1600" dirty="0"/>
               <a:t>channel 106, node 93</a:t>
             </a:r>
           </a:p>
@@ -6224,7 +5930,7 @@
 </p:sld>
 </file>
 
-<file path=ppt/slides/slide17.xml><?xml version="1.0" encoding="utf-8"?>
+<file path=ppt/slides/slide16.xml><?xml version="1.0" encoding="utf-8"?>
 <p:sld xmlns:a="http://schemas.openxmlformats.org/drawingml/2006/main" xmlns:r="http://schemas.openxmlformats.org/officeDocument/2006/relationships" xmlns:p="http://schemas.openxmlformats.org/presentationml/2006/main">
   <p:cSld>
     <p:spTree>
@@ -7015,7 +6721,7 @@
           <p:cNvPr id="2" name="Title 1">
             <a:extLst>
               <a:ext uri="{FF2B5EF4-FFF2-40B4-BE49-F238E27FC236}">
-                <a16:creationId xmlns:a16="http://schemas.microsoft.com/office/drawing/2014/main" id="{45411D96-91BE-C68C-8793-151ECA24D968}"/>
+                <a16:creationId xmlns:a16="http://schemas.microsoft.com/office/drawing/2014/main" id="{35D1CFB4-6B3B-A24D-496D-61F77A311C0D}"/>
               </a:ext>
             </a:extLst>
           </p:cNvPr>
@@ -7028,19 +6734,19 @@
         </p:nvSpPr>
         <p:spPr>
           <a:xfrm>
-            <a:off x="838200" y="365126"/>
-            <a:ext cx="10515600" cy="723446"/>
+            <a:off x="128225" y="73981"/>
+            <a:ext cx="10515600" cy="530802"/>
           </a:xfrm>
         </p:spPr>
         <p:txBody>
           <a:bodyPr>
-            <a:normAutofit/>
+            <a:normAutofit fontScale="90000"/>
           </a:bodyPr>
           <a:lstStyle/>
           <a:p>
             <a:r>
-              <a:rPr lang="en-US" sz="4000" dirty="0"/>
-              <a:t>Daily vs Hourly</a:t>
+              <a:rPr lang="en-US" dirty="0"/>
+              <a:t>Mike</a:t>
             </a:r>
           </a:p>
         </p:txBody>
@@ -7050,7 +6756,7 @@
           <p:cNvPr id="4" name="Picture 3">
             <a:extLst>
               <a:ext uri="{FF2B5EF4-FFF2-40B4-BE49-F238E27FC236}">
-                <a16:creationId xmlns:a16="http://schemas.microsoft.com/office/drawing/2014/main" id="{16E9FA9E-BCCA-2E4B-86B7-CB0C68C54A3D}"/>
+                <a16:creationId xmlns:a16="http://schemas.microsoft.com/office/drawing/2014/main" id="{7CEB76A2-637B-B8E2-6CB8-99E047948FF7}"/>
               </a:ext>
             </a:extLst>
           </p:cNvPr>
@@ -7073,20 +6779,56 @@
         </p:blipFill>
         <p:spPr>
           <a:xfrm>
-            <a:off x="294112" y="1243446"/>
-            <a:ext cx="4572000" cy="3429000"/>
+            <a:off x="0" y="692757"/>
+            <a:ext cx="3800767" cy="2850575"/>
           </a:xfrm>
           <a:prstGeom prst="rect">
             <a:avLst/>
           </a:prstGeom>
         </p:spPr>
       </p:pic>
-      <p:sp>
-        <p:nvSpPr>
-          <p:cNvPr id="5" name="TextBox 4">
-            <a:extLst>
-              <a:ext uri="{FF2B5EF4-FFF2-40B4-BE49-F238E27FC236}">
-                <a16:creationId xmlns:a16="http://schemas.microsoft.com/office/drawing/2014/main" id="{704D93DB-C32D-2522-2AEA-2CC80CE2FAF6}"/>
+      <p:pic>
+        <p:nvPicPr>
+          <p:cNvPr id="5" name="Picture 4" descr="Chart, histogram&#10;&#10;Description automatically generated">
+            <a:extLst>
+              <a:ext uri="{FF2B5EF4-FFF2-40B4-BE49-F238E27FC236}">
+                <a16:creationId xmlns:a16="http://schemas.microsoft.com/office/drawing/2014/main" id="{061314B8-554A-D3E1-F9F4-998F5ABF6F2C}"/>
+              </a:ext>
+            </a:extLst>
+          </p:cNvPr>
+          <p:cNvPicPr>
+            <a:picLocks noChangeAspect="1"/>
+          </p:cNvPicPr>
+          <p:nvPr/>
+        </p:nvPicPr>
+        <p:blipFill>
+          <a:blip r:embed="rId3" cstate="print">
+            <a:extLst>
+              <a:ext uri="{28A0092B-C50C-407E-A947-70E740481C1C}">
+                <a14:useLocalDpi xmlns:a14="http://schemas.microsoft.com/office/drawing/2010/main" val="0"/>
+              </a:ext>
+            </a:extLst>
+          </a:blip>
+          <a:stretch>
+            <a:fillRect/>
+          </a:stretch>
+        </p:blipFill>
+        <p:spPr>
+          <a:xfrm>
+            <a:off x="7176660" y="702871"/>
+            <a:ext cx="3787281" cy="2840461"/>
+          </a:xfrm>
+          <a:prstGeom prst="rect">
+            <a:avLst/>
+          </a:prstGeom>
+        </p:spPr>
+      </p:pic>
+      <p:sp>
+        <p:nvSpPr>
+          <p:cNvPr id="6" name="TextBox 5">
+            <a:extLst>
+              <a:ext uri="{FF2B5EF4-FFF2-40B4-BE49-F238E27FC236}">
+                <a16:creationId xmlns:a16="http://schemas.microsoft.com/office/drawing/2014/main" id="{C9C84A0F-F923-796A-A8DB-13B8E889B417}"/>
               </a:ext>
             </a:extLst>
           </p:cNvPr>
@@ -7095,13 +6837,18 @@
         </p:nvSpPr>
         <p:spPr>
           <a:xfrm>
-            <a:off x="1514765" y="1690255"/>
-            <a:ext cx="2000869" cy="338554"/>
+            <a:off x="4448910" y="188368"/>
+            <a:ext cx="1874231" cy="338554"/>
           </a:xfrm>
           <a:prstGeom prst="rect">
             <a:avLst/>
           </a:prstGeom>
           <a:noFill/>
+          <a:ln>
+            <a:solidFill>
+              <a:schemeClr val="tx1"/>
+            </a:solidFill>
+          </a:ln>
         </p:spPr>
         <p:txBody>
           <a:bodyPr wrap="none" rtlCol="0">
@@ -7111,7 +6858,123 @@
           <a:p>
             <a:r>
               <a:rPr lang="en-US" sz="1600" dirty="0"/>
-              <a:t>channel 83, node 469</a:t>
+              <a:t>channel 42, node 37</a:t>
+            </a:r>
+          </a:p>
+        </p:txBody>
+      </p:sp>
+      <p:sp>
+        <p:nvSpPr>
+          <p:cNvPr id="7" name="TextBox 6">
+            <a:extLst>
+              <a:ext uri="{FF2B5EF4-FFF2-40B4-BE49-F238E27FC236}">
+                <a16:creationId xmlns:a16="http://schemas.microsoft.com/office/drawing/2014/main" id="{3927DC66-0A9C-6E1F-1351-DD2D9218BB17}"/>
+              </a:ext>
+            </a:extLst>
+          </p:cNvPr>
+          <p:cNvSpPr txBox="1"/>
+          <p:nvPr/>
+        </p:nvSpPr>
+        <p:spPr>
+          <a:xfrm>
+            <a:off x="10768084" y="1850528"/>
+            <a:ext cx="1292213" cy="338554"/>
+          </a:xfrm>
+          <a:prstGeom prst="rect">
+            <a:avLst/>
+          </a:prstGeom>
+          <a:noFill/>
+          <a:ln>
+            <a:solidFill>
+              <a:schemeClr val="tx1"/>
+            </a:solidFill>
+          </a:ln>
+        </p:spPr>
+        <p:txBody>
+          <a:bodyPr wrap="none" rtlCol="0">
+            <a:spAutoFit/>
+          </a:bodyPr>
+          <a:lstStyle/>
+          <a:p>
+            <a:r>
+              <a:rPr lang="en-US" sz="1600" dirty="0"/>
+              <a:t>Daily average</a:t>
+            </a:r>
+          </a:p>
+        </p:txBody>
+      </p:sp>
+      <p:pic>
+        <p:nvPicPr>
+          <p:cNvPr id="8" name="Picture 7" descr="Chart&#10;&#10;Description automatically generated">
+            <a:extLst>
+              <a:ext uri="{FF2B5EF4-FFF2-40B4-BE49-F238E27FC236}">
+                <a16:creationId xmlns:a16="http://schemas.microsoft.com/office/drawing/2014/main" id="{FE664C89-D589-0347-2217-469E9E18B2F9}"/>
+              </a:ext>
+            </a:extLst>
+          </p:cNvPr>
+          <p:cNvPicPr>
+            <a:picLocks noChangeAspect="1"/>
+          </p:cNvPicPr>
+          <p:nvPr/>
+        </p:nvPicPr>
+        <p:blipFill>
+          <a:blip r:embed="rId4" cstate="print">
+            <a:extLst>
+              <a:ext uri="{28A0092B-C50C-407E-A947-70E740481C1C}">
+                <a14:useLocalDpi xmlns:a14="http://schemas.microsoft.com/office/drawing/2010/main" val="0"/>
+              </a:ext>
+            </a:extLst>
+          </a:blip>
+          <a:stretch>
+            <a:fillRect/>
+          </a:stretch>
+        </p:blipFill>
+        <p:spPr>
+          <a:xfrm>
+            <a:off x="3588330" y="702871"/>
+            <a:ext cx="3787281" cy="2840461"/>
+          </a:xfrm>
+          <a:prstGeom prst="rect">
+            <a:avLst/>
+          </a:prstGeom>
+        </p:spPr>
+      </p:pic>
+      <p:sp>
+        <p:nvSpPr>
+          <p:cNvPr id="9" name="TextBox 8">
+            <a:extLst>
+              <a:ext uri="{FF2B5EF4-FFF2-40B4-BE49-F238E27FC236}">
+                <a16:creationId xmlns:a16="http://schemas.microsoft.com/office/drawing/2014/main" id="{1E0FDA2C-57EE-59D9-43F2-099A0FC9DA60}"/>
+              </a:ext>
+            </a:extLst>
+          </p:cNvPr>
+          <p:cNvSpPr txBox="1"/>
+          <p:nvPr/>
+        </p:nvSpPr>
+        <p:spPr>
+          <a:xfrm>
+            <a:off x="10707693" y="5226166"/>
+            <a:ext cx="1438086" cy="338554"/>
+          </a:xfrm>
+          <a:prstGeom prst="rect">
+            <a:avLst/>
+          </a:prstGeom>
+          <a:noFill/>
+          <a:ln>
+            <a:solidFill>
+              <a:schemeClr val="tx1"/>
+            </a:solidFill>
+          </a:ln>
+        </p:spPr>
+        <p:txBody>
+          <a:bodyPr wrap="none" rtlCol="0">
+            <a:spAutoFit/>
+          </a:bodyPr>
+          <a:lstStyle/>
+          <a:p>
+            <a:r>
+              <a:rPr lang="en-US" sz="1600" dirty="0"/>
+              <a:t>Hourly average</a:t>
             </a:r>
           </a:p>
         </p:txBody>
@@ -7119,7 +6982,7 @@
     </p:spTree>
     <p:extLst>
       <p:ext uri="{BB962C8B-B14F-4D97-AF65-F5344CB8AC3E}">
-        <p14:creationId xmlns:p14="http://schemas.microsoft.com/office/powerpoint/2010/main" val="2806809707"/>
+        <p14:creationId xmlns:p14="http://schemas.microsoft.com/office/powerpoint/2010/main" val="4046760473"/>
       </p:ext>
     </p:extLst>
   </p:cSld>
@@ -7146,47 +7009,12 @@
           <a:chExt cx="0" cy="0"/>
         </a:xfrm>
       </p:grpSpPr>
-      <p:sp>
-        <p:nvSpPr>
-          <p:cNvPr id="2" name="Title 1">
-            <a:extLst>
-              <a:ext uri="{FF2B5EF4-FFF2-40B4-BE49-F238E27FC236}">
-                <a16:creationId xmlns:a16="http://schemas.microsoft.com/office/drawing/2014/main" id="{35D1CFB4-6B3B-A24D-496D-61F77A311C0D}"/>
-              </a:ext>
-            </a:extLst>
-          </p:cNvPr>
-          <p:cNvSpPr>
-            <a:spLocks noGrp="1"/>
-          </p:cNvSpPr>
-          <p:nvPr>
-            <p:ph type="title"/>
-          </p:nvPr>
-        </p:nvSpPr>
-        <p:spPr>
-          <a:xfrm>
-            <a:off x="128225" y="73981"/>
-            <a:ext cx="10515600" cy="530802"/>
-          </a:xfrm>
-        </p:spPr>
-        <p:txBody>
-          <a:bodyPr>
-            <a:normAutofit fontScale="90000"/>
-          </a:bodyPr>
-          <a:lstStyle/>
-          <a:p>
-            <a:r>
-              <a:rPr lang="en-US" dirty="0"/>
-              <a:t>Mike</a:t>
-            </a:r>
-          </a:p>
-        </p:txBody>
-      </p:sp>
       <p:pic>
         <p:nvPicPr>
-          <p:cNvPr id="4" name="Picture 3">
-            <a:extLst>
-              <a:ext uri="{FF2B5EF4-FFF2-40B4-BE49-F238E27FC236}">
-                <a16:creationId xmlns:a16="http://schemas.microsoft.com/office/drawing/2014/main" id="{7CEB76A2-637B-B8E2-6CB8-99E047948FF7}"/>
+          <p:cNvPr id="5" name="Picture 4" descr="Chart, histogram&#10;&#10;Description automatically generated">
+            <a:extLst>
+              <a:ext uri="{FF2B5EF4-FFF2-40B4-BE49-F238E27FC236}">
+                <a16:creationId xmlns:a16="http://schemas.microsoft.com/office/drawing/2014/main" id="{6E348895-CF5B-754A-BC48-DF30DA0297B7}"/>
               </a:ext>
             </a:extLst>
           </p:cNvPr>
@@ -7196,7 +7024,7 @@
           <p:nvPr/>
         </p:nvPicPr>
         <p:blipFill>
-          <a:blip r:embed="rId2">
+          <a:blip r:embed="rId2" cstate="print">
             <a:extLst>
               <a:ext uri="{28A0092B-C50C-407E-A947-70E740481C1C}">
                 <a14:useLocalDpi xmlns:a14="http://schemas.microsoft.com/office/drawing/2010/main" val="0"/>
@@ -7209,8 +7037,8 @@
         </p:blipFill>
         <p:spPr>
           <a:xfrm>
-            <a:off x="0" y="692757"/>
-            <a:ext cx="3800767" cy="2850575"/>
+            <a:off x="-1" y="822121"/>
+            <a:ext cx="3743893" cy="2807920"/>
           </a:xfrm>
           <a:prstGeom prst="rect">
             <a:avLst/>
@@ -7219,10 +7047,10 @@
       </p:pic>
       <p:pic>
         <p:nvPicPr>
-          <p:cNvPr id="5" name="Picture 4" descr="Chart, histogram&#10;&#10;Description automatically generated">
-            <a:extLst>
-              <a:ext uri="{FF2B5EF4-FFF2-40B4-BE49-F238E27FC236}">
-                <a16:creationId xmlns:a16="http://schemas.microsoft.com/office/drawing/2014/main" id="{061314B8-554A-D3E1-F9F4-998F5ABF6F2C}"/>
+          <p:cNvPr id="6" name="Picture 5" descr="Chart, histogram&#10;&#10;Description automatically generated">
+            <a:extLst>
+              <a:ext uri="{FF2B5EF4-FFF2-40B4-BE49-F238E27FC236}">
+                <a16:creationId xmlns:a16="http://schemas.microsoft.com/office/drawing/2014/main" id="{9D662AD9-C4D9-405B-8FAE-536464F9B108}"/>
               </a:ext>
             </a:extLst>
           </p:cNvPr>
@@ -7245,20 +7073,56 @@
         </p:blipFill>
         <p:spPr>
           <a:xfrm>
-            <a:off x="7176660" y="702871"/>
-            <a:ext cx="3787281" cy="2840461"/>
+            <a:off x="3640531" y="822121"/>
+            <a:ext cx="3743893" cy="2807920"/>
           </a:xfrm>
           <a:prstGeom prst="rect">
             <a:avLst/>
           </a:prstGeom>
         </p:spPr>
       </p:pic>
-      <p:sp>
-        <p:nvSpPr>
-          <p:cNvPr id="6" name="TextBox 5">
-            <a:extLst>
-              <a:ext uri="{FF2B5EF4-FFF2-40B4-BE49-F238E27FC236}">
-                <a16:creationId xmlns:a16="http://schemas.microsoft.com/office/drawing/2014/main" id="{C9C84A0F-F923-796A-A8DB-13B8E889B417}"/>
+      <p:pic>
+        <p:nvPicPr>
+          <p:cNvPr id="8" name="Picture 7" descr="Chart, histogram&#10;&#10;Description automatically generated">
+            <a:extLst>
+              <a:ext uri="{FF2B5EF4-FFF2-40B4-BE49-F238E27FC236}">
+                <a16:creationId xmlns:a16="http://schemas.microsoft.com/office/drawing/2014/main" id="{A7DC26E4-B2EC-8690-3B7F-13F54B9E9556}"/>
+              </a:ext>
+            </a:extLst>
+          </p:cNvPr>
+          <p:cNvPicPr>
+            <a:picLocks noChangeAspect="1"/>
+          </p:cNvPicPr>
+          <p:nvPr/>
+        </p:nvPicPr>
+        <p:blipFill>
+          <a:blip r:embed="rId4" cstate="print">
+            <a:extLst>
+              <a:ext uri="{28A0092B-C50C-407E-A947-70E740481C1C}">
+                <a14:useLocalDpi xmlns:a14="http://schemas.microsoft.com/office/drawing/2010/main" val="0"/>
+              </a:ext>
+            </a:extLst>
+          </a:blip>
+          <a:stretch>
+            <a:fillRect/>
+          </a:stretch>
+        </p:blipFill>
+        <p:spPr>
+          <a:xfrm>
+            <a:off x="7276961" y="822121"/>
+            <a:ext cx="3743893" cy="2807920"/>
+          </a:xfrm>
+          <a:prstGeom prst="rect">
+            <a:avLst/>
+          </a:prstGeom>
+        </p:spPr>
+      </p:pic>
+      <p:sp>
+        <p:nvSpPr>
+          <p:cNvPr id="9" name="TextBox 8">
+            <a:extLst>
+              <a:ext uri="{FF2B5EF4-FFF2-40B4-BE49-F238E27FC236}">
+                <a16:creationId xmlns:a16="http://schemas.microsoft.com/office/drawing/2014/main" id="{BF682709-69E1-D64C-E2E6-246C83C997B7}"/>
               </a:ext>
             </a:extLst>
           </p:cNvPr>
@@ -7267,8 +7131,8 @@
         </p:nvSpPr>
         <p:spPr>
           <a:xfrm>
-            <a:off x="4448910" y="188368"/>
-            <a:ext cx="1874231" cy="338554"/>
+            <a:off x="10707693" y="1961450"/>
+            <a:ext cx="1292213" cy="338554"/>
           </a:xfrm>
           <a:prstGeom prst="rect">
             <a:avLst/>
@@ -7288,17 +7152,17 @@
           <a:p>
             <a:r>
               <a:rPr lang="en-US" sz="1600" dirty="0"/>
-              <a:t>channel 42, node 37</a:t>
-            </a:r>
-          </a:p>
-        </p:txBody>
-      </p:sp>
-      <p:sp>
-        <p:nvSpPr>
-          <p:cNvPr id="7" name="TextBox 6">
-            <a:extLst>
-              <a:ext uri="{FF2B5EF4-FFF2-40B4-BE49-F238E27FC236}">
-                <a16:creationId xmlns:a16="http://schemas.microsoft.com/office/drawing/2014/main" id="{3927DC66-0A9C-6E1F-1351-DD2D9218BB17}"/>
+              <a:t>Daily average</a:t>
+            </a:r>
+          </a:p>
+        </p:txBody>
+      </p:sp>
+      <p:sp>
+        <p:nvSpPr>
+          <p:cNvPr id="10" name="TextBox 9">
+            <a:extLst>
+              <a:ext uri="{FF2B5EF4-FFF2-40B4-BE49-F238E27FC236}">
+                <a16:creationId xmlns:a16="http://schemas.microsoft.com/office/drawing/2014/main" id="{54CB47FB-F5F9-ED08-821B-7AF4C48AAFCE}"/>
               </a:ext>
             </a:extLst>
           </p:cNvPr>
@@ -7307,8 +7171,8 @@
         </p:nvSpPr>
         <p:spPr>
           <a:xfrm>
-            <a:off x="10768084" y="1850528"/>
-            <a:ext cx="1292213" cy="338554"/>
+            <a:off x="4499463" y="271439"/>
+            <a:ext cx="1874231" cy="338554"/>
           </a:xfrm>
           <a:prstGeom prst="rect">
             <a:avLst/>
@@ -7328,53 +7192,52 @@
           <a:p>
             <a:r>
               <a:rPr lang="en-US" sz="1600" dirty="0"/>
-              <a:t>Daily average</a:t>
-            </a:r>
-          </a:p>
-        </p:txBody>
-      </p:sp>
-      <p:pic>
-        <p:nvPicPr>
-          <p:cNvPr id="8" name="Picture 7" descr="Chart&#10;&#10;Description automatically generated">
-            <a:extLst>
-              <a:ext uri="{FF2B5EF4-FFF2-40B4-BE49-F238E27FC236}">
-                <a16:creationId xmlns:a16="http://schemas.microsoft.com/office/drawing/2014/main" id="{FE664C89-D589-0347-2217-469E9E18B2F9}"/>
-              </a:ext>
-            </a:extLst>
-          </p:cNvPr>
-          <p:cNvPicPr>
-            <a:picLocks noChangeAspect="1"/>
-          </p:cNvPicPr>
-          <p:nvPr/>
-        </p:nvPicPr>
-        <p:blipFill>
-          <a:blip r:embed="rId4" cstate="print">
-            <a:extLst>
-              <a:ext uri="{28A0092B-C50C-407E-A947-70E740481C1C}">
-                <a14:useLocalDpi xmlns:a14="http://schemas.microsoft.com/office/drawing/2010/main" val="0"/>
-              </a:ext>
-            </a:extLst>
-          </a:blip>
-          <a:stretch>
-            <a:fillRect/>
-          </a:stretch>
-        </p:blipFill>
-        <p:spPr>
-          <a:xfrm>
-            <a:off x="3588330" y="702871"/>
-            <a:ext cx="3787281" cy="2840461"/>
-          </a:xfrm>
-          <a:prstGeom prst="rect">
-            <a:avLst/>
-          </a:prstGeom>
-        </p:spPr>
-      </p:pic>
-      <p:sp>
-        <p:nvSpPr>
-          <p:cNvPr id="9" name="TextBox 8">
-            <a:extLst>
-              <a:ext uri="{FF2B5EF4-FFF2-40B4-BE49-F238E27FC236}">
-                <a16:creationId xmlns:a16="http://schemas.microsoft.com/office/drawing/2014/main" id="{1E0FDA2C-57EE-59D9-43F2-099A0FC9DA60}"/>
+              <a:t>channel 43, node 39</a:t>
+            </a:r>
+          </a:p>
+        </p:txBody>
+      </p:sp>
+      <p:sp>
+        <p:nvSpPr>
+          <p:cNvPr id="12" name="Title 1">
+            <a:extLst>
+              <a:ext uri="{FF2B5EF4-FFF2-40B4-BE49-F238E27FC236}">
+                <a16:creationId xmlns:a16="http://schemas.microsoft.com/office/drawing/2014/main" id="{0FD1B733-A17B-8287-7182-407C3DA1E09B}"/>
+              </a:ext>
+            </a:extLst>
+          </p:cNvPr>
+          <p:cNvSpPr>
+            <a:spLocks noGrp="1"/>
+          </p:cNvSpPr>
+          <p:nvPr>
+            <p:ph type="title"/>
+          </p:nvPr>
+        </p:nvSpPr>
+        <p:spPr>
+          <a:xfrm>
+            <a:off x="0" y="-3880"/>
+            <a:ext cx="10515600" cy="530802"/>
+          </a:xfrm>
+        </p:spPr>
+        <p:txBody>
+          <a:bodyPr>
+            <a:normAutofit fontScale="90000"/>
+          </a:bodyPr>
+          <a:lstStyle/>
+          <a:p>
+            <a:r>
+              <a:rPr lang="en-US" dirty="0"/>
+              <a:t>Mike</a:t>
+            </a:r>
+          </a:p>
+        </p:txBody>
+      </p:sp>
+      <p:sp>
+        <p:nvSpPr>
+          <p:cNvPr id="13" name="TextBox 12">
+            <a:extLst>
+              <a:ext uri="{FF2B5EF4-FFF2-40B4-BE49-F238E27FC236}">
+                <a16:creationId xmlns:a16="http://schemas.microsoft.com/office/drawing/2014/main" id="{1146637D-6BFC-E596-E843-88D63AD45F92}"/>
               </a:ext>
             </a:extLst>
           </p:cNvPr>
@@ -7412,7 +7275,7 @@
     </p:spTree>
     <p:extLst>
       <p:ext uri="{BB962C8B-B14F-4D97-AF65-F5344CB8AC3E}">
-        <p14:creationId xmlns:p14="http://schemas.microsoft.com/office/powerpoint/2010/main" val="4046760473"/>
+        <p14:creationId xmlns:p14="http://schemas.microsoft.com/office/powerpoint/2010/main" val="1921078000"/>
       </p:ext>
     </p:extLst>
   </p:cSld>
@@ -7439,114 +7302,6 @@
           <a:chExt cx="0" cy="0"/>
         </a:xfrm>
       </p:grpSpPr>
-      <p:pic>
-        <p:nvPicPr>
-          <p:cNvPr id="5" name="Picture 4" descr="Chart, histogram&#10;&#10;Description automatically generated">
-            <a:extLst>
-              <a:ext uri="{FF2B5EF4-FFF2-40B4-BE49-F238E27FC236}">
-                <a16:creationId xmlns:a16="http://schemas.microsoft.com/office/drawing/2014/main" id="{6E348895-CF5B-754A-BC48-DF30DA0297B7}"/>
-              </a:ext>
-            </a:extLst>
-          </p:cNvPr>
-          <p:cNvPicPr>
-            <a:picLocks noChangeAspect="1"/>
-          </p:cNvPicPr>
-          <p:nvPr/>
-        </p:nvPicPr>
-        <p:blipFill>
-          <a:blip r:embed="rId2" cstate="print">
-            <a:extLst>
-              <a:ext uri="{28A0092B-C50C-407E-A947-70E740481C1C}">
-                <a14:useLocalDpi xmlns:a14="http://schemas.microsoft.com/office/drawing/2010/main" val="0"/>
-              </a:ext>
-            </a:extLst>
-          </a:blip>
-          <a:stretch>
-            <a:fillRect/>
-          </a:stretch>
-        </p:blipFill>
-        <p:spPr>
-          <a:xfrm>
-            <a:off x="-1" y="822121"/>
-            <a:ext cx="3743893" cy="2807920"/>
-          </a:xfrm>
-          <a:prstGeom prst="rect">
-            <a:avLst/>
-          </a:prstGeom>
-        </p:spPr>
-      </p:pic>
-      <p:pic>
-        <p:nvPicPr>
-          <p:cNvPr id="6" name="Picture 5" descr="Chart, histogram&#10;&#10;Description automatically generated">
-            <a:extLst>
-              <a:ext uri="{FF2B5EF4-FFF2-40B4-BE49-F238E27FC236}">
-                <a16:creationId xmlns:a16="http://schemas.microsoft.com/office/drawing/2014/main" id="{9D662AD9-C4D9-405B-8FAE-536464F9B108}"/>
-              </a:ext>
-            </a:extLst>
-          </p:cNvPr>
-          <p:cNvPicPr>
-            <a:picLocks noChangeAspect="1"/>
-          </p:cNvPicPr>
-          <p:nvPr/>
-        </p:nvPicPr>
-        <p:blipFill>
-          <a:blip r:embed="rId3" cstate="print">
-            <a:extLst>
-              <a:ext uri="{28A0092B-C50C-407E-A947-70E740481C1C}">
-                <a14:useLocalDpi xmlns:a14="http://schemas.microsoft.com/office/drawing/2010/main" val="0"/>
-              </a:ext>
-            </a:extLst>
-          </a:blip>
-          <a:stretch>
-            <a:fillRect/>
-          </a:stretch>
-        </p:blipFill>
-        <p:spPr>
-          <a:xfrm>
-            <a:off x="3640531" y="822121"/>
-            <a:ext cx="3743893" cy="2807920"/>
-          </a:xfrm>
-          <a:prstGeom prst="rect">
-            <a:avLst/>
-          </a:prstGeom>
-        </p:spPr>
-      </p:pic>
-      <p:pic>
-        <p:nvPicPr>
-          <p:cNvPr id="8" name="Picture 7" descr="Chart, histogram&#10;&#10;Description automatically generated">
-            <a:extLst>
-              <a:ext uri="{FF2B5EF4-FFF2-40B4-BE49-F238E27FC236}">
-                <a16:creationId xmlns:a16="http://schemas.microsoft.com/office/drawing/2014/main" id="{A7DC26E4-B2EC-8690-3B7F-13F54B9E9556}"/>
-              </a:ext>
-            </a:extLst>
-          </p:cNvPr>
-          <p:cNvPicPr>
-            <a:picLocks noChangeAspect="1"/>
-          </p:cNvPicPr>
-          <p:nvPr/>
-        </p:nvPicPr>
-        <p:blipFill>
-          <a:blip r:embed="rId4" cstate="print">
-            <a:extLst>
-              <a:ext uri="{28A0092B-C50C-407E-A947-70E740481C1C}">
-                <a14:useLocalDpi xmlns:a14="http://schemas.microsoft.com/office/drawing/2010/main" val="0"/>
-              </a:ext>
-            </a:extLst>
-          </a:blip>
-          <a:stretch>
-            <a:fillRect/>
-          </a:stretch>
-        </p:blipFill>
-        <p:spPr>
-          <a:xfrm>
-            <a:off x="7276961" y="822121"/>
-            <a:ext cx="3743893" cy="2807920"/>
-          </a:xfrm>
-          <a:prstGeom prst="rect">
-            <a:avLst/>
-          </a:prstGeom>
-        </p:spPr>
-      </p:pic>
       <p:sp>
         <p:nvSpPr>
           <p:cNvPr id="9" name="TextBox 8">
@@ -7589,10 +7344,45 @@
       </p:sp>
       <p:sp>
         <p:nvSpPr>
-          <p:cNvPr id="10" name="TextBox 9">
-            <a:extLst>
-              <a:ext uri="{FF2B5EF4-FFF2-40B4-BE49-F238E27FC236}">
-                <a16:creationId xmlns:a16="http://schemas.microsoft.com/office/drawing/2014/main" id="{54CB47FB-F5F9-ED08-821B-7AF4C48AAFCE}"/>
+          <p:cNvPr id="12" name="Title 1">
+            <a:extLst>
+              <a:ext uri="{FF2B5EF4-FFF2-40B4-BE49-F238E27FC236}">
+                <a16:creationId xmlns:a16="http://schemas.microsoft.com/office/drawing/2014/main" id="{0FD1B733-A17B-8287-7182-407C3DA1E09B}"/>
+              </a:ext>
+            </a:extLst>
+          </p:cNvPr>
+          <p:cNvSpPr>
+            <a:spLocks noGrp="1"/>
+          </p:cNvSpPr>
+          <p:nvPr>
+            <p:ph type="title"/>
+          </p:nvPr>
+        </p:nvSpPr>
+        <p:spPr>
+          <a:xfrm>
+            <a:off x="0" y="-3880"/>
+            <a:ext cx="10515600" cy="530802"/>
+          </a:xfrm>
+        </p:spPr>
+        <p:txBody>
+          <a:bodyPr>
+            <a:normAutofit fontScale="90000"/>
+          </a:bodyPr>
+          <a:lstStyle/>
+          <a:p>
+            <a:r>
+              <a:rPr lang="en-US" dirty="0"/>
+              <a:t>Mike</a:t>
+            </a:r>
+          </a:p>
+        </p:txBody>
+      </p:sp>
+      <p:sp>
+        <p:nvSpPr>
+          <p:cNvPr id="13" name="TextBox 12">
+            <a:extLst>
+              <a:ext uri="{FF2B5EF4-FFF2-40B4-BE49-F238E27FC236}">
+                <a16:creationId xmlns:a16="http://schemas.microsoft.com/office/drawing/2014/main" id="{1146637D-6BFC-E596-E843-88D63AD45F92}"/>
               </a:ext>
             </a:extLst>
           </p:cNvPr>
@@ -7601,8 +7391,8 @@
         </p:nvSpPr>
         <p:spPr>
           <a:xfrm>
-            <a:off x="4499463" y="271439"/>
-            <a:ext cx="1874231" cy="338554"/>
+            <a:off x="10707693" y="5226166"/>
+            <a:ext cx="1438086" cy="338554"/>
           </a:xfrm>
           <a:prstGeom prst="rect">
             <a:avLst/>
@@ -7622,52 +7412,17 @@
           <a:p>
             <a:r>
               <a:rPr lang="en-US" sz="1600" dirty="0"/>
-              <a:t>channel 43, node 39</a:t>
-            </a:r>
-          </a:p>
-        </p:txBody>
-      </p:sp>
-      <p:sp>
-        <p:nvSpPr>
-          <p:cNvPr id="12" name="Title 1">
-            <a:extLst>
-              <a:ext uri="{FF2B5EF4-FFF2-40B4-BE49-F238E27FC236}">
-                <a16:creationId xmlns:a16="http://schemas.microsoft.com/office/drawing/2014/main" id="{0FD1B733-A17B-8287-7182-407C3DA1E09B}"/>
-              </a:ext>
-            </a:extLst>
-          </p:cNvPr>
-          <p:cNvSpPr>
-            <a:spLocks noGrp="1"/>
-          </p:cNvSpPr>
-          <p:nvPr>
-            <p:ph type="title"/>
-          </p:nvPr>
-        </p:nvSpPr>
-        <p:spPr>
-          <a:xfrm>
-            <a:off x="0" y="-3880"/>
-            <a:ext cx="10515600" cy="530802"/>
-          </a:xfrm>
-        </p:spPr>
-        <p:txBody>
-          <a:bodyPr>
-            <a:normAutofit fontScale="90000"/>
-          </a:bodyPr>
-          <a:lstStyle/>
-          <a:p>
-            <a:r>
-              <a:rPr lang="en-US" dirty="0"/>
-              <a:t>Mike</a:t>
-            </a:r>
-          </a:p>
-        </p:txBody>
-      </p:sp>
-      <p:sp>
-        <p:nvSpPr>
-          <p:cNvPr id="13" name="TextBox 12">
-            <a:extLst>
-              <a:ext uri="{FF2B5EF4-FFF2-40B4-BE49-F238E27FC236}">
-                <a16:creationId xmlns:a16="http://schemas.microsoft.com/office/drawing/2014/main" id="{1146637D-6BFC-E596-E843-88D63AD45F92}"/>
+              <a:t>Hourly average</a:t>
+            </a:r>
+          </a:p>
+        </p:txBody>
+      </p:sp>
+      <p:sp>
+        <p:nvSpPr>
+          <p:cNvPr id="10" name="TextBox 9">
+            <a:extLst>
+              <a:ext uri="{FF2B5EF4-FFF2-40B4-BE49-F238E27FC236}">
+                <a16:creationId xmlns:a16="http://schemas.microsoft.com/office/drawing/2014/main" id="{54CB47FB-F5F9-ED08-821B-7AF4C48AAFCE}"/>
               </a:ext>
             </a:extLst>
           </p:cNvPr>
@@ -7676,8 +7431,8 @@
         </p:nvSpPr>
         <p:spPr>
           <a:xfrm>
-            <a:off x="10707693" y="5226166"/>
-            <a:ext cx="1438086" cy="338554"/>
+            <a:off x="4516241" y="357645"/>
+            <a:ext cx="1770036" cy="338554"/>
           </a:xfrm>
           <a:prstGeom prst="rect">
             <a:avLst/>
@@ -7697,15 +7452,123 @@
           <a:p>
             <a:r>
               <a:rPr lang="en-US" sz="1600" dirty="0"/>
-              <a:t>Hourly average</a:t>
-            </a:r>
-          </a:p>
-        </p:txBody>
-      </p:sp>
+              <a:t>channel 54, node 8</a:t>
+            </a:r>
+          </a:p>
+        </p:txBody>
+      </p:sp>
+      <p:pic>
+        <p:nvPicPr>
+          <p:cNvPr id="5" name="Picture 4" descr="Chart, histogram&#10;&#10;Description automatically generated">
+            <a:extLst>
+              <a:ext uri="{FF2B5EF4-FFF2-40B4-BE49-F238E27FC236}">
+                <a16:creationId xmlns:a16="http://schemas.microsoft.com/office/drawing/2014/main" id="{22476E99-F8D7-709B-E271-A3829C7AB4E3}"/>
+              </a:ext>
+            </a:extLst>
+          </p:cNvPr>
+          <p:cNvPicPr>
+            <a:picLocks noChangeAspect="1"/>
+          </p:cNvPicPr>
+          <p:nvPr/>
+        </p:nvPicPr>
+        <p:blipFill>
+          <a:blip r:embed="rId2" cstate="print">
+            <a:extLst>
+              <a:ext uri="{28A0092B-C50C-407E-A947-70E740481C1C}">
+                <a14:useLocalDpi xmlns:a14="http://schemas.microsoft.com/office/drawing/2010/main" val="0"/>
+              </a:ext>
+            </a:extLst>
+          </a:blip>
+          <a:stretch>
+            <a:fillRect/>
+          </a:stretch>
+        </p:blipFill>
+        <p:spPr>
+          <a:xfrm>
+            <a:off x="3520550" y="870150"/>
+            <a:ext cx="3429000" cy="2571750"/>
+          </a:xfrm>
+          <a:prstGeom prst="rect">
+            <a:avLst/>
+          </a:prstGeom>
+        </p:spPr>
+      </p:pic>
+      <p:pic>
+        <p:nvPicPr>
+          <p:cNvPr id="6" name="Picture 5" descr="Chart, histogram&#10;&#10;Description automatically generated">
+            <a:extLst>
+              <a:ext uri="{FF2B5EF4-FFF2-40B4-BE49-F238E27FC236}">
+                <a16:creationId xmlns:a16="http://schemas.microsoft.com/office/drawing/2014/main" id="{062C4520-7632-FA71-1942-17DC3DAC845E}"/>
+              </a:ext>
+            </a:extLst>
+          </p:cNvPr>
+          <p:cNvPicPr>
+            <a:picLocks noChangeAspect="1"/>
+          </p:cNvPicPr>
+          <p:nvPr/>
+        </p:nvPicPr>
+        <p:blipFill>
+          <a:blip r:embed="rId3" cstate="print">
+            <a:extLst>
+              <a:ext uri="{28A0092B-C50C-407E-A947-70E740481C1C}">
+                <a14:useLocalDpi xmlns:a14="http://schemas.microsoft.com/office/drawing/2010/main" val="0"/>
+              </a:ext>
+            </a:extLst>
+          </a:blip>
+          <a:stretch>
+            <a:fillRect/>
+          </a:stretch>
+        </p:blipFill>
+        <p:spPr>
+          <a:xfrm>
+            <a:off x="6949550" y="870150"/>
+            <a:ext cx="3429000" cy="2571750"/>
+          </a:xfrm>
+          <a:prstGeom prst="rect">
+            <a:avLst/>
+          </a:prstGeom>
+        </p:spPr>
+      </p:pic>
+      <p:pic>
+        <p:nvPicPr>
+          <p:cNvPr id="7" name="Picture 6" descr="Chart, histogram&#10;&#10;Description automatically generated">
+            <a:extLst>
+              <a:ext uri="{FF2B5EF4-FFF2-40B4-BE49-F238E27FC236}">
+                <a16:creationId xmlns:a16="http://schemas.microsoft.com/office/drawing/2014/main" id="{E05A7350-5F0D-33B0-CDB5-343C93BC7A15}"/>
+              </a:ext>
+            </a:extLst>
+          </p:cNvPr>
+          <p:cNvPicPr>
+            <a:picLocks noChangeAspect="1"/>
+          </p:cNvPicPr>
+          <p:nvPr/>
+        </p:nvPicPr>
+        <p:blipFill>
+          <a:blip r:embed="rId4" cstate="print">
+            <a:extLst>
+              <a:ext uri="{28A0092B-C50C-407E-A947-70E740481C1C}">
+                <a14:useLocalDpi xmlns:a14="http://schemas.microsoft.com/office/drawing/2010/main" val="0"/>
+              </a:ext>
+            </a:extLst>
+          </a:blip>
+          <a:stretch>
+            <a:fillRect/>
+          </a:stretch>
+        </p:blipFill>
+        <p:spPr>
+          <a:xfrm>
+            <a:off x="86084" y="844852"/>
+            <a:ext cx="3429000" cy="2571750"/>
+          </a:xfrm>
+          <a:prstGeom prst="rect">
+            <a:avLst/>
+          </a:prstGeom>
+        </p:spPr>
+      </p:pic>
     </p:spTree>
     <p:extLst>
       <p:ext uri="{BB962C8B-B14F-4D97-AF65-F5344CB8AC3E}">
-        <p14:creationId xmlns:p14="http://schemas.microsoft.com/office/powerpoint/2010/main" val="1921078000"/>
+        <p14:creationId xmlns:p14="http://schemas.microsoft.com/office/powerpoint/2010/main" val="18945092"/>
       </p:ext>
     </p:extLst>
   </p:cSld>

</xml_diff>